<commit_message>
added lidt til slide conclusion
</commit_message>
<xml_diff>
--- a/slides/main.pptx
+++ b/slides/main.pptx
@@ -314,7 +314,7 @@
             <a:fld id="{5ADA3B83-9FAA-490E-9199-5F3FD89CBF95}" type="datetimeFigureOut">
               <a:rPr lang="da-DK" smtClean="0"/>
               <a:pPr/>
-              <a:t>fredag 21 jun</a:t>
+              <a:t>23-06-2013</a:t>
             </a:fld>
             <a:endParaRPr lang="da-DK"/>
           </a:p>
@@ -481,7 +481,7 @@
             <a:fld id="{5ADA3B83-9FAA-490E-9199-5F3FD89CBF95}" type="datetimeFigureOut">
               <a:rPr lang="da-DK" smtClean="0"/>
               <a:pPr/>
-              <a:t>fredag 21 jun</a:t>
+              <a:t>23-06-2013</a:t>
             </a:fld>
             <a:endParaRPr lang="da-DK"/>
           </a:p>
@@ -658,7 +658,7 @@
             <a:fld id="{5ADA3B83-9FAA-490E-9199-5F3FD89CBF95}" type="datetimeFigureOut">
               <a:rPr lang="da-DK" smtClean="0"/>
               <a:pPr/>
-              <a:t>fredag 21 jun</a:t>
+              <a:t>23-06-2013</a:t>
             </a:fld>
             <a:endParaRPr lang="da-DK"/>
           </a:p>
@@ -825,7 +825,7 @@
             <a:fld id="{17825FAC-110F-4E9C-A697-DFBD29A877EF}" type="datetimeFigureOut">
               <a:rPr lang="da-DK" smtClean="0"/>
               <a:pPr/>
-              <a:t>fredag 21 jun</a:t>
+              <a:t>23-06-2013</a:t>
             </a:fld>
             <a:endParaRPr lang="da-DK"/>
           </a:p>
@@ -877,7 +877,7 @@
     </p:spTree>
     <p:extLst>
       <p:ext uri="{BB962C8B-B14F-4D97-AF65-F5344CB8AC3E}">
-        <p14:creationId xmlns:p14="http://schemas.microsoft.com/office/powerpoint/2010/main" xmlns="" val="2128366257"/>
+        <p14:creationId xmlns:p14="http://schemas.microsoft.com/office/powerpoint/2010/main" val="2128366257"/>
       </p:ext>
     </p:extLst>
   </p:cSld>
@@ -907,7 +907,7 @@
     </p:spTree>
     <p:extLst>
       <p:ext uri="{BB962C8B-B14F-4D97-AF65-F5344CB8AC3E}">
-        <p14:creationId xmlns:p14="http://schemas.microsoft.com/office/powerpoint/2010/main" xmlns="" val="195677046"/>
+        <p14:creationId xmlns:p14="http://schemas.microsoft.com/office/powerpoint/2010/main" val="195677046"/>
       </p:ext>
     </p:extLst>
   </p:cSld>
@@ -937,7 +937,7 @@
     </p:spTree>
     <p:extLst>
       <p:ext uri="{BB962C8B-B14F-4D97-AF65-F5344CB8AC3E}">
-        <p14:creationId xmlns:p14="http://schemas.microsoft.com/office/powerpoint/2010/main" xmlns="" val="1997685105"/>
+        <p14:creationId xmlns:p14="http://schemas.microsoft.com/office/powerpoint/2010/main" val="1997685105"/>
       </p:ext>
     </p:extLst>
   </p:cSld>
@@ -1158,7 +1158,7 @@
             <a:fld id="{5ADA3B83-9FAA-490E-9199-5F3FD89CBF95}" type="datetimeFigureOut">
               <a:rPr lang="da-DK" smtClean="0"/>
               <a:pPr/>
-              <a:t>fredag 21 jun</a:t>
+              <a:t>23-06-2013</a:t>
             </a:fld>
             <a:endParaRPr lang="da-DK"/>
           </a:p>
@@ -1443,7 +1443,7 @@
             <a:fld id="{5ADA3B83-9FAA-490E-9199-5F3FD89CBF95}" type="datetimeFigureOut">
               <a:rPr lang="da-DK" smtClean="0"/>
               <a:pPr/>
-              <a:t>fredag 21 jun</a:t>
+              <a:t>23-06-2013</a:t>
             </a:fld>
             <a:endParaRPr lang="da-DK"/>
           </a:p>
@@ -1862,7 +1862,7 @@
             <a:fld id="{5ADA3B83-9FAA-490E-9199-5F3FD89CBF95}" type="datetimeFigureOut">
               <a:rPr lang="da-DK" smtClean="0"/>
               <a:pPr/>
-              <a:t>fredag 21 jun</a:t>
+              <a:t>23-06-2013</a:t>
             </a:fld>
             <a:endParaRPr lang="da-DK"/>
           </a:p>
@@ -1977,7 +1977,7 @@
             <a:fld id="{5ADA3B83-9FAA-490E-9199-5F3FD89CBF95}" type="datetimeFigureOut">
               <a:rPr lang="da-DK" smtClean="0"/>
               <a:pPr/>
-              <a:t>fredag 21 jun</a:t>
+              <a:t>23-06-2013</a:t>
             </a:fld>
             <a:endParaRPr lang="da-DK"/>
           </a:p>
@@ -2069,7 +2069,7 @@
             <a:fld id="{5ADA3B83-9FAA-490E-9199-5F3FD89CBF95}" type="datetimeFigureOut">
               <a:rPr lang="da-DK" smtClean="0"/>
               <a:pPr/>
-              <a:t>fredag 21 jun</a:t>
+              <a:t>23-06-2013</a:t>
             </a:fld>
             <a:endParaRPr lang="da-DK"/>
           </a:p>
@@ -2343,7 +2343,7 @@
             <a:fld id="{5ADA3B83-9FAA-490E-9199-5F3FD89CBF95}" type="datetimeFigureOut">
               <a:rPr lang="da-DK" smtClean="0"/>
               <a:pPr/>
-              <a:t>fredag 21 jun</a:t>
+              <a:t>23-06-2013</a:t>
             </a:fld>
             <a:endParaRPr lang="da-DK"/>
           </a:p>
@@ -2593,7 +2593,7 @@
             <a:fld id="{5ADA3B83-9FAA-490E-9199-5F3FD89CBF95}" type="datetimeFigureOut">
               <a:rPr lang="da-DK" smtClean="0"/>
               <a:pPr/>
-              <a:t>fredag 21 jun</a:t>
+              <a:t>23-06-2013</a:t>
             </a:fld>
             <a:endParaRPr lang="da-DK"/>
           </a:p>
@@ -2803,7 +2803,7 @@
             <a:fld id="{5ADA3B83-9FAA-490E-9199-5F3FD89CBF95}" type="datetimeFigureOut">
               <a:rPr lang="da-DK" smtClean="0"/>
               <a:pPr/>
-              <a:t>fredag 21 jun</a:t>
+              <a:t>23-06-2013</a:t>
             </a:fld>
             <a:endParaRPr lang="da-DK"/>
           </a:p>
@@ -3189,7 +3189,7 @@
           <a:blip r:embed="rId2" cstate="print">
             <a:extLst>
               <a:ext uri="{28A0092B-C50C-407E-A947-70E740481C1C}">
-                <a14:useLocalDpi xmlns:a14="http://schemas.microsoft.com/office/drawing/2010/main" xmlns="" val="0"/>
+                <a14:useLocalDpi xmlns:a14="http://schemas.microsoft.com/office/drawing/2010/main" val="0"/>
               </a:ext>
             </a:extLst>
           </a:blip>
@@ -3273,7 +3273,7 @@
           <a:blip r:embed="rId3" cstate="print">
             <a:extLst>
               <a:ext uri="{28A0092B-C50C-407E-A947-70E740481C1C}">
-                <a14:useLocalDpi xmlns:a14="http://schemas.microsoft.com/office/drawing/2010/main" xmlns="" val="0"/>
+                <a14:useLocalDpi xmlns:a14="http://schemas.microsoft.com/office/drawing/2010/main" val="0"/>
               </a:ext>
             </a:extLst>
           </a:blip>
@@ -3577,13 +3577,13 @@
   <p:clrMapOvr>
     <a:masterClrMapping/>
   </p:clrMapOvr>
-  <mc:AlternateContent xmlns:mc="http://schemas.openxmlformats.org/markup-compatibility/2006">
-    <mc:Choice xmlns:p14="http://schemas.microsoft.com/office/powerpoint/2010/main" xmlns="" Requires="p14">
+  <mc:AlternateContent xmlns:mc="http://schemas.openxmlformats.org/markup-compatibility/2006" xmlns:p14="http://schemas.microsoft.com/office/powerpoint/2010/main">
+    <mc:Choice Requires="p14">
       <p:transition p14:dur="250">
         <p:fade/>
       </p:transition>
     </mc:Choice>
-    <mc:Fallback>
+    <mc:Fallback xmlns="">
       <p:transition>
         <p:fade/>
       </p:transition>
@@ -3953,20 +3953,20 @@
     </p:spTree>
     <p:extLst>
       <p:ext uri="{BB962C8B-B14F-4D97-AF65-F5344CB8AC3E}">
-        <p14:creationId xmlns:p14="http://schemas.microsoft.com/office/powerpoint/2010/main" xmlns="" val="585023994"/>
+        <p14:creationId xmlns:p14="http://schemas.microsoft.com/office/powerpoint/2010/main" val="585023994"/>
       </p:ext>
     </p:extLst>
   </p:cSld>
   <p:clrMapOvr>
     <a:masterClrMapping/>
   </p:clrMapOvr>
-  <mc:AlternateContent xmlns:mc="http://schemas.openxmlformats.org/markup-compatibility/2006">
-    <mc:Choice xmlns:p14="http://schemas.microsoft.com/office/powerpoint/2010/main" xmlns="" Requires="p14">
+  <mc:AlternateContent xmlns:mc="http://schemas.openxmlformats.org/markup-compatibility/2006" xmlns:p14="http://schemas.microsoft.com/office/powerpoint/2010/main">
+    <mc:Choice Requires="p14">
       <p:transition p14:dur="250">
         <p:fade/>
       </p:transition>
     </mc:Choice>
-    <mc:Fallback>
+    <mc:Fallback xmlns="">
       <p:transition>
         <p:fade/>
       </p:transition>
@@ -4414,20 +4414,20 @@
     </p:spTree>
     <p:extLst>
       <p:ext uri="{BB962C8B-B14F-4D97-AF65-F5344CB8AC3E}">
-        <p14:creationId xmlns:p14="http://schemas.microsoft.com/office/powerpoint/2010/main" xmlns="" val="585023994"/>
+        <p14:creationId xmlns:p14="http://schemas.microsoft.com/office/powerpoint/2010/main" val="585023994"/>
       </p:ext>
     </p:extLst>
   </p:cSld>
   <p:clrMapOvr>
     <a:masterClrMapping/>
   </p:clrMapOvr>
-  <mc:AlternateContent xmlns:mc="http://schemas.openxmlformats.org/markup-compatibility/2006">
-    <mc:Choice xmlns:p14="http://schemas.microsoft.com/office/powerpoint/2010/main" xmlns="" Requires="p14">
+  <mc:AlternateContent xmlns:mc="http://schemas.openxmlformats.org/markup-compatibility/2006" xmlns:p14="http://schemas.microsoft.com/office/powerpoint/2010/main">
+    <mc:Choice Requires="p14">
       <p:transition p14:dur="250">
         <p:fade/>
       </p:transition>
     </mc:Choice>
-    <mc:Fallback>
+    <mc:Fallback xmlns="">
       <p:transition>
         <p:fade/>
       </p:transition>
@@ -4812,20 +4812,20 @@
     </p:spTree>
     <p:extLst>
       <p:ext uri="{BB962C8B-B14F-4D97-AF65-F5344CB8AC3E}">
-        <p14:creationId xmlns:p14="http://schemas.microsoft.com/office/powerpoint/2010/main" xmlns="" val="585023994"/>
+        <p14:creationId xmlns:p14="http://schemas.microsoft.com/office/powerpoint/2010/main" val="585023994"/>
       </p:ext>
     </p:extLst>
   </p:cSld>
   <p:clrMapOvr>
     <a:masterClrMapping/>
   </p:clrMapOvr>
-  <mc:AlternateContent xmlns:mc="http://schemas.openxmlformats.org/markup-compatibility/2006">
-    <mc:Choice xmlns:p14="http://schemas.microsoft.com/office/powerpoint/2010/main" xmlns="" Requires="p14">
+  <mc:AlternateContent xmlns:mc="http://schemas.openxmlformats.org/markup-compatibility/2006" xmlns:p14="http://schemas.microsoft.com/office/powerpoint/2010/main">
+    <mc:Choice Requires="p14">
       <p:transition p14:dur="250">
         <p:fade/>
       </p:transition>
     </mc:Choice>
-    <mc:Fallback>
+    <mc:Fallback xmlns="">
       <p:transition>
         <p:fade/>
       </p:transition>
@@ -4927,7 +4927,7 @@
           <a:blip r:embed="rId2" cstate="print">
             <a:extLst>
               <a:ext uri="{28A0092B-C50C-407E-A947-70E740481C1C}">
-                <a14:useLocalDpi xmlns:a14="http://schemas.microsoft.com/office/drawing/2010/main" xmlns="" val="0"/>
+                <a14:useLocalDpi xmlns:a14="http://schemas.microsoft.com/office/drawing/2010/main" val="0"/>
               </a:ext>
             </a:extLst>
           </a:blip>
@@ -5034,20 +5034,20 @@
     </p:spTree>
     <p:extLst>
       <p:ext uri="{BB962C8B-B14F-4D97-AF65-F5344CB8AC3E}">
-        <p14:creationId xmlns:p14="http://schemas.microsoft.com/office/powerpoint/2010/main" xmlns="" val="3425622471"/>
+        <p14:creationId xmlns:p14="http://schemas.microsoft.com/office/powerpoint/2010/main" val="3425622471"/>
       </p:ext>
     </p:extLst>
   </p:cSld>
   <p:clrMapOvr>
     <a:masterClrMapping/>
   </p:clrMapOvr>
-  <mc:AlternateContent xmlns:mc="http://schemas.openxmlformats.org/markup-compatibility/2006">
-    <mc:Choice xmlns:p14="http://schemas.microsoft.com/office/powerpoint/2010/main" xmlns="" Requires="p14">
+  <mc:AlternateContent xmlns:mc="http://schemas.openxmlformats.org/markup-compatibility/2006" xmlns:p14="http://schemas.microsoft.com/office/powerpoint/2010/main">
+    <mc:Choice Requires="p14">
       <p:transition p14:dur="250">
         <p:fade/>
       </p:transition>
     </mc:Choice>
-    <mc:Fallback>
+    <mc:Fallback xmlns="">
       <p:transition>
         <p:fade/>
       </p:transition>
@@ -5457,20 +5457,20 @@
     </p:spTree>
     <p:extLst>
       <p:ext uri="{BB962C8B-B14F-4D97-AF65-F5344CB8AC3E}">
-        <p14:creationId xmlns:p14="http://schemas.microsoft.com/office/powerpoint/2010/main" xmlns="" val="585023994"/>
+        <p14:creationId xmlns:p14="http://schemas.microsoft.com/office/powerpoint/2010/main" val="585023994"/>
       </p:ext>
     </p:extLst>
   </p:cSld>
   <p:clrMapOvr>
     <a:masterClrMapping/>
   </p:clrMapOvr>
-  <mc:AlternateContent xmlns:mc="http://schemas.openxmlformats.org/markup-compatibility/2006">
-    <mc:Choice xmlns:p14="http://schemas.microsoft.com/office/powerpoint/2010/main" xmlns="" Requires="p14">
+  <mc:AlternateContent xmlns:mc="http://schemas.openxmlformats.org/markup-compatibility/2006" xmlns:p14="http://schemas.microsoft.com/office/powerpoint/2010/main">
+    <mc:Choice Requires="p14">
       <p:transition p14:dur="250">
         <p:fade/>
       </p:transition>
     </mc:Choice>
-    <mc:Fallback>
+    <mc:Fallback xmlns="">
       <p:transition>
         <p:fade/>
       </p:transition>
@@ -5855,20 +5855,20 @@
     </p:spTree>
     <p:extLst>
       <p:ext uri="{BB962C8B-B14F-4D97-AF65-F5344CB8AC3E}">
-        <p14:creationId xmlns:p14="http://schemas.microsoft.com/office/powerpoint/2010/main" xmlns="" val="585023994"/>
+        <p14:creationId xmlns:p14="http://schemas.microsoft.com/office/powerpoint/2010/main" val="585023994"/>
       </p:ext>
     </p:extLst>
   </p:cSld>
   <p:clrMapOvr>
     <a:masterClrMapping/>
   </p:clrMapOvr>
-  <mc:AlternateContent xmlns:mc="http://schemas.openxmlformats.org/markup-compatibility/2006">
-    <mc:Choice xmlns:p14="http://schemas.microsoft.com/office/powerpoint/2010/main" xmlns="" Requires="p14">
+  <mc:AlternateContent xmlns:mc="http://schemas.openxmlformats.org/markup-compatibility/2006" xmlns:p14="http://schemas.microsoft.com/office/powerpoint/2010/main">
+    <mc:Choice Requires="p14">
       <p:transition p14:dur="250">
         <p:fade/>
       </p:transition>
     </mc:Choice>
-    <mc:Fallback>
+    <mc:Fallback xmlns="">
       <p:transition>
         <p:fade/>
       </p:transition>
@@ -6281,20 +6281,20 @@
     </p:spTree>
     <p:extLst>
       <p:ext uri="{BB962C8B-B14F-4D97-AF65-F5344CB8AC3E}">
-        <p14:creationId xmlns:p14="http://schemas.microsoft.com/office/powerpoint/2010/main" xmlns="" val="585023994"/>
+        <p14:creationId xmlns:p14="http://schemas.microsoft.com/office/powerpoint/2010/main" val="585023994"/>
       </p:ext>
     </p:extLst>
   </p:cSld>
   <p:clrMapOvr>
     <a:masterClrMapping/>
   </p:clrMapOvr>
-  <mc:AlternateContent xmlns:mc="http://schemas.openxmlformats.org/markup-compatibility/2006">
-    <mc:Choice xmlns:p14="http://schemas.microsoft.com/office/powerpoint/2010/main" xmlns="" Requires="p14">
+  <mc:AlternateContent xmlns:mc="http://schemas.openxmlformats.org/markup-compatibility/2006" xmlns:p14="http://schemas.microsoft.com/office/powerpoint/2010/main">
+    <mc:Choice Requires="p14">
       <p:transition p14:dur="250">
         <p:fade/>
       </p:transition>
     </mc:Choice>
-    <mc:Fallback>
+    <mc:Fallback xmlns="">
       <p:transition>
         <p:fade/>
       </p:transition>
@@ -6803,20 +6803,20 @@
     </p:spTree>
     <p:extLst>
       <p:ext uri="{BB962C8B-B14F-4D97-AF65-F5344CB8AC3E}">
-        <p14:creationId xmlns:p14="http://schemas.microsoft.com/office/powerpoint/2010/main" xmlns="" val="585023994"/>
+        <p14:creationId xmlns:p14="http://schemas.microsoft.com/office/powerpoint/2010/main" val="585023994"/>
       </p:ext>
     </p:extLst>
   </p:cSld>
   <p:clrMapOvr>
     <a:masterClrMapping/>
   </p:clrMapOvr>
-  <mc:AlternateContent xmlns:mc="http://schemas.openxmlformats.org/markup-compatibility/2006">
-    <mc:Choice xmlns:p14="http://schemas.microsoft.com/office/powerpoint/2010/main" xmlns="" Requires="p14">
+  <mc:AlternateContent xmlns:mc="http://schemas.openxmlformats.org/markup-compatibility/2006" xmlns:p14="http://schemas.microsoft.com/office/powerpoint/2010/main">
+    <mc:Choice Requires="p14">
       <p:transition p14:dur="250">
         <p:fade/>
       </p:transition>
     </mc:Choice>
-    <mc:Fallback>
+    <mc:Fallback xmlns="">
       <p:transition>
         <p:fade/>
       </p:transition>
@@ -7233,20 +7233,20 @@
     </p:spTree>
     <p:extLst>
       <p:ext uri="{BB962C8B-B14F-4D97-AF65-F5344CB8AC3E}">
-        <p14:creationId xmlns:p14="http://schemas.microsoft.com/office/powerpoint/2010/main" xmlns="" val="585023994"/>
+        <p14:creationId xmlns:p14="http://schemas.microsoft.com/office/powerpoint/2010/main" val="585023994"/>
       </p:ext>
     </p:extLst>
   </p:cSld>
   <p:clrMapOvr>
     <a:masterClrMapping/>
   </p:clrMapOvr>
-  <mc:AlternateContent xmlns:mc="http://schemas.openxmlformats.org/markup-compatibility/2006">
-    <mc:Choice xmlns:p14="http://schemas.microsoft.com/office/powerpoint/2010/main" xmlns="" Requires="p14">
+  <mc:AlternateContent xmlns:mc="http://schemas.openxmlformats.org/markup-compatibility/2006" xmlns:p14="http://schemas.microsoft.com/office/powerpoint/2010/main">
+    <mc:Choice Requires="p14">
       <p:transition p14:dur="250">
         <p:fade/>
       </p:transition>
     </mc:Choice>
-    <mc:Fallback>
+    <mc:Fallback xmlns="">
       <p:transition>
         <p:fade/>
       </p:transition>
@@ -7660,20 +7660,20 @@
     </p:spTree>
     <p:extLst>
       <p:ext uri="{BB962C8B-B14F-4D97-AF65-F5344CB8AC3E}">
-        <p14:creationId xmlns:p14="http://schemas.microsoft.com/office/powerpoint/2010/main" xmlns="" val="585023994"/>
+        <p14:creationId xmlns:p14="http://schemas.microsoft.com/office/powerpoint/2010/main" val="585023994"/>
       </p:ext>
     </p:extLst>
   </p:cSld>
   <p:clrMapOvr>
     <a:masterClrMapping/>
   </p:clrMapOvr>
-  <mc:AlternateContent xmlns:mc="http://schemas.openxmlformats.org/markup-compatibility/2006">
-    <mc:Choice xmlns:p14="http://schemas.microsoft.com/office/powerpoint/2010/main" xmlns="" Requires="p14">
+  <mc:AlternateContent xmlns:mc="http://schemas.openxmlformats.org/markup-compatibility/2006" xmlns:p14="http://schemas.microsoft.com/office/powerpoint/2010/main">
+    <mc:Choice Requires="p14">
       <p:transition p14:dur="250">
         <p:fade/>
       </p:transition>
     </mc:Choice>
-    <mc:Fallback>
+    <mc:Fallback xmlns="">
       <p:transition>
         <p:fade/>
       </p:transition>
@@ -7799,6 +7799,13 @@
               </a:rPr>
               <a:t>GIRAF</a:t>
             </a:r>
+          </a:p>
+          <a:p>
+            <a:pPr marL="12700">
+              <a:lnSpc>
+                <a:spcPct val="100000"/>
+              </a:lnSpc>
+            </a:pPr>
             <a:endParaRPr lang="da-DK" sz="1600" b="1" cap="all" spc="200" dirty="0" smtClean="0">
               <a:solidFill>
                 <a:schemeClr val="accent1">
@@ -7815,6 +7822,25 @@
                 <a:spcPct val="100000"/>
               </a:lnSpc>
             </a:pPr>
+            <a:r>
+              <a:rPr lang="da-DK" sz="1600" b="1" cap="all" spc="200" dirty="0" smtClean="0">
+                <a:solidFill>
+                  <a:schemeClr val="accent1">
+                    <a:lumMod val="75000"/>
+                  </a:schemeClr>
+                </a:solidFill>
+                <a:latin typeface="Arial"/>
+                <a:cs typeface="Arial"/>
+              </a:rPr>
+              <a:t>Game Design</a:t>
+            </a:r>
+          </a:p>
+          <a:p>
+            <a:pPr marL="12700">
+              <a:lnSpc>
+                <a:spcPct val="100000"/>
+              </a:lnSpc>
+            </a:pPr>
             <a:endParaRPr lang="da-DK" sz="1600" b="1" cap="all" spc="200" dirty="0" smtClean="0">
               <a:solidFill>
                 <a:schemeClr val="accent1">
@@ -7841,8 +7867,68 @@
                 <a:latin typeface="Arial"/>
                 <a:cs typeface="Arial"/>
               </a:rPr>
-              <a:t>Game Design</a:t>
-            </a:r>
+              <a:t>OpenGL ES</a:t>
+            </a:r>
+            <a:endParaRPr lang="da-DK" sz="1200" cap="all" spc="200" dirty="0">
+              <a:solidFill>
+                <a:schemeClr val="accent1">
+                  <a:lumMod val="75000"/>
+                </a:schemeClr>
+              </a:solidFill>
+              <a:latin typeface="Arial"/>
+              <a:cs typeface="Arial"/>
+            </a:endParaRPr>
+          </a:p>
+          <a:p>
+            <a:pPr marL="12700">
+              <a:lnSpc>
+                <a:spcPct val="100000"/>
+              </a:lnSpc>
+            </a:pPr>
+            <a:endParaRPr lang="da-DK" sz="1600" b="1" cap="all" spc="200" dirty="0">
+              <a:solidFill>
+                <a:schemeClr val="accent1">
+                  <a:lumMod val="75000"/>
+                </a:schemeClr>
+              </a:solidFill>
+              <a:latin typeface="Arial"/>
+              <a:cs typeface="Arial"/>
+            </a:endParaRPr>
+          </a:p>
+          <a:p>
+            <a:pPr marL="12700">
+              <a:lnSpc>
+                <a:spcPct val="100000"/>
+              </a:lnSpc>
+            </a:pPr>
+            <a:r>
+              <a:rPr lang="da-DK" sz="1600" b="1" cap="all" spc="200" dirty="0" smtClean="0">
+                <a:solidFill>
+                  <a:schemeClr val="accent1">
+                    <a:lumMod val="75000"/>
+                  </a:schemeClr>
+                </a:solidFill>
+                <a:latin typeface="Arial"/>
+                <a:cs typeface="Arial"/>
+              </a:rPr>
+              <a:t>Game Implementation</a:t>
+            </a:r>
+            <a:endParaRPr lang="da-DK" sz="1200" cap="all" spc="200" dirty="0" smtClean="0">
+              <a:solidFill>
+                <a:schemeClr val="accent1">
+                  <a:lumMod val="75000"/>
+                </a:schemeClr>
+              </a:solidFill>
+              <a:latin typeface="Arial"/>
+              <a:cs typeface="Arial"/>
+            </a:endParaRPr>
+          </a:p>
+          <a:p>
+            <a:pPr marL="12700">
+              <a:lnSpc>
+                <a:spcPct val="100000"/>
+              </a:lnSpc>
+            </a:pPr>
             <a:endParaRPr lang="da-DK" sz="1600" b="1" cap="all" spc="200" dirty="0" smtClean="0">
               <a:solidFill>
                 <a:schemeClr val="accent1">
@@ -7859,6 +7945,34 @@
                 <a:spcPct val="100000"/>
               </a:lnSpc>
             </a:pPr>
+            <a:r>
+              <a:rPr lang="da-DK" sz="1600" b="1" cap="all" spc="200" dirty="0" err="1" smtClean="0">
+                <a:solidFill>
+                  <a:schemeClr val="accent1">
+                    <a:lumMod val="75000"/>
+                  </a:schemeClr>
+                </a:solidFill>
+                <a:latin typeface="Arial"/>
+                <a:cs typeface="Arial"/>
+              </a:rPr>
+              <a:t>Conclusion</a:t>
+            </a:r>
+            <a:endParaRPr lang="da-DK" sz="1600" b="1" cap="all" spc="200" dirty="0">
+              <a:solidFill>
+                <a:schemeClr val="accent1">
+                  <a:lumMod val="75000"/>
+                </a:schemeClr>
+              </a:solidFill>
+              <a:latin typeface="Arial"/>
+              <a:cs typeface="Arial"/>
+            </a:endParaRPr>
+          </a:p>
+          <a:p>
+            <a:pPr marL="12700">
+              <a:lnSpc>
+                <a:spcPct val="100000"/>
+              </a:lnSpc>
+            </a:pPr>
             <a:endParaRPr lang="da-DK" sz="1600" b="1" cap="all" spc="200" dirty="0" smtClean="0">
               <a:solidFill>
                 <a:schemeClr val="accent1">
@@ -7885,149 +7999,8 @@
                 <a:latin typeface="Arial"/>
                 <a:cs typeface="Arial"/>
               </a:rPr>
-              <a:t>OpenGL ES</a:t>
-            </a:r>
-            <a:endParaRPr lang="da-DK" sz="1200" cap="all" spc="200" dirty="0">
-              <a:solidFill>
-                <a:schemeClr val="accent1">
-                  <a:lumMod val="75000"/>
-                </a:schemeClr>
-              </a:solidFill>
-              <a:latin typeface="Arial"/>
-              <a:cs typeface="Arial"/>
-            </a:endParaRPr>
-          </a:p>
-          <a:p>
-            <a:pPr marL="12700">
-              <a:lnSpc>
-                <a:spcPct val="100000"/>
-              </a:lnSpc>
-            </a:pPr>
-            <a:endParaRPr lang="da-DK" sz="1600" b="1" cap="all" spc="200" dirty="0">
-              <a:solidFill>
-                <a:schemeClr val="accent1">
-                  <a:lumMod val="75000"/>
-                </a:schemeClr>
-              </a:solidFill>
-              <a:latin typeface="Arial"/>
-              <a:cs typeface="Arial"/>
-            </a:endParaRPr>
-          </a:p>
-          <a:p>
-            <a:pPr marL="12700">
-              <a:lnSpc>
-                <a:spcPct val="100000"/>
-              </a:lnSpc>
-            </a:pPr>
-            <a:r>
-              <a:rPr lang="da-DK" sz="1600" b="1" cap="all" spc="200" dirty="0" smtClean="0">
-                <a:solidFill>
-                  <a:schemeClr val="accent1">
-                    <a:lumMod val="75000"/>
-                  </a:schemeClr>
-                </a:solidFill>
-                <a:latin typeface="Arial"/>
-                <a:cs typeface="Arial"/>
-              </a:rPr>
-              <a:t>Game Implementation</a:t>
-            </a:r>
-            <a:endParaRPr lang="da-DK" sz="1200" cap="all" spc="200" dirty="0" smtClean="0">
-              <a:solidFill>
-                <a:schemeClr val="accent1">
-                  <a:lumMod val="75000"/>
-                </a:schemeClr>
-              </a:solidFill>
-              <a:latin typeface="Arial"/>
-              <a:cs typeface="Arial"/>
-            </a:endParaRPr>
-          </a:p>
-          <a:p>
-            <a:pPr marL="12700">
-              <a:lnSpc>
-                <a:spcPct val="100000"/>
-              </a:lnSpc>
-            </a:pPr>
-            <a:endParaRPr lang="da-DK" sz="1600" b="1" cap="all" spc="200" dirty="0" smtClean="0">
-              <a:solidFill>
-                <a:schemeClr val="accent1">
-                  <a:lumMod val="75000"/>
-                </a:schemeClr>
-              </a:solidFill>
-              <a:latin typeface="Arial"/>
-              <a:cs typeface="Arial"/>
-            </a:endParaRPr>
-          </a:p>
-          <a:p>
-            <a:pPr marL="12700">
-              <a:lnSpc>
-                <a:spcPct val="100000"/>
-              </a:lnSpc>
-            </a:pPr>
-            <a:r>
-              <a:rPr lang="da-DK" sz="1600" b="1" cap="all" spc="200" dirty="0" err="1" smtClean="0">
-                <a:solidFill>
-                  <a:schemeClr val="accent1">
-                    <a:lumMod val="75000"/>
-                  </a:schemeClr>
-                </a:solidFill>
-                <a:latin typeface="Arial"/>
-                <a:cs typeface="Arial"/>
-              </a:rPr>
-              <a:t>Conclusion</a:t>
-            </a:r>
-            <a:endParaRPr lang="da-DK" sz="1600" b="1" cap="all" spc="200" dirty="0">
-              <a:solidFill>
-                <a:schemeClr val="accent1">
-                  <a:lumMod val="75000"/>
-                </a:schemeClr>
-              </a:solidFill>
-              <a:latin typeface="Arial"/>
-              <a:cs typeface="Arial"/>
-            </a:endParaRPr>
-          </a:p>
-          <a:p>
-            <a:pPr marL="12700">
-              <a:lnSpc>
-                <a:spcPct val="100000"/>
-              </a:lnSpc>
-            </a:pPr>
-            <a:endParaRPr lang="da-DK" sz="1600" b="1" cap="all" spc="200" dirty="0" smtClean="0">
-              <a:solidFill>
-                <a:schemeClr val="accent1">
-                  <a:lumMod val="75000"/>
-                </a:schemeClr>
-              </a:solidFill>
-              <a:latin typeface="Arial"/>
-              <a:cs typeface="Arial"/>
-            </a:endParaRPr>
-          </a:p>
-          <a:p>
-            <a:pPr marL="12700">
-              <a:lnSpc>
-                <a:spcPct val="100000"/>
-              </a:lnSpc>
-            </a:pPr>
-            <a:r>
-              <a:rPr lang="da-DK" sz="1600" b="1" cap="all" spc="200" dirty="0" smtClean="0">
-                <a:solidFill>
-                  <a:schemeClr val="accent1">
-                    <a:lumMod val="75000"/>
-                  </a:schemeClr>
-                </a:solidFill>
-                <a:latin typeface="Arial"/>
-                <a:cs typeface="Arial"/>
-              </a:rPr>
               <a:t>demonstration</a:t>
             </a:r>
-            <a:endParaRPr lang="da-DK" sz="1600" b="1" cap="all" spc="200" dirty="0" smtClean="0">
-              <a:solidFill>
-                <a:schemeClr val="accent1">
-                  <a:lumMod val="75000"/>
-                </a:schemeClr>
-              </a:solidFill>
-              <a:latin typeface="Arial"/>
-              <a:cs typeface="Arial"/>
-            </a:endParaRPr>
           </a:p>
         </p:txBody>
       </p:sp>
@@ -8260,13 +8233,13 @@
   <p:clrMapOvr>
     <a:masterClrMapping/>
   </p:clrMapOvr>
-  <mc:AlternateContent xmlns:mc="http://schemas.openxmlformats.org/markup-compatibility/2006">
-    <mc:Choice xmlns:p14="http://schemas.microsoft.com/office/powerpoint/2010/main" xmlns="" Requires="p14">
+  <mc:AlternateContent xmlns:mc="http://schemas.openxmlformats.org/markup-compatibility/2006" xmlns:p14="http://schemas.microsoft.com/office/powerpoint/2010/main">
+    <mc:Choice Requires="p14">
       <p:transition p14:dur="250">
         <p:fade/>
       </p:transition>
     </mc:Choice>
-    <mc:Fallback>
+    <mc:Fallback xmlns="">
       <p:transition>
         <p:fade/>
       </p:transition>
@@ -8778,20 +8751,20 @@
     </p:spTree>
     <p:extLst>
       <p:ext uri="{BB962C8B-B14F-4D97-AF65-F5344CB8AC3E}">
-        <p14:creationId xmlns:p14="http://schemas.microsoft.com/office/powerpoint/2010/main" xmlns="" val="585023994"/>
+        <p14:creationId xmlns:p14="http://schemas.microsoft.com/office/powerpoint/2010/main" val="585023994"/>
       </p:ext>
     </p:extLst>
   </p:cSld>
   <p:clrMapOvr>
     <a:masterClrMapping/>
   </p:clrMapOvr>
-  <mc:AlternateContent xmlns:mc="http://schemas.openxmlformats.org/markup-compatibility/2006">
-    <mc:Choice xmlns:p14="http://schemas.microsoft.com/office/powerpoint/2010/main" xmlns="" Requires="p14">
+  <mc:AlternateContent xmlns:mc="http://schemas.openxmlformats.org/markup-compatibility/2006" xmlns:p14="http://schemas.microsoft.com/office/powerpoint/2010/main">
+    <mc:Choice Requires="p14">
       <p:transition p14:dur="250">
         <p:fade/>
       </p:transition>
     </mc:Choice>
-    <mc:Fallback>
+    <mc:Fallback xmlns="">
       <p:transition>
         <p:fade/>
       </p:transition>
@@ -8893,7 +8866,7 @@
           <a:blip r:embed="rId2" cstate="print">
             <a:extLst>
               <a:ext uri="{28A0092B-C50C-407E-A947-70E740481C1C}">
-                <a14:useLocalDpi xmlns:a14="http://schemas.microsoft.com/office/drawing/2010/main" xmlns="" val="0"/>
+                <a14:useLocalDpi xmlns:a14="http://schemas.microsoft.com/office/drawing/2010/main" val="0"/>
               </a:ext>
             </a:extLst>
           </a:blip>
@@ -8988,20 +8961,20 @@
     </p:spTree>
     <p:extLst>
       <p:ext uri="{BB962C8B-B14F-4D97-AF65-F5344CB8AC3E}">
-        <p14:creationId xmlns:p14="http://schemas.microsoft.com/office/powerpoint/2010/main" xmlns="" val="3425622471"/>
+        <p14:creationId xmlns:p14="http://schemas.microsoft.com/office/powerpoint/2010/main" val="3425622471"/>
       </p:ext>
     </p:extLst>
   </p:cSld>
   <p:clrMapOvr>
     <a:masterClrMapping/>
   </p:clrMapOvr>
-  <mc:AlternateContent xmlns:mc="http://schemas.openxmlformats.org/markup-compatibility/2006">
-    <mc:Choice xmlns:p14="http://schemas.microsoft.com/office/powerpoint/2010/main" xmlns="" Requires="p14">
+  <mc:AlternateContent xmlns:mc="http://schemas.openxmlformats.org/markup-compatibility/2006" xmlns:p14="http://schemas.microsoft.com/office/powerpoint/2010/main">
+    <mc:Choice Requires="p14">
       <p:transition p14:dur="250">
         <p:fade/>
       </p:transition>
     </mc:Choice>
-    <mc:Fallback>
+    <mc:Fallback xmlns="">
       <p:transition>
         <p:fade/>
       </p:transition>
@@ -9366,20 +9339,20 @@
     </p:spTree>
     <p:extLst>
       <p:ext uri="{BB962C8B-B14F-4D97-AF65-F5344CB8AC3E}">
-        <p14:creationId xmlns:p14="http://schemas.microsoft.com/office/powerpoint/2010/main" xmlns="" val="585023994"/>
+        <p14:creationId xmlns:p14="http://schemas.microsoft.com/office/powerpoint/2010/main" val="585023994"/>
       </p:ext>
     </p:extLst>
   </p:cSld>
   <p:clrMapOvr>
     <a:masterClrMapping/>
   </p:clrMapOvr>
-  <mc:AlternateContent xmlns:mc="http://schemas.openxmlformats.org/markup-compatibility/2006">
-    <mc:Choice xmlns:p14="http://schemas.microsoft.com/office/powerpoint/2010/main" xmlns="" Requires="p14">
+  <mc:AlternateContent xmlns:mc="http://schemas.openxmlformats.org/markup-compatibility/2006" xmlns:p14="http://schemas.microsoft.com/office/powerpoint/2010/main">
+    <mc:Choice Requires="p14">
       <p:transition p14:dur="250">
         <p:fade/>
       </p:transition>
     </mc:Choice>
-    <mc:Fallback>
+    <mc:Fallback xmlns="">
       <p:transition>
         <p:fade/>
       </p:transition>
@@ -9720,15 +9693,6 @@
               </a:rPr>
               <a:t>Clouds</a:t>
             </a:r>
-            <a:endParaRPr lang="en-GB" sz="1200" cap="all" spc="200" dirty="0" smtClean="0">
-              <a:solidFill>
-                <a:schemeClr val="accent1">
-                  <a:lumMod val="75000"/>
-                </a:schemeClr>
-              </a:solidFill>
-              <a:latin typeface="Arial"/>
-              <a:cs typeface="Arial"/>
-            </a:endParaRPr>
           </a:p>
         </p:txBody>
       </p:sp>
@@ -9959,20 +9923,20 @@
     </p:spTree>
     <p:extLst>
       <p:ext uri="{BB962C8B-B14F-4D97-AF65-F5344CB8AC3E}">
-        <p14:creationId xmlns:p14="http://schemas.microsoft.com/office/powerpoint/2010/main" xmlns="" val="585023994"/>
+        <p14:creationId xmlns:p14="http://schemas.microsoft.com/office/powerpoint/2010/main" val="585023994"/>
       </p:ext>
     </p:extLst>
   </p:cSld>
   <p:clrMapOvr>
     <a:masterClrMapping/>
   </p:clrMapOvr>
-  <mc:AlternateContent xmlns:mc="http://schemas.openxmlformats.org/markup-compatibility/2006">
-    <mc:Choice xmlns:p14="http://schemas.microsoft.com/office/powerpoint/2010/main" xmlns="" Requires="p14">
+  <mc:AlternateContent xmlns:mc="http://schemas.openxmlformats.org/markup-compatibility/2006" xmlns:p14="http://schemas.microsoft.com/office/powerpoint/2010/main">
+    <mc:Choice Requires="p14">
       <p:transition p14:dur="250">
         <p:fade/>
       </p:transition>
     </mc:Choice>
-    <mc:Fallback>
+    <mc:Fallback xmlns="">
       <p:transition>
         <p:fade/>
       </p:transition>
@@ -10074,7 +10038,7 @@
           <a:blip r:embed="rId2" cstate="print">
             <a:extLst>
               <a:ext uri="{28A0092B-C50C-407E-A947-70E740481C1C}">
-                <a14:useLocalDpi xmlns:a14="http://schemas.microsoft.com/office/drawing/2010/main" xmlns="" val="0"/>
+                <a14:useLocalDpi xmlns:a14="http://schemas.microsoft.com/office/drawing/2010/main" val="0"/>
               </a:ext>
             </a:extLst>
           </a:blip>
@@ -10169,20 +10133,20 @@
     </p:spTree>
     <p:extLst>
       <p:ext uri="{BB962C8B-B14F-4D97-AF65-F5344CB8AC3E}">
-        <p14:creationId xmlns:p14="http://schemas.microsoft.com/office/powerpoint/2010/main" xmlns="" val="3425622471"/>
+        <p14:creationId xmlns:p14="http://schemas.microsoft.com/office/powerpoint/2010/main" val="3425622471"/>
       </p:ext>
     </p:extLst>
   </p:cSld>
   <p:clrMapOvr>
     <a:masterClrMapping/>
   </p:clrMapOvr>
-  <mc:AlternateContent xmlns:mc="http://schemas.openxmlformats.org/markup-compatibility/2006">
-    <mc:Choice xmlns:p14="http://schemas.microsoft.com/office/powerpoint/2010/main" xmlns="" Requires="p14">
+  <mc:AlternateContent xmlns:mc="http://schemas.openxmlformats.org/markup-compatibility/2006" xmlns:p14="http://schemas.microsoft.com/office/powerpoint/2010/main">
+    <mc:Choice Requires="p14">
       <p:transition p14:dur="250">
         <p:fade/>
       </p:transition>
     </mc:Choice>
-    <mc:Fallback>
+    <mc:Fallback xmlns="">
       <p:transition>
         <p:fade/>
       </p:transition>
@@ -10380,7 +10344,7 @@
               </a:lnSpc>
             </a:pPr>
             <a:r>
-              <a:rPr lang="en-GB" sz="1600" b="1" cap="all" spc="200" smtClean="0">
+              <a:rPr lang="en-GB" sz="1600" b="1" cap="all" spc="200" dirty="0" smtClean="0">
                 <a:solidFill>
                   <a:schemeClr val="accent1">
                     <a:lumMod val="75000"/>
@@ -10389,8 +10353,34 @@
                 <a:latin typeface="Arial"/>
                 <a:cs typeface="Arial"/>
               </a:rPr>
-              <a:t>Hest?</a:t>
-            </a:r>
+              <a:t>Customization</a:t>
+            </a:r>
+          </a:p>
+          <a:p>
+            <a:pPr marL="12700">
+              <a:lnSpc>
+                <a:spcPct val="100000"/>
+              </a:lnSpc>
+            </a:pPr>
+            <a:r>
+              <a:rPr lang="da-DK" sz="1600" b="1" cap="all" spc="200" dirty="0" smtClean="0">
+                <a:solidFill>
+                  <a:schemeClr val="accent1">
+                    <a:lumMod val="75000"/>
+                  </a:schemeClr>
+                </a:solidFill>
+                <a:latin typeface="Arial"/>
+                <a:cs typeface="Arial"/>
+              </a:rPr>
+              <a:t>Managing games</a:t>
+            </a:r>
+          </a:p>
+          <a:p>
+            <a:pPr marL="12700">
+              <a:lnSpc>
+                <a:spcPct val="100000"/>
+              </a:lnSpc>
+            </a:pPr>
             <a:endParaRPr lang="da-DK" sz="1600" b="1" cap="all" spc="200" dirty="0" smtClean="0">
               <a:solidFill>
                 <a:schemeClr val="accent1">
@@ -10689,20 +10679,20 @@
     </p:spTree>
     <p:extLst>
       <p:ext uri="{BB962C8B-B14F-4D97-AF65-F5344CB8AC3E}">
-        <p14:creationId xmlns:p14="http://schemas.microsoft.com/office/powerpoint/2010/main" xmlns="" val="772562590"/>
+        <p14:creationId xmlns:p14="http://schemas.microsoft.com/office/powerpoint/2010/main" val="772562590"/>
       </p:ext>
     </p:extLst>
   </p:cSld>
   <p:clrMapOvr>
     <a:masterClrMapping/>
   </p:clrMapOvr>
-  <mc:AlternateContent xmlns:mc="http://schemas.openxmlformats.org/markup-compatibility/2006">
-    <mc:Choice xmlns:p14="http://schemas.microsoft.com/office/powerpoint/2010/main" xmlns="" Requires="p14">
+  <mc:AlternateContent xmlns:mc="http://schemas.openxmlformats.org/markup-compatibility/2006" xmlns:p14="http://schemas.microsoft.com/office/powerpoint/2010/main">
+    <mc:Choice Requires="p14">
       <p:transition p14:dur="250">
         <p:fade/>
       </p:transition>
     </mc:Choice>
-    <mc:Fallback>
+    <mc:Fallback xmlns="">
       <p:transition>
         <p:fade/>
       </p:transition>
@@ -10804,7 +10794,7 @@
           <a:blip r:embed="rId2" cstate="print">
             <a:extLst>
               <a:ext uri="{28A0092B-C50C-407E-A947-70E740481C1C}">
-                <a14:useLocalDpi xmlns:a14="http://schemas.microsoft.com/office/drawing/2010/main" xmlns="" val="0"/>
+                <a14:useLocalDpi xmlns:a14="http://schemas.microsoft.com/office/drawing/2010/main" val="0"/>
               </a:ext>
             </a:extLst>
           </a:blip>
@@ -10899,20 +10889,20 @@
     </p:spTree>
     <p:extLst>
       <p:ext uri="{BB962C8B-B14F-4D97-AF65-F5344CB8AC3E}">
-        <p14:creationId xmlns:p14="http://schemas.microsoft.com/office/powerpoint/2010/main" xmlns="" val="3425622471"/>
+        <p14:creationId xmlns:p14="http://schemas.microsoft.com/office/powerpoint/2010/main" val="3425622471"/>
       </p:ext>
     </p:extLst>
   </p:cSld>
   <p:clrMapOvr>
     <a:masterClrMapping/>
   </p:clrMapOvr>
-  <mc:AlternateContent xmlns:mc="http://schemas.openxmlformats.org/markup-compatibility/2006">
-    <mc:Choice xmlns:p14="http://schemas.microsoft.com/office/powerpoint/2010/main" xmlns="" Requires="p14">
+  <mc:AlternateContent xmlns:mc="http://schemas.openxmlformats.org/markup-compatibility/2006" xmlns:p14="http://schemas.microsoft.com/office/powerpoint/2010/main">
+    <mc:Choice Requires="p14">
       <p:transition p14:dur="250">
         <p:fade/>
       </p:transition>
     </mc:Choice>
-    <mc:Fallback>
+    <mc:Fallback xmlns="">
       <p:transition>
         <p:fade/>
       </p:transition>
@@ -11014,7 +11004,7 @@
           <a:blip r:embed="rId2" cstate="print">
             <a:extLst>
               <a:ext uri="{28A0092B-C50C-407E-A947-70E740481C1C}">
-                <a14:useLocalDpi xmlns:a14="http://schemas.microsoft.com/office/drawing/2010/main" xmlns="" val="0"/>
+                <a14:useLocalDpi xmlns:a14="http://schemas.microsoft.com/office/drawing/2010/main" val="0"/>
               </a:ext>
             </a:extLst>
           </a:blip>
@@ -11109,20 +11099,20 @@
     </p:spTree>
     <p:extLst>
       <p:ext uri="{BB962C8B-B14F-4D97-AF65-F5344CB8AC3E}">
-        <p14:creationId xmlns:p14="http://schemas.microsoft.com/office/powerpoint/2010/main" xmlns="" val="3425622471"/>
+        <p14:creationId xmlns:p14="http://schemas.microsoft.com/office/powerpoint/2010/main" val="3425622471"/>
       </p:ext>
     </p:extLst>
   </p:cSld>
   <p:clrMapOvr>
     <a:masterClrMapping/>
   </p:clrMapOvr>
-  <mc:AlternateContent xmlns:mc="http://schemas.openxmlformats.org/markup-compatibility/2006">
-    <mc:Choice xmlns:p14="http://schemas.microsoft.com/office/powerpoint/2010/main" xmlns="" Requires="p14">
+  <mc:AlternateContent xmlns:mc="http://schemas.openxmlformats.org/markup-compatibility/2006" xmlns:p14="http://schemas.microsoft.com/office/powerpoint/2010/main">
+    <mc:Choice Requires="p14">
       <p:transition p14:dur="250">
         <p:fade/>
       </p:transition>
     </mc:Choice>
-    <mc:Fallback>
+    <mc:Fallback xmlns="">
       <p:transition>
         <p:fade/>
       </p:transition>
@@ -11321,15 +11311,6 @@
               </a:rPr>
               <a:t>Weekly meetings</a:t>
             </a:r>
-            <a:endParaRPr lang="en-GB" sz="1200" cap="all" spc="200" dirty="0" smtClean="0">
-              <a:solidFill>
-                <a:schemeClr val="accent1">
-                  <a:lumMod val="75000"/>
-                </a:schemeClr>
-              </a:solidFill>
-              <a:latin typeface="Arial"/>
-              <a:cs typeface="Arial"/>
-            </a:endParaRPr>
           </a:p>
           <a:p>
             <a:pPr marL="12700">
@@ -11403,15 +11384,6 @@
               </a:rPr>
               <a:t>Committees</a:t>
             </a:r>
-            <a:endParaRPr lang="da-DK" sz="1600" b="1" cap="all" spc="200" dirty="0" smtClean="0">
-              <a:solidFill>
-                <a:schemeClr val="accent1">
-                  <a:lumMod val="75000"/>
-                </a:schemeClr>
-              </a:solidFill>
-              <a:latin typeface="Arial"/>
-              <a:cs typeface="Arial"/>
-            </a:endParaRPr>
           </a:p>
           <a:p>
             <a:pPr marL="12700">
@@ -11658,20 +11630,20 @@
     </p:spTree>
     <p:extLst>
       <p:ext uri="{BB962C8B-B14F-4D97-AF65-F5344CB8AC3E}">
-        <p14:creationId xmlns:p14="http://schemas.microsoft.com/office/powerpoint/2010/main" xmlns="" val="585023994"/>
+        <p14:creationId xmlns:p14="http://schemas.microsoft.com/office/powerpoint/2010/main" val="585023994"/>
       </p:ext>
     </p:extLst>
   </p:cSld>
   <p:clrMapOvr>
     <a:masterClrMapping/>
   </p:clrMapOvr>
-  <mc:AlternateContent xmlns:mc="http://schemas.openxmlformats.org/markup-compatibility/2006">
-    <mc:Choice xmlns:p14="http://schemas.microsoft.com/office/powerpoint/2010/main" xmlns="" Requires="p14">
+  <mc:AlternateContent xmlns:mc="http://schemas.openxmlformats.org/markup-compatibility/2006" xmlns:p14="http://schemas.microsoft.com/office/powerpoint/2010/main">
+    <mc:Choice Requires="p14">
       <p:transition p14:dur="250">
         <p:fade/>
       </p:transition>
     </mc:Choice>
-    <mc:Fallback>
+    <mc:Fallback xmlns="">
       <p:transition>
         <p:fade/>
       </p:transition>
@@ -12214,20 +12186,20 @@
     </p:spTree>
     <p:extLst>
       <p:ext uri="{BB962C8B-B14F-4D97-AF65-F5344CB8AC3E}">
-        <p14:creationId xmlns:p14="http://schemas.microsoft.com/office/powerpoint/2010/main" xmlns="" val="585023994"/>
+        <p14:creationId xmlns:p14="http://schemas.microsoft.com/office/powerpoint/2010/main" val="585023994"/>
       </p:ext>
     </p:extLst>
   </p:cSld>
   <p:clrMapOvr>
     <a:masterClrMapping/>
   </p:clrMapOvr>
-  <mc:AlternateContent xmlns:mc="http://schemas.openxmlformats.org/markup-compatibility/2006">
-    <mc:Choice xmlns:p14="http://schemas.microsoft.com/office/powerpoint/2010/main" xmlns="" Requires="p14">
+  <mc:AlternateContent xmlns:mc="http://schemas.openxmlformats.org/markup-compatibility/2006" xmlns:p14="http://schemas.microsoft.com/office/powerpoint/2010/main">
+    <mc:Choice Requires="p14">
       <p:transition p14:dur="250">
         <p:fade/>
       </p:transition>
     </mc:Choice>
-    <mc:Fallback>
+    <mc:Fallback xmlns="">
       <p:transition>
         <p:fade/>
       </p:transition>
@@ -12693,20 +12665,20 @@
     </p:spTree>
     <p:extLst>
       <p:ext uri="{BB962C8B-B14F-4D97-AF65-F5344CB8AC3E}">
-        <p14:creationId xmlns:p14="http://schemas.microsoft.com/office/powerpoint/2010/main" xmlns="" val="585023994"/>
+        <p14:creationId xmlns:p14="http://schemas.microsoft.com/office/powerpoint/2010/main" val="585023994"/>
       </p:ext>
     </p:extLst>
   </p:cSld>
   <p:clrMapOvr>
     <a:masterClrMapping/>
   </p:clrMapOvr>
-  <mc:AlternateContent xmlns:mc="http://schemas.openxmlformats.org/markup-compatibility/2006">
-    <mc:Choice xmlns:p14="http://schemas.microsoft.com/office/powerpoint/2010/main" xmlns="" Requires="p14">
+  <mc:AlternateContent xmlns:mc="http://schemas.openxmlformats.org/markup-compatibility/2006" xmlns:p14="http://schemas.microsoft.com/office/powerpoint/2010/main">
+    <mc:Choice Requires="p14">
       <p:transition p14:dur="250">
         <p:fade/>
       </p:transition>
     </mc:Choice>
-    <mc:Fallback>
+    <mc:Fallback xmlns="">
       <p:transition>
         <p:fade/>
       </p:transition>
@@ -12808,7 +12780,7 @@
           <a:blip r:embed="rId2" cstate="print">
             <a:extLst>
               <a:ext uri="{28A0092B-C50C-407E-A947-70E740481C1C}">
-                <a14:useLocalDpi xmlns:a14="http://schemas.microsoft.com/office/drawing/2010/main" xmlns="" val="0"/>
+                <a14:useLocalDpi xmlns:a14="http://schemas.microsoft.com/office/drawing/2010/main" val="0"/>
               </a:ext>
             </a:extLst>
           </a:blip>
@@ -12891,20 +12863,20 @@
     </p:spTree>
     <p:extLst>
       <p:ext uri="{BB962C8B-B14F-4D97-AF65-F5344CB8AC3E}">
-        <p14:creationId xmlns:p14="http://schemas.microsoft.com/office/powerpoint/2010/main" xmlns="" val="3425622471"/>
+        <p14:creationId xmlns:p14="http://schemas.microsoft.com/office/powerpoint/2010/main" val="3425622471"/>
       </p:ext>
     </p:extLst>
   </p:cSld>
   <p:clrMapOvr>
     <a:masterClrMapping/>
   </p:clrMapOvr>
-  <mc:AlternateContent xmlns:mc="http://schemas.openxmlformats.org/markup-compatibility/2006">
-    <mc:Choice xmlns:p14="http://schemas.microsoft.com/office/powerpoint/2010/main" xmlns="" Requires="p14">
+  <mc:AlternateContent xmlns:mc="http://schemas.openxmlformats.org/markup-compatibility/2006" xmlns:p14="http://schemas.microsoft.com/office/powerpoint/2010/main">
+    <mc:Choice Requires="p14">
       <p:transition p14:dur="250">
         <p:fade/>
       </p:transition>
     </mc:Choice>
-    <mc:Fallback>
+    <mc:Fallback xmlns="">
       <p:transition>
         <p:fade/>
       </p:transition>
@@ -13372,20 +13344,20 @@
     </p:spTree>
     <p:extLst>
       <p:ext uri="{BB962C8B-B14F-4D97-AF65-F5344CB8AC3E}">
-        <p14:creationId xmlns:p14="http://schemas.microsoft.com/office/powerpoint/2010/main" xmlns="" val="585023994"/>
+        <p14:creationId xmlns:p14="http://schemas.microsoft.com/office/powerpoint/2010/main" val="585023994"/>
       </p:ext>
     </p:extLst>
   </p:cSld>
   <p:clrMapOvr>
     <a:masterClrMapping/>
   </p:clrMapOvr>
-  <mc:AlternateContent xmlns:mc="http://schemas.openxmlformats.org/markup-compatibility/2006">
-    <mc:Choice xmlns:p14="http://schemas.microsoft.com/office/powerpoint/2010/main" xmlns="" Requires="p14">
+  <mc:AlternateContent xmlns:mc="http://schemas.openxmlformats.org/markup-compatibility/2006" xmlns:p14="http://schemas.microsoft.com/office/powerpoint/2010/main">
+    <mc:Choice Requires="p14">
       <p:transition p14:dur="250">
         <p:fade/>
       </p:transition>
     </mc:Choice>
-    <mc:Fallback>
+    <mc:Fallback xmlns="">
       <p:transition>
         <p:fade/>
       </p:transition>
@@ -13830,20 +13802,20 @@
     </p:spTree>
     <p:extLst>
       <p:ext uri="{BB962C8B-B14F-4D97-AF65-F5344CB8AC3E}">
-        <p14:creationId xmlns:p14="http://schemas.microsoft.com/office/powerpoint/2010/main" xmlns="" val="585023994"/>
+        <p14:creationId xmlns:p14="http://schemas.microsoft.com/office/powerpoint/2010/main" val="585023994"/>
       </p:ext>
     </p:extLst>
   </p:cSld>
   <p:clrMapOvr>
     <a:masterClrMapping/>
   </p:clrMapOvr>
-  <mc:AlternateContent xmlns:mc="http://schemas.openxmlformats.org/markup-compatibility/2006">
-    <mc:Choice xmlns:p14="http://schemas.microsoft.com/office/powerpoint/2010/main" xmlns="" Requires="p14">
+  <mc:AlternateContent xmlns:mc="http://schemas.openxmlformats.org/markup-compatibility/2006" xmlns:p14="http://schemas.microsoft.com/office/powerpoint/2010/main">
+    <mc:Choice Requires="p14">
       <p:transition p14:dur="250">
         <p:fade/>
       </p:transition>
     </mc:Choice>
-    <mc:Fallback>
+    <mc:Fallback xmlns="">
       <p:transition>
         <p:fade/>
       </p:transition>

</xml_diff>

<commit_message>
nu med stack animation
</commit_message>
<xml_diff>
--- a/slides/main.pptx
+++ b/slides/main.pptx
@@ -24,14 +24,15 @@
     <p:sldId id="297" r:id="rId18"/>
     <p:sldId id="304" r:id="rId19"/>
     <p:sldId id="300" r:id="rId20"/>
-    <p:sldId id="303" r:id="rId21"/>
-    <p:sldId id="282" r:id="rId22"/>
-    <p:sldId id="301" r:id="rId23"/>
-    <p:sldId id="305" r:id="rId24"/>
-    <p:sldId id="302" r:id="rId25"/>
-    <p:sldId id="284" r:id="rId26"/>
-    <p:sldId id="280" r:id="rId27"/>
-    <p:sldId id="285" r:id="rId28"/>
+    <p:sldId id="306" r:id="rId21"/>
+    <p:sldId id="303" r:id="rId22"/>
+    <p:sldId id="282" r:id="rId23"/>
+    <p:sldId id="301" r:id="rId24"/>
+    <p:sldId id="305" r:id="rId25"/>
+    <p:sldId id="302" r:id="rId26"/>
+    <p:sldId id="284" r:id="rId27"/>
+    <p:sldId id="280" r:id="rId28"/>
+    <p:sldId id="285" r:id="rId29"/>
   </p:sldIdLst>
   <p:sldSz cx="9144000" cy="6858000" type="screen4x3"/>
   <p:notesSz cx="6858000" cy="9144000"/>
@@ -315,7 +316,7 @@
             <a:fld id="{5ADA3B83-9FAA-490E-9199-5F3FD89CBF95}" type="datetimeFigureOut">
               <a:rPr lang="da-DK" smtClean="0"/>
               <a:pPr/>
-              <a:t>mandag 24 jun</a:t>
+              <a:t>tirsdag 25 jun</a:t>
             </a:fld>
             <a:endParaRPr lang="da-DK"/>
           </a:p>
@@ -482,7 +483,7 @@
             <a:fld id="{5ADA3B83-9FAA-490E-9199-5F3FD89CBF95}" type="datetimeFigureOut">
               <a:rPr lang="da-DK" smtClean="0"/>
               <a:pPr/>
-              <a:t>mandag 24 jun</a:t>
+              <a:t>tirsdag 25 jun</a:t>
             </a:fld>
             <a:endParaRPr lang="da-DK"/>
           </a:p>
@@ -659,7 +660,7 @@
             <a:fld id="{5ADA3B83-9FAA-490E-9199-5F3FD89CBF95}" type="datetimeFigureOut">
               <a:rPr lang="da-DK" smtClean="0"/>
               <a:pPr/>
-              <a:t>mandag 24 jun</a:t>
+              <a:t>tirsdag 25 jun</a:t>
             </a:fld>
             <a:endParaRPr lang="da-DK"/>
           </a:p>
@@ -826,7 +827,7 @@
             <a:fld id="{17825FAC-110F-4E9C-A697-DFBD29A877EF}" type="datetimeFigureOut">
               <a:rPr lang="da-DK" smtClean="0"/>
               <a:pPr/>
-              <a:t>mandag 24 jun</a:t>
+              <a:t>tirsdag 25 jun</a:t>
             </a:fld>
             <a:endParaRPr lang="da-DK"/>
           </a:p>
@@ -878,7 +879,7 @@
     </p:spTree>
     <p:extLst>
       <p:ext uri="{BB962C8B-B14F-4D97-AF65-F5344CB8AC3E}">
-        <p14:creationId xmlns:p14="http://schemas.microsoft.com/office/powerpoint/2010/main" xmlns="" val="2128366257"/>
+        <p14:creationId xmlns="" xmlns:p14="http://schemas.microsoft.com/office/powerpoint/2010/main" val="2128366257"/>
       </p:ext>
     </p:extLst>
   </p:cSld>
@@ -908,7 +909,7 @@
     </p:spTree>
     <p:extLst>
       <p:ext uri="{BB962C8B-B14F-4D97-AF65-F5344CB8AC3E}">
-        <p14:creationId xmlns:p14="http://schemas.microsoft.com/office/powerpoint/2010/main" xmlns="" val="195677046"/>
+        <p14:creationId xmlns="" xmlns:p14="http://schemas.microsoft.com/office/powerpoint/2010/main" val="195677046"/>
       </p:ext>
     </p:extLst>
   </p:cSld>
@@ -938,7 +939,7 @@
     </p:spTree>
     <p:extLst>
       <p:ext uri="{BB962C8B-B14F-4D97-AF65-F5344CB8AC3E}">
-        <p14:creationId xmlns:p14="http://schemas.microsoft.com/office/powerpoint/2010/main" xmlns="" val="1997685105"/>
+        <p14:creationId xmlns="" xmlns:p14="http://schemas.microsoft.com/office/powerpoint/2010/main" val="1997685105"/>
       </p:ext>
     </p:extLst>
   </p:cSld>
@@ -1159,7 +1160,7 @@
             <a:fld id="{5ADA3B83-9FAA-490E-9199-5F3FD89CBF95}" type="datetimeFigureOut">
               <a:rPr lang="da-DK" smtClean="0"/>
               <a:pPr/>
-              <a:t>mandag 24 jun</a:t>
+              <a:t>tirsdag 25 jun</a:t>
             </a:fld>
             <a:endParaRPr lang="da-DK"/>
           </a:p>
@@ -1444,7 +1445,7 @@
             <a:fld id="{5ADA3B83-9FAA-490E-9199-5F3FD89CBF95}" type="datetimeFigureOut">
               <a:rPr lang="da-DK" smtClean="0"/>
               <a:pPr/>
-              <a:t>mandag 24 jun</a:t>
+              <a:t>tirsdag 25 jun</a:t>
             </a:fld>
             <a:endParaRPr lang="da-DK"/>
           </a:p>
@@ -1863,7 +1864,7 @@
             <a:fld id="{5ADA3B83-9FAA-490E-9199-5F3FD89CBF95}" type="datetimeFigureOut">
               <a:rPr lang="da-DK" smtClean="0"/>
               <a:pPr/>
-              <a:t>mandag 24 jun</a:t>
+              <a:t>tirsdag 25 jun</a:t>
             </a:fld>
             <a:endParaRPr lang="da-DK"/>
           </a:p>
@@ -1978,7 +1979,7 @@
             <a:fld id="{5ADA3B83-9FAA-490E-9199-5F3FD89CBF95}" type="datetimeFigureOut">
               <a:rPr lang="da-DK" smtClean="0"/>
               <a:pPr/>
-              <a:t>mandag 24 jun</a:t>
+              <a:t>tirsdag 25 jun</a:t>
             </a:fld>
             <a:endParaRPr lang="da-DK"/>
           </a:p>
@@ -2070,7 +2071,7 @@
             <a:fld id="{5ADA3B83-9FAA-490E-9199-5F3FD89CBF95}" type="datetimeFigureOut">
               <a:rPr lang="da-DK" smtClean="0"/>
               <a:pPr/>
-              <a:t>mandag 24 jun</a:t>
+              <a:t>tirsdag 25 jun</a:t>
             </a:fld>
             <a:endParaRPr lang="da-DK"/>
           </a:p>
@@ -2344,7 +2345,7 @@
             <a:fld id="{5ADA3B83-9FAA-490E-9199-5F3FD89CBF95}" type="datetimeFigureOut">
               <a:rPr lang="da-DK" smtClean="0"/>
               <a:pPr/>
-              <a:t>mandag 24 jun</a:t>
+              <a:t>tirsdag 25 jun</a:t>
             </a:fld>
             <a:endParaRPr lang="da-DK"/>
           </a:p>
@@ -2594,7 +2595,7 @@
             <a:fld id="{5ADA3B83-9FAA-490E-9199-5F3FD89CBF95}" type="datetimeFigureOut">
               <a:rPr lang="da-DK" smtClean="0"/>
               <a:pPr/>
-              <a:t>mandag 24 jun</a:t>
+              <a:t>tirsdag 25 jun</a:t>
             </a:fld>
             <a:endParaRPr lang="da-DK"/>
           </a:p>
@@ -2804,7 +2805,7 @@
             <a:fld id="{5ADA3B83-9FAA-490E-9199-5F3FD89CBF95}" type="datetimeFigureOut">
               <a:rPr lang="da-DK" smtClean="0"/>
               <a:pPr/>
-              <a:t>mandag 24 jun</a:t>
+              <a:t>tirsdag 25 jun</a:t>
             </a:fld>
             <a:endParaRPr lang="da-DK"/>
           </a:p>
@@ -3190,7 +3191,7 @@
           <a:blip r:embed="rId2" cstate="print">
             <a:extLst>
               <a:ext uri="{28A0092B-C50C-407E-A947-70E740481C1C}">
-                <a14:useLocalDpi xmlns:a14="http://schemas.microsoft.com/office/drawing/2010/main" xmlns="" val="0"/>
+                <a14:useLocalDpi xmlns="" xmlns:a14="http://schemas.microsoft.com/office/drawing/2010/main" val="0"/>
               </a:ext>
             </a:extLst>
           </a:blip>
@@ -3274,7 +3275,7 @@
           <a:blip r:embed="rId3" cstate="print">
             <a:extLst>
               <a:ext uri="{28A0092B-C50C-407E-A947-70E740481C1C}">
-                <a14:useLocalDpi xmlns:a14="http://schemas.microsoft.com/office/drawing/2010/main" xmlns="" val="0"/>
+                <a14:useLocalDpi xmlns="" xmlns:a14="http://schemas.microsoft.com/office/drawing/2010/main" val="0"/>
               </a:ext>
             </a:extLst>
           </a:blip>
@@ -3579,7 +3580,7 @@
     <a:masterClrMapping/>
   </p:clrMapOvr>
   <mc:AlternateContent xmlns:mc="http://schemas.openxmlformats.org/markup-compatibility/2006">
-    <mc:Choice xmlns:p14="http://schemas.microsoft.com/office/powerpoint/2010/main" xmlns="" Requires="p14">
+    <mc:Choice xmlns="" xmlns:p14="http://schemas.microsoft.com/office/powerpoint/2010/main" Requires="p14">
       <p:transition p14:dur="250">
         <p:fade/>
       </p:transition>
@@ -3954,7 +3955,7 @@
     </p:spTree>
     <p:extLst>
       <p:ext uri="{BB962C8B-B14F-4D97-AF65-F5344CB8AC3E}">
-        <p14:creationId xmlns:p14="http://schemas.microsoft.com/office/powerpoint/2010/main" xmlns="" val="585023994"/>
+        <p14:creationId xmlns="" xmlns:p14="http://schemas.microsoft.com/office/powerpoint/2010/main" val="585023994"/>
       </p:ext>
     </p:extLst>
   </p:cSld>
@@ -3962,7 +3963,7 @@
     <a:masterClrMapping/>
   </p:clrMapOvr>
   <mc:AlternateContent xmlns:mc="http://schemas.openxmlformats.org/markup-compatibility/2006">
-    <mc:Choice xmlns:p14="http://schemas.microsoft.com/office/powerpoint/2010/main" xmlns="" Requires="p14">
+    <mc:Choice xmlns="" xmlns:p14="http://schemas.microsoft.com/office/powerpoint/2010/main" Requires="p14">
       <p:transition p14:dur="250">
         <p:fade/>
       </p:transition>
@@ -4484,7 +4485,7 @@
     </p:spTree>
     <p:extLst>
       <p:ext uri="{BB962C8B-B14F-4D97-AF65-F5344CB8AC3E}">
-        <p14:creationId xmlns:p14="http://schemas.microsoft.com/office/powerpoint/2010/main" xmlns="" val="585023994"/>
+        <p14:creationId xmlns="" xmlns:p14="http://schemas.microsoft.com/office/powerpoint/2010/main" val="585023994"/>
       </p:ext>
     </p:extLst>
   </p:cSld>
@@ -4492,7 +4493,7 @@
     <a:masterClrMapping/>
   </p:clrMapOvr>
   <mc:AlternateContent xmlns:mc="http://schemas.openxmlformats.org/markup-compatibility/2006">
-    <mc:Choice xmlns:p14="http://schemas.microsoft.com/office/powerpoint/2010/main" xmlns="" Requires="p14">
+    <mc:Choice xmlns="" xmlns:p14="http://schemas.microsoft.com/office/powerpoint/2010/main" Requires="p14">
       <p:transition p14:dur="250">
         <p:fade/>
       </p:transition>
@@ -4882,7 +4883,7 @@
     </p:spTree>
     <p:extLst>
       <p:ext uri="{BB962C8B-B14F-4D97-AF65-F5344CB8AC3E}">
-        <p14:creationId xmlns:p14="http://schemas.microsoft.com/office/powerpoint/2010/main" xmlns="" val="585023994"/>
+        <p14:creationId xmlns="" xmlns:p14="http://schemas.microsoft.com/office/powerpoint/2010/main" val="585023994"/>
       </p:ext>
     </p:extLst>
   </p:cSld>
@@ -4890,7 +4891,7 @@
     <a:masterClrMapping/>
   </p:clrMapOvr>
   <mc:AlternateContent xmlns:mc="http://schemas.openxmlformats.org/markup-compatibility/2006">
-    <mc:Choice xmlns:p14="http://schemas.microsoft.com/office/powerpoint/2010/main" xmlns="" Requires="p14">
+    <mc:Choice xmlns="" xmlns:p14="http://schemas.microsoft.com/office/powerpoint/2010/main" Requires="p14">
       <p:transition p14:dur="250">
         <p:fade/>
       </p:transition>
@@ -4997,7 +4998,7 @@
           <a:blip r:embed="rId2" cstate="print">
             <a:extLst>
               <a:ext uri="{28A0092B-C50C-407E-A947-70E740481C1C}">
-                <a14:useLocalDpi xmlns:a14="http://schemas.microsoft.com/office/drawing/2010/main" xmlns="" val="0"/>
+                <a14:useLocalDpi xmlns="" xmlns:a14="http://schemas.microsoft.com/office/drawing/2010/main" val="0"/>
               </a:ext>
             </a:extLst>
           </a:blip>
@@ -5104,7 +5105,7 @@
     </p:spTree>
     <p:extLst>
       <p:ext uri="{BB962C8B-B14F-4D97-AF65-F5344CB8AC3E}">
-        <p14:creationId xmlns:p14="http://schemas.microsoft.com/office/powerpoint/2010/main" xmlns="" val="3425622471"/>
+        <p14:creationId xmlns="" xmlns:p14="http://schemas.microsoft.com/office/powerpoint/2010/main" val="3425622471"/>
       </p:ext>
     </p:extLst>
   </p:cSld>
@@ -5112,7 +5113,7 @@
     <a:masterClrMapping/>
   </p:clrMapOvr>
   <mc:AlternateContent xmlns:mc="http://schemas.openxmlformats.org/markup-compatibility/2006">
-    <mc:Choice xmlns:p14="http://schemas.microsoft.com/office/powerpoint/2010/main" xmlns="" Requires="p14">
+    <mc:Choice xmlns="" xmlns:p14="http://schemas.microsoft.com/office/powerpoint/2010/main" Requires="p14">
       <p:transition p14:dur="250">
         <p:fade/>
       </p:transition>
@@ -5265,19 +5266,7 @@
                 <a:latin typeface="Arial"/>
                 <a:cs typeface="Arial"/>
               </a:rPr>
-              <a:t> </a:t>
-            </a:r>
-            <a:r>
-              <a:rPr lang="en-GB" b="1" cap="all" spc="200" dirty="0" smtClean="0">
-                <a:solidFill>
-                  <a:schemeClr val="accent1">
-                    <a:lumMod val="75000"/>
-                  </a:schemeClr>
-                </a:solidFill>
-                <a:latin typeface="Arial"/>
-                <a:cs typeface="Arial"/>
-              </a:rPr>
-              <a:t>Surface View</a:t>
+              <a:t> Surface View</a:t>
             </a:r>
           </a:p>
           <a:p>
@@ -5563,7 +5552,7 @@
     </p:spTree>
     <p:extLst>
       <p:ext uri="{BB962C8B-B14F-4D97-AF65-F5344CB8AC3E}">
-        <p14:creationId xmlns:p14="http://schemas.microsoft.com/office/powerpoint/2010/main" xmlns="" val="585023994"/>
+        <p14:creationId xmlns="" xmlns:p14="http://schemas.microsoft.com/office/powerpoint/2010/main" val="585023994"/>
       </p:ext>
     </p:extLst>
   </p:cSld>
@@ -5571,7 +5560,7 @@
     <a:masterClrMapping/>
   </p:clrMapOvr>
   <mc:AlternateContent xmlns:mc="http://schemas.openxmlformats.org/markup-compatibility/2006">
-    <mc:Choice xmlns:p14="http://schemas.microsoft.com/office/powerpoint/2010/main" xmlns="" Requires="p14">
+    <mc:Choice xmlns="" xmlns:p14="http://schemas.microsoft.com/office/powerpoint/2010/main" Requires="p14">
       <p:transition p14:dur="250">
         <p:fade/>
       </p:transition>
@@ -5961,7 +5950,7 @@
     </p:spTree>
     <p:extLst>
       <p:ext uri="{BB962C8B-B14F-4D97-AF65-F5344CB8AC3E}">
-        <p14:creationId xmlns:p14="http://schemas.microsoft.com/office/powerpoint/2010/main" xmlns="" val="585023994"/>
+        <p14:creationId xmlns="" xmlns:p14="http://schemas.microsoft.com/office/powerpoint/2010/main" val="585023994"/>
       </p:ext>
     </p:extLst>
   </p:cSld>
@@ -5969,7 +5958,7 @@
     <a:masterClrMapping/>
   </p:clrMapOvr>
   <mc:AlternateContent xmlns:mc="http://schemas.openxmlformats.org/markup-compatibility/2006">
-    <mc:Choice xmlns:p14="http://schemas.microsoft.com/office/powerpoint/2010/main" xmlns="" Requires="p14">
+    <mc:Choice xmlns="" xmlns:p14="http://schemas.microsoft.com/office/powerpoint/2010/main" Requires="p14">
       <p:transition p14:dur="250">
         <p:fade/>
       </p:transition>
@@ -6399,7 +6388,7 @@
     </p:spTree>
     <p:extLst>
       <p:ext uri="{BB962C8B-B14F-4D97-AF65-F5344CB8AC3E}">
-        <p14:creationId xmlns:p14="http://schemas.microsoft.com/office/powerpoint/2010/main" xmlns="" val="585023994"/>
+        <p14:creationId xmlns="" xmlns:p14="http://schemas.microsoft.com/office/powerpoint/2010/main" val="585023994"/>
       </p:ext>
     </p:extLst>
   </p:cSld>
@@ -6407,7 +6396,7 @@
     <a:masterClrMapping/>
   </p:clrMapOvr>
   <mc:AlternateContent xmlns:mc="http://schemas.openxmlformats.org/markup-compatibility/2006">
-    <mc:Choice xmlns:p14="http://schemas.microsoft.com/office/powerpoint/2010/main" xmlns="" Requires="p14">
+    <mc:Choice xmlns="" xmlns:p14="http://schemas.microsoft.com/office/powerpoint/2010/main" Requires="p14">
       <p:transition p14:dur="250">
         <p:fade/>
       </p:transition>
@@ -6858,8 +6847,10 @@
                 <a:latin typeface="Arial" pitchFamily="34" charset="0"/>
                 <a:cs typeface="Arial" pitchFamily="34" charset="0"/>
               </a:rPr>
-              <a:t>Texture: 396 </a:t>
-            </a:r>
+              <a:t>Texture: 396 x 284</a:t>
+            </a:r>
+          </a:p>
+          <a:p>
             <a:r>
               <a:rPr lang="en-GB" sz="1400" dirty="0" smtClean="0">
                 <a:solidFill>
@@ -6870,43 +6861,8 @@
                 <a:latin typeface="Arial" pitchFamily="34" charset="0"/>
                 <a:cs typeface="Arial" pitchFamily="34" charset="0"/>
               </a:rPr>
-              <a:t>x </a:t>
-            </a:r>
-            <a:r>
-              <a:rPr lang="en-GB" sz="1400" dirty="0" smtClean="0">
-                <a:solidFill>
-                  <a:schemeClr val="accent1">
-                    <a:lumMod val="75000"/>
-                  </a:schemeClr>
-                </a:solidFill>
-                <a:latin typeface="Arial" pitchFamily="34" charset="0"/>
-                <a:cs typeface="Arial" pitchFamily="34" charset="0"/>
-              </a:rPr>
-              <a:t>284</a:t>
-            </a:r>
-          </a:p>
-          <a:p>
-            <a:r>
-              <a:rPr lang="en-GB" sz="1400" dirty="0" smtClean="0">
-                <a:solidFill>
-                  <a:schemeClr val="accent1">
-                    <a:lumMod val="75000"/>
-                  </a:schemeClr>
-                </a:solidFill>
-                <a:latin typeface="Arial" pitchFamily="34" charset="0"/>
-                <a:cs typeface="Arial" pitchFamily="34" charset="0"/>
-              </a:rPr>
               <a:t>Square: 396 x 284</a:t>
             </a:r>
-            <a:endParaRPr lang="en-GB" sz="1400" dirty="0" smtClean="0">
-              <a:solidFill>
-                <a:schemeClr val="accent1">
-                  <a:lumMod val="75000"/>
-                </a:schemeClr>
-              </a:solidFill>
-              <a:latin typeface="Arial" pitchFamily="34" charset="0"/>
-              <a:cs typeface="Arial" pitchFamily="34" charset="0"/>
-            </a:endParaRPr>
           </a:p>
           <a:p>
             <a:endParaRPr lang="da-DK" sz="1400" dirty="0">
@@ -7052,7 +7008,7 @@
     </p:spTree>
     <p:extLst>
       <p:ext uri="{BB962C8B-B14F-4D97-AF65-F5344CB8AC3E}">
-        <p14:creationId xmlns:p14="http://schemas.microsoft.com/office/powerpoint/2010/main" xmlns="" val="585023994"/>
+        <p14:creationId xmlns="" xmlns:p14="http://schemas.microsoft.com/office/powerpoint/2010/main" val="585023994"/>
       </p:ext>
     </p:extLst>
   </p:cSld>
@@ -7060,7 +7016,7 @@
     <a:masterClrMapping/>
   </p:clrMapOvr>
   <mc:AlternateContent xmlns:mc="http://schemas.openxmlformats.org/markup-compatibility/2006">
-    <mc:Choice xmlns:p14="http://schemas.microsoft.com/office/powerpoint/2010/main" xmlns="" Requires="p14">
+    <mc:Choice xmlns="" xmlns:p14="http://schemas.microsoft.com/office/powerpoint/2010/main" Requires="p14">
       <p:transition p14:dur="250">
         <p:fade/>
       </p:transition>
@@ -7593,8 +7549,10 @@
                 <a:latin typeface="Arial" pitchFamily="34" charset="0"/>
                 <a:cs typeface="Arial" pitchFamily="34" charset="0"/>
               </a:rPr>
-              <a:t>Texture: 512 </a:t>
-            </a:r>
+              <a:t>Texture: 512 x 512</a:t>
+            </a:r>
+          </a:p>
+          <a:p>
             <a:r>
               <a:rPr lang="en-GB" sz="1400" dirty="0" smtClean="0">
                 <a:solidFill>
@@ -7605,52 +7563,8 @@
                 <a:latin typeface="Arial" pitchFamily="34" charset="0"/>
                 <a:cs typeface="Arial" pitchFamily="34" charset="0"/>
               </a:rPr>
-              <a:t>x </a:t>
-            </a:r>
-            <a:r>
-              <a:rPr lang="en-GB" sz="1400" dirty="0" smtClean="0">
-                <a:solidFill>
-                  <a:schemeClr val="accent1">
-                    <a:lumMod val="75000"/>
-                  </a:schemeClr>
-                </a:solidFill>
-                <a:latin typeface="Arial" pitchFamily="34" charset="0"/>
-                <a:cs typeface="Arial" pitchFamily="34" charset="0"/>
-              </a:rPr>
-              <a:t>512</a:t>
-            </a:r>
-            <a:endParaRPr lang="en-GB" sz="1400" dirty="0" smtClean="0">
-              <a:solidFill>
-                <a:schemeClr val="accent1">
-                  <a:lumMod val="75000"/>
-                </a:schemeClr>
-              </a:solidFill>
-              <a:latin typeface="Arial" pitchFamily="34" charset="0"/>
-              <a:cs typeface="Arial" pitchFamily="34" charset="0"/>
-            </a:endParaRPr>
-          </a:p>
-          <a:p>
-            <a:r>
-              <a:rPr lang="en-GB" sz="1400" dirty="0" smtClean="0">
-                <a:solidFill>
-                  <a:schemeClr val="accent1">
-                    <a:lumMod val="75000"/>
-                  </a:schemeClr>
-                </a:solidFill>
-                <a:latin typeface="Arial" pitchFamily="34" charset="0"/>
-                <a:cs typeface="Arial" pitchFamily="34" charset="0"/>
-              </a:rPr>
               <a:t>Square: 396 x 284</a:t>
             </a:r>
-            <a:endParaRPr lang="en-GB" sz="1400" dirty="0" smtClean="0">
-              <a:solidFill>
-                <a:schemeClr val="accent1">
-                  <a:lumMod val="75000"/>
-                </a:schemeClr>
-              </a:solidFill>
-              <a:latin typeface="Arial" pitchFamily="34" charset="0"/>
-              <a:cs typeface="Arial" pitchFamily="34" charset="0"/>
-            </a:endParaRPr>
           </a:p>
           <a:p>
             <a:endParaRPr lang="da-DK" sz="1400" dirty="0">
@@ -7697,8 +7611,10 @@
                 <a:latin typeface="Arial" pitchFamily="34" charset="0"/>
                 <a:cs typeface="Arial" pitchFamily="34" charset="0"/>
               </a:rPr>
-              <a:t>Texture: 512 </a:t>
-            </a:r>
+              <a:t>Texture: 512 x 512</a:t>
+            </a:r>
+          </a:p>
+          <a:p>
             <a:r>
               <a:rPr lang="en-GB" sz="1400" dirty="0" smtClean="0">
                 <a:solidFill>
@@ -7709,59 +7625,15 @@
                 <a:latin typeface="Arial" pitchFamily="34" charset="0"/>
                 <a:cs typeface="Arial" pitchFamily="34" charset="0"/>
               </a:rPr>
-              <a:t>x </a:t>
-            </a:r>
-            <a:r>
-              <a:rPr lang="en-GB" sz="1400" dirty="0" smtClean="0">
-                <a:solidFill>
-                  <a:schemeClr val="accent1">
-                    <a:lumMod val="75000"/>
-                  </a:schemeClr>
-                </a:solidFill>
-                <a:latin typeface="Arial" pitchFamily="34" charset="0"/>
-                <a:cs typeface="Arial" pitchFamily="34" charset="0"/>
-              </a:rPr>
-              <a:t>512</a:t>
-            </a:r>
-            <a:endParaRPr lang="en-GB" sz="1400" dirty="0" smtClean="0">
-              <a:solidFill>
-                <a:schemeClr val="accent1">
-                  <a:lumMod val="75000"/>
-                </a:schemeClr>
-              </a:solidFill>
-              <a:latin typeface="Arial" pitchFamily="34" charset="0"/>
-              <a:cs typeface="Arial" pitchFamily="34" charset="0"/>
-            </a:endParaRPr>
-          </a:p>
-          <a:p>
-            <a:r>
-              <a:rPr lang="en-GB" sz="1400" dirty="0" smtClean="0">
-                <a:solidFill>
-                  <a:schemeClr val="accent1">
-                    <a:lumMod val="75000"/>
-                  </a:schemeClr>
-                </a:solidFill>
-                <a:latin typeface="Arial" pitchFamily="34" charset="0"/>
-                <a:cs typeface="Arial" pitchFamily="34" charset="0"/>
-              </a:rPr>
               <a:t>Square: 396 x 284</a:t>
             </a:r>
-            <a:endParaRPr lang="en-GB" sz="1400" dirty="0" smtClean="0">
-              <a:solidFill>
-                <a:schemeClr val="accent1">
-                  <a:lumMod val="75000"/>
-                </a:schemeClr>
-              </a:solidFill>
-              <a:latin typeface="Arial" pitchFamily="34" charset="0"/>
-              <a:cs typeface="Arial" pitchFamily="34" charset="0"/>
-            </a:endParaRPr>
           </a:p>
         </p:txBody>
       </p:sp>
     </p:spTree>
     <p:extLst>
       <p:ext uri="{BB962C8B-B14F-4D97-AF65-F5344CB8AC3E}">
-        <p14:creationId xmlns:p14="http://schemas.microsoft.com/office/powerpoint/2010/main" xmlns="" val="585023994"/>
+        <p14:creationId xmlns="" xmlns:p14="http://schemas.microsoft.com/office/powerpoint/2010/main" val="585023994"/>
       </p:ext>
     </p:extLst>
   </p:cSld>
@@ -7769,7 +7641,7 @@
     <a:masterClrMapping/>
   </p:clrMapOvr>
   <mc:AlternateContent xmlns:mc="http://schemas.openxmlformats.org/markup-compatibility/2006">
-    <mc:Choice xmlns:p14="http://schemas.microsoft.com/office/powerpoint/2010/main" xmlns="" Requires="p14">
+    <mc:Choice xmlns="" xmlns:p14="http://schemas.microsoft.com/office/powerpoint/2010/main" Requires="p14">
       <p:transition p14:dur="250">
         <p:fade/>
       </p:transition>
@@ -7908,7 +7780,7 @@
               </a:lnSpc>
             </a:pPr>
             <a:r>
-              <a:rPr lang="en-GB" sz="1200" spc="200" dirty="0" smtClean="0">
+              <a:rPr lang="en-GB" sz="1400" spc="200" dirty="0" smtClean="0">
                 <a:solidFill>
                   <a:schemeClr val="accent1">
                     <a:lumMod val="75000"/>
@@ -7917,19 +7789,7 @@
                 <a:latin typeface="Arial"/>
                 <a:cs typeface="Arial"/>
               </a:rPr>
-              <a:t>M</a:t>
-            </a:r>
-            <a:r>
-              <a:rPr lang="en-GB" sz="1400" spc="200" dirty="0" smtClean="0">
-                <a:solidFill>
-                  <a:schemeClr val="accent1">
-                    <a:lumMod val="75000"/>
-                  </a:schemeClr>
-                </a:solidFill>
-                <a:latin typeface="Arial"/>
-                <a:cs typeface="Arial"/>
-              </a:rPr>
-              <a:t>ATRIX STACK</a:t>
+              <a:t>MATRIX STACK</a:t>
             </a:r>
           </a:p>
           <a:p>
@@ -8207,7 +8067,7 @@
         </p:blipFill>
         <p:spPr bwMode="auto">
           <a:xfrm>
-            <a:off x="1475656" y="2204864"/>
+            <a:off x="2170630" y="2204864"/>
             <a:ext cx="6073778" cy="2664296"/>
           </a:xfrm>
           <a:prstGeom prst="rect">
@@ -8216,10 +8076,42 @@
           <a:noFill/>
         </p:spPr>
       </p:pic>
+      <p:pic>
+        <p:nvPicPr>
+          <p:cNvPr id="1026" name="Picture 2"/>
+          <p:cNvPicPr>
+            <a:picLocks noChangeAspect="1" noChangeArrowheads="1"/>
+          </p:cNvPicPr>
+          <p:nvPr/>
+        </p:nvPicPr>
+        <p:blipFill>
+          <a:blip r:embed="rId3" cstate="print"/>
+          <a:srcRect/>
+          <a:stretch>
+            <a:fillRect/>
+          </a:stretch>
+        </p:blipFill>
+        <p:spPr bwMode="auto">
+          <a:xfrm>
+            <a:off x="611560" y="2276872"/>
+            <a:ext cx="936104" cy="1398077"/>
+          </a:xfrm>
+          <a:prstGeom prst="rect">
+            <a:avLst/>
+          </a:prstGeom>
+          <a:noFill/>
+          <a:ln w="9525">
+            <a:noFill/>
+            <a:miter lim="800000"/>
+            <a:headEnd/>
+            <a:tailEnd/>
+          </a:ln>
+        </p:spPr>
+      </p:pic>
     </p:spTree>
     <p:extLst>
       <p:ext uri="{BB962C8B-B14F-4D97-AF65-F5344CB8AC3E}">
-        <p14:creationId xmlns:p14="http://schemas.microsoft.com/office/powerpoint/2010/main" xmlns="" val="585023994"/>
+        <p14:creationId xmlns="" xmlns:p14="http://schemas.microsoft.com/office/powerpoint/2010/main" val="585023994"/>
       </p:ext>
     </p:extLst>
   </p:cSld>
@@ -8227,7 +8119,7 @@
     <a:masterClrMapping/>
   </p:clrMapOvr>
   <mc:AlternateContent xmlns:mc="http://schemas.openxmlformats.org/markup-compatibility/2006">
-    <mc:Choice xmlns:p14="http://schemas.microsoft.com/office/powerpoint/2010/main" xmlns="" Requires="p14">
+    <mc:Choice xmlns="" xmlns:p14="http://schemas.microsoft.com/office/powerpoint/2010/main" Requires="p14">
       <p:transition p14:dur="250">
         <p:fade/>
       </p:transition>
@@ -8793,7 +8685,7 @@
     <a:masterClrMapping/>
   </p:clrMapOvr>
   <mc:AlternateContent xmlns:mc="http://schemas.openxmlformats.org/markup-compatibility/2006">
-    <mc:Choice xmlns:p14="http://schemas.microsoft.com/office/powerpoint/2010/main" xmlns="" Requires="p14">
+    <mc:Choice xmlns="" xmlns:p14="http://schemas.microsoft.com/office/powerpoint/2010/main" Requires="p14">
       <p:transition p14:dur="250">
         <p:fade/>
       </p:transition>
@@ -8872,12 +8764,113 @@
                 <a:latin typeface="Arial"/>
                 <a:cs typeface="Arial"/>
               </a:rPr>
-              <a:t>Rendering</a:t>
+              <a:t>Frustum</a:t>
             </a:r>
             <a:endParaRPr sz="2400" kern="0" cap="all" spc="200" dirty="0">
               <a:solidFill>
                 <a:schemeClr val="tx2">
                   <a:lumMod val="50000"/>
+                </a:schemeClr>
+              </a:solidFill>
+              <a:latin typeface="Arial"/>
+              <a:cs typeface="Arial"/>
+            </a:endParaRPr>
+          </a:p>
+        </p:txBody>
+      </p:sp>
+      <p:sp>
+        <p:nvSpPr>
+          <p:cNvPr id="3" name="object 3"/>
+          <p:cNvSpPr txBox="1"/>
+          <p:nvPr/>
+        </p:nvSpPr>
+        <p:spPr>
+          <a:xfrm>
+            <a:off x="626300" y="1155199"/>
+            <a:ext cx="5889916" cy="4074001"/>
+          </a:xfrm>
+          <a:prstGeom prst="rect">
+            <a:avLst/>
+          </a:prstGeom>
+        </p:spPr>
+        <p:txBody>
+          <a:bodyPr vert="horz" wrap="square" lIns="0" tIns="0" rIns="0" bIns="0" rtlCol="0">
+            <a:noAutofit/>
+          </a:bodyPr>
+          <a:lstStyle/>
+          <a:p>
+            <a:pPr marL="12700">
+              <a:lnSpc>
+                <a:spcPct val="100000"/>
+              </a:lnSpc>
+            </a:pPr>
+            <a:r>
+              <a:rPr lang="en-GB" b="1" spc="200" dirty="0" smtClean="0">
+                <a:solidFill>
+                  <a:schemeClr val="accent1">
+                    <a:lumMod val="75000"/>
+                  </a:schemeClr>
+                </a:solidFill>
+                <a:latin typeface="Arial"/>
+                <a:cs typeface="Arial"/>
+              </a:rPr>
+              <a:t>THREE-DIMENSIONAL SPACE</a:t>
+            </a:r>
+          </a:p>
+          <a:p>
+            <a:pPr marL="12700">
+              <a:lnSpc>
+                <a:spcPct val="100000"/>
+              </a:lnSpc>
+            </a:pPr>
+            <a:r>
+              <a:rPr lang="en-GB" sz="1400" spc="200" dirty="0" smtClean="0">
+                <a:solidFill>
+                  <a:schemeClr val="accent1">
+                    <a:lumMod val="75000"/>
+                  </a:schemeClr>
+                </a:solidFill>
+                <a:latin typeface="Arial"/>
+                <a:cs typeface="Arial"/>
+              </a:rPr>
+              <a:t>MATRIX STACK</a:t>
+            </a:r>
+            <a:endParaRPr lang="en-GB" sz="1400" spc="200" dirty="0" smtClean="0">
+              <a:solidFill>
+                <a:schemeClr val="accent1">
+                  <a:lumMod val="75000"/>
+                </a:schemeClr>
+              </a:solidFill>
+              <a:latin typeface="Arial"/>
+              <a:cs typeface="Arial"/>
+            </a:endParaRPr>
+          </a:p>
+          <a:p>
+            <a:pPr marL="12700">
+              <a:lnSpc>
+                <a:spcPct val="100000"/>
+              </a:lnSpc>
+            </a:pPr>
+            <a:endParaRPr lang="en-GB" sz="1200" spc="200" dirty="0" smtClean="0">
+              <a:solidFill>
+                <a:schemeClr val="accent1">
+                  <a:lumMod val="75000"/>
+                </a:schemeClr>
+              </a:solidFill>
+              <a:latin typeface="Arial"/>
+              <a:cs typeface="Arial"/>
+            </a:endParaRPr>
+          </a:p>
+          <a:p>
+            <a:pPr marL="12700">
+              <a:lnSpc>
+                <a:spcPct val="100000"/>
+              </a:lnSpc>
+            </a:pPr>
+            <a:endParaRPr lang="en-GB" sz="1200" spc="200" dirty="0" smtClean="0">
+              <a:solidFill>
+                <a:schemeClr val="accent1">
+                  <a:lumMod val="75000"/>
                 </a:schemeClr>
               </a:solidFill>
               <a:latin typeface="Arial"/>
@@ -9112,7 +9105,7 @@
       </p:sp>
       <p:pic>
         <p:nvPicPr>
-          <p:cNvPr id="11268" name="Picture 4" descr="C:\Users\jerian\Desktop\rendering.png"/>
+          <p:cNvPr id="9218" name="Picture 2" descr="C:\Local git workspace\sw606f13\report\img\clippingplane.jpg"/>
           <p:cNvPicPr>
             <a:picLocks noChangeAspect="1" noChangeArrowheads="1"/>
           </p:cNvPicPr>
@@ -9127,8 +9120,8 @@
         </p:blipFill>
         <p:spPr bwMode="auto">
           <a:xfrm>
-            <a:off x="4572000" y="332656"/>
-            <a:ext cx="3672408" cy="5403769"/>
+            <a:off x="2170630" y="2204864"/>
+            <a:ext cx="6073778" cy="2664296"/>
           </a:xfrm>
           <a:prstGeom prst="rect">
             <a:avLst/>
@@ -9138,7 +9131,7 @@
       </p:pic>
       <p:pic>
         <p:nvPicPr>
-          <p:cNvPr id="11270" name="Picture 6" descr="C:\Users\jerian\Desktop\rendering.png"/>
+          <p:cNvPr id="1026" name="Picture 2"/>
           <p:cNvPicPr>
             <a:picLocks noChangeAspect="1" noChangeArrowheads="1"/>
           </p:cNvPicPr>
@@ -9153,164 +9146,57 @@
         </p:blipFill>
         <p:spPr bwMode="auto">
           <a:xfrm>
-            <a:off x="683568" y="2276873"/>
-            <a:ext cx="2888401" cy="3240360"/>
+            <a:off x="611560" y="2276872"/>
+            <a:ext cx="936104" cy="1398077"/>
           </a:xfrm>
           <a:prstGeom prst="rect">
             <a:avLst/>
           </a:prstGeom>
           <a:noFill/>
+          <a:ln w="9525">
+            <a:noFill/>
+            <a:miter lim="800000"/>
+            <a:headEnd/>
+            <a:tailEnd/>
+          </a:ln>
         </p:spPr>
       </p:pic>
-      <p:sp>
-        <p:nvSpPr>
-          <p:cNvPr id="3" name="object 3"/>
-          <p:cNvSpPr txBox="1"/>
+      <p:pic>
+        <p:nvPicPr>
+          <p:cNvPr id="1027" name="Picture 3"/>
+          <p:cNvPicPr>
+            <a:picLocks noChangeAspect="1" noChangeArrowheads="1"/>
+          </p:cNvPicPr>
           <p:nvPr/>
-        </p:nvSpPr>
-        <p:spPr>
-          <a:xfrm>
-            <a:off x="626300" y="1155199"/>
-            <a:ext cx="5889916" cy="4074001"/>
+        </p:nvPicPr>
+        <p:blipFill>
+          <a:blip r:embed="rId4" cstate="print"/>
+          <a:srcRect/>
+          <a:stretch>
+            <a:fillRect/>
+          </a:stretch>
+        </p:blipFill>
+        <p:spPr bwMode="auto">
+          <a:xfrm>
+            <a:off x="611560" y="2276872"/>
+            <a:ext cx="936104" cy="1398077"/>
           </a:xfrm>
           <a:prstGeom prst="rect">
             <a:avLst/>
           </a:prstGeom>
-        </p:spPr>
-        <p:txBody>
-          <a:bodyPr vert="horz" wrap="square" lIns="0" tIns="0" rIns="0" bIns="0" rtlCol="0">
-            <a:noAutofit/>
-          </a:bodyPr>
-          <a:lstStyle/>
-          <a:p>
-            <a:pPr marL="12700">
-              <a:lnSpc>
-                <a:spcPct val="100000"/>
-              </a:lnSpc>
-            </a:pPr>
-            <a:r>
-              <a:rPr lang="en-GB" b="1" spc="200" dirty="0" smtClean="0">
-                <a:solidFill>
-                  <a:schemeClr val="accent1">
-                    <a:lumMod val="75000"/>
-                  </a:schemeClr>
-                </a:solidFill>
-                <a:latin typeface="Arial"/>
-                <a:cs typeface="Arial"/>
-              </a:rPr>
-              <a:t>ANDROID OPENGL ES</a:t>
-            </a:r>
-          </a:p>
-          <a:p>
-            <a:pPr marL="12700">
-              <a:lnSpc>
-                <a:spcPct val="100000"/>
-              </a:lnSpc>
-            </a:pPr>
-            <a:r>
-              <a:rPr lang="en-GB" sz="1400" spc="200" dirty="0" err="1" smtClean="0">
-                <a:solidFill>
-                  <a:schemeClr val="accent1">
-                    <a:lumMod val="75000"/>
-                  </a:schemeClr>
-                </a:solidFill>
-                <a:latin typeface="Arial"/>
-                <a:cs typeface="Arial"/>
-              </a:rPr>
-              <a:t>android.opengl.GLSurfaceView</a:t>
-            </a:r>
-            <a:endParaRPr lang="en-GB" sz="1400" spc="200" dirty="0" smtClean="0">
-              <a:solidFill>
-                <a:schemeClr val="accent1">
-                  <a:lumMod val="75000"/>
-                </a:schemeClr>
-              </a:solidFill>
-              <a:latin typeface="Arial"/>
-              <a:cs typeface="Arial"/>
-            </a:endParaRPr>
-          </a:p>
-          <a:p>
-            <a:pPr marL="12700">
-              <a:lnSpc>
-                <a:spcPct val="100000"/>
-              </a:lnSpc>
-            </a:pPr>
-            <a:r>
-              <a:rPr lang="en-GB" sz="1400" spc="200" dirty="0" err="1" smtClean="0">
-                <a:solidFill>
-                  <a:schemeClr val="accent1">
-                    <a:lumMod val="75000"/>
-                  </a:schemeClr>
-                </a:solidFill>
-                <a:latin typeface="Arial"/>
-                <a:cs typeface="Arial"/>
-              </a:rPr>
-              <a:t>android.opengl.GLSurfaceView.Renderer</a:t>
-            </a:r>
-            <a:endParaRPr lang="en-GB" sz="1400" spc="200" dirty="0" smtClean="0">
-              <a:solidFill>
-                <a:schemeClr val="accent1">
-                  <a:lumMod val="75000"/>
-                </a:schemeClr>
-              </a:solidFill>
-              <a:latin typeface="Arial"/>
-              <a:cs typeface="Arial"/>
-            </a:endParaRPr>
-          </a:p>
-          <a:p>
-            <a:pPr marL="12700">
-              <a:lnSpc>
-                <a:spcPct val="100000"/>
-              </a:lnSpc>
-            </a:pPr>
-            <a:endParaRPr lang="en-GB" sz="1600" b="1" spc="200" dirty="0" smtClean="0">
-              <a:solidFill>
-                <a:schemeClr val="accent1">
-                  <a:lumMod val="75000"/>
-                </a:schemeClr>
-              </a:solidFill>
-              <a:latin typeface="Arial"/>
-              <a:cs typeface="Arial"/>
-            </a:endParaRPr>
-          </a:p>
-          <a:p>
-            <a:pPr marL="12700">
-              <a:lnSpc>
-                <a:spcPct val="100000"/>
-              </a:lnSpc>
-            </a:pPr>
-            <a:endParaRPr lang="en-GB" sz="1200" spc="200" dirty="0" smtClean="0">
-              <a:solidFill>
-                <a:schemeClr val="accent1">
-                  <a:lumMod val="75000"/>
-                </a:schemeClr>
-              </a:solidFill>
-              <a:latin typeface="Arial"/>
-              <a:cs typeface="Arial"/>
-            </a:endParaRPr>
-          </a:p>
-          <a:p>
-            <a:pPr marL="12700">
-              <a:lnSpc>
-                <a:spcPct val="100000"/>
-              </a:lnSpc>
-            </a:pPr>
-            <a:endParaRPr lang="en-GB" sz="1200" spc="200" dirty="0" smtClean="0">
-              <a:solidFill>
-                <a:schemeClr val="accent1">
-                  <a:lumMod val="75000"/>
-                </a:schemeClr>
-              </a:solidFill>
-              <a:latin typeface="Arial"/>
-              <a:cs typeface="Arial"/>
-            </a:endParaRPr>
-          </a:p>
-        </p:txBody>
-      </p:sp>
+          <a:noFill/>
+          <a:ln w="9525">
+            <a:noFill/>
+            <a:miter lim="800000"/>
+            <a:headEnd/>
+            <a:tailEnd/>
+          </a:ln>
+        </p:spPr>
+      </p:pic>
     </p:spTree>
     <p:extLst>
       <p:ext uri="{BB962C8B-B14F-4D97-AF65-F5344CB8AC3E}">
-        <p14:creationId xmlns:p14="http://schemas.microsoft.com/office/powerpoint/2010/main" xmlns="" val="585023994"/>
+        <p14:creationId xmlns="" xmlns:p14="http://schemas.microsoft.com/office/powerpoint/2010/main" val="585023994"/>
       </p:ext>
     </p:extLst>
   </p:cSld>
@@ -9318,7 +9204,7 @@
     <a:masterClrMapping/>
   </p:clrMapOvr>
   <mc:AlternateContent xmlns:mc="http://schemas.openxmlformats.org/markup-compatibility/2006">
-    <mc:Choice xmlns:p14="http://schemas.microsoft.com/office/powerpoint/2010/main" xmlns="" Requires="p14">
+    <mc:Choice xmlns="" xmlns:p14="http://schemas.microsoft.com/office/powerpoint/2010/main" Requires="p14">
       <p:transition p14:dur="250">
         <p:fade/>
       </p:transition>
@@ -9359,17 +9245,72 @@
       <p:sp>
         <p:nvSpPr>
           <p:cNvPr id="2" name="object 2"/>
+          <p:cNvSpPr txBox="1"/>
+          <p:nvPr/>
+        </p:nvSpPr>
+        <p:spPr>
+          <a:xfrm>
+            <a:off x="626300" y="562800"/>
+            <a:ext cx="6231700" cy="368935"/>
+          </a:xfrm>
+          <a:prstGeom prst="rect">
+            <a:avLst/>
+          </a:prstGeom>
+        </p:spPr>
+        <p:txBody>
+          <a:bodyPr vert="horz" wrap="square" lIns="0" tIns="0" rIns="0" bIns="0" rtlCol="0">
+            <a:noAutofit/>
+          </a:bodyPr>
+          <a:lstStyle/>
+          <a:p>
+            <a:pPr marL="12700">
+              <a:lnSpc>
+                <a:spcPct val="100000"/>
+              </a:lnSpc>
+              <a:tabLst>
+                <a:tab pos="1641475" algn="l"/>
+                <a:tab pos="2152650" algn="l"/>
+                <a:tab pos="3412490" algn="l"/>
+              </a:tabLst>
+            </a:pPr>
+            <a:r>
+              <a:rPr lang="en-GB" sz="2400" kern="0" cap="all" spc="200" dirty="0" smtClean="0">
+                <a:solidFill>
+                  <a:schemeClr val="tx2">
+                    <a:lumMod val="50000"/>
+                  </a:schemeClr>
+                </a:solidFill>
+                <a:latin typeface="Arial"/>
+                <a:cs typeface="Arial"/>
+              </a:rPr>
+              <a:t>Rendering</a:t>
+            </a:r>
+            <a:endParaRPr sz="2400" kern="0" cap="all" spc="200" dirty="0">
+              <a:solidFill>
+                <a:schemeClr val="tx2">
+                  <a:lumMod val="50000"/>
+                </a:schemeClr>
+              </a:solidFill>
+              <a:latin typeface="Arial"/>
+              <a:cs typeface="Arial"/>
+            </a:endParaRPr>
+          </a:p>
+        </p:txBody>
+      </p:sp>
+      <p:sp>
+        <p:nvSpPr>
+          <p:cNvPr id="8" name="object 4"/>
           <p:cNvSpPr txBox="1">
             <a:spLocks noGrp="1"/>
           </p:cNvSpPr>
           <p:nvPr>
-            <p:ph type="title"/>
+            <p:ph type="ftr" sz="quarter" idx="4294967295"/>
           </p:nvPr>
         </p:nvSpPr>
         <p:spPr>
           <a:xfrm>
-            <a:off x="1827956" y="2420888"/>
-            <a:ext cx="5536756" cy="1023270"/>
+            <a:off x="2540146" y="5952019"/>
+            <a:ext cx="4343400" cy="143981"/>
           </a:xfrm>
           <a:prstGeom prst="rect">
             <a:avLst/>
@@ -9381,30 +9322,99 @@
           </a:bodyPr>
           <a:lstStyle/>
           <a:p>
-            <a:pPr marR="0" algn="ctr">
-              <a:lnSpc>
-                <a:spcPts val="3960"/>
-              </a:lnSpc>
-              <a:tabLst>
-                <a:tab pos="1676400" algn="l"/>
-              </a:tabLst>
-            </a:pPr>
-            <a:r>
-              <a:rPr lang="da-DK" sz="3600" b="1" dirty="0" smtClean="0">
-                <a:solidFill>
-                  <a:schemeClr val="tx2">
-                    <a:lumMod val="50000"/>
-                  </a:schemeClr>
-                </a:solidFill>
-                <a:latin typeface="Arial"/>
-                <a:cs typeface="Arial"/>
-              </a:rPr>
-              <a:t>Game Implementation</a:t>
-            </a:r>
-            <a:endParaRPr sz="3600" b="1" dirty="0">
-              <a:solidFill>
-                <a:schemeClr val="tx2">
+            <a:pPr marL="12700">
+              <a:lnSpc>
+                <a:spcPct val="100000"/>
+              </a:lnSpc>
+            </a:pPr>
+            <a:fld id="{9561DEC8-19EE-4A79-9D71-66FF6B3E3434}" type="slidenum">
+              <a:rPr lang="da-DK" sz="850" b="1" kern="0" cap="all" spc="200" smtClean="0">
+                <a:solidFill>
+                  <a:schemeClr val="tx1">
+                    <a:lumMod val="50000"/>
+                    <a:lumOff val="50000"/>
+                  </a:schemeClr>
+                </a:solidFill>
+                <a:latin typeface="Arial"/>
+                <a:cs typeface="Arial"/>
+              </a:rPr>
+              <a:pPr marL="12700">
+                <a:lnSpc>
+                  <a:spcPct val="100000"/>
+                </a:lnSpc>
+              </a:pPr>
+              <a:t>21</a:t>
+            </a:fld>
+            <a:r>
+              <a:rPr lang="da-DK" sz="850" b="1" kern="0" cap="all" spc="200" dirty="0" smtClean="0">
+                <a:solidFill>
+                  <a:schemeClr val="tx1">
+                    <a:lumMod val="50000"/>
+                    <a:lumOff val="50000"/>
+                  </a:schemeClr>
+                </a:solidFill>
+                <a:latin typeface="Arial"/>
+                <a:cs typeface="Arial"/>
+              </a:rPr>
+              <a:t> </a:t>
+            </a:r>
+            <a:r>
+              <a:rPr sz="850" b="1" kern="0" cap="all" spc="200" dirty="0" smtClean="0">
+                <a:solidFill>
+                  <a:schemeClr val="tx1">
+                    <a:lumMod val="50000"/>
+                    <a:lumOff val="50000"/>
+                  </a:schemeClr>
+                </a:solidFill>
+                <a:latin typeface="Arial"/>
+                <a:cs typeface="Arial"/>
+              </a:rPr>
+              <a:t>OF</a:t>
+            </a:r>
+            <a:r>
+              <a:rPr lang="da-DK" sz="850" b="1" kern="0" cap="all" spc="200" dirty="0" smtClean="0">
+                <a:solidFill>
+                  <a:schemeClr val="tx1">
+                    <a:lumMod val="50000"/>
+                    <a:lumOff val="50000"/>
+                  </a:schemeClr>
+                </a:solidFill>
+                <a:latin typeface="Arial"/>
+                <a:cs typeface="Arial"/>
+              </a:rPr>
+              <a:t> </a:t>
+            </a:r>
+            <a:r>
+              <a:rPr lang="da-DK" sz="850" b="1" kern="0" cap="all" spc="200" dirty="0">
+                <a:solidFill>
+                  <a:schemeClr val="tx1">
+                    <a:lumMod val="50000"/>
+                    <a:lumOff val="50000"/>
+                  </a:schemeClr>
+                </a:solidFill>
+                <a:latin typeface="Arial"/>
+                <a:cs typeface="Arial"/>
+              </a:rPr>
+              <a:t>24  | </a:t>
+            </a:r>
+            <a:r>
+              <a:rPr lang="da-DK" sz="850" b="1" kern="0" spc="200" dirty="0" smtClean="0">
+                <a:solidFill>
+                  <a:schemeClr val="tx1">
+                    <a:lumMod val="50000"/>
+                    <a:lumOff val="50000"/>
+                  </a:schemeClr>
+                </a:solidFill>
+                <a:latin typeface="Arial"/>
+                <a:cs typeface="Arial"/>
+              </a:rPr>
+              <a:t>26.06.2013</a:t>
+            </a:r>
+            <a:endParaRPr sz="850" kern="0" cap="all" spc="200" dirty="0">
+              <a:solidFill>
+                <a:schemeClr val="tx1">
                   <a:lumMod val="50000"/>
+                  <a:lumOff val="50000"/>
                 </a:schemeClr>
               </a:solidFill>
               <a:latin typeface="Arial"/>
@@ -9413,102 +9423,293 @@
           </a:p>
         </p:txBody>
       </p:sp>
+      <p:sp>
+        <p:nvSpPr>
+          <p:cNvPr id="9" name="object 7"/>
+          <p:cNvSpPr txBox="1"/>
+          <p:nvPr/>
+        </p:nvSpPr>
+        <p:spPr>
+          <a:xfrm>
+            <a:off x="2743200" y="6137888"/>
+            <a:ext cx="3682706" cy="294005"/>
+          </a:xfrm>
+          <a:prstGeom prst="rect">
+            <a:avLst/>
+          </a:prstGeom>
+        </p:spPr>
+        <p:txBody>
+          <a:bodyPr vert="horz" wrap="square" lIns="0" tIns="0" rIns="0" bIns="0" rtlCol="0">
+            <a:noAutofit/>
+          </a:bodyPr>
+          <a:lstStyle/>
+          <a:p>
+            <a:pPr algn="ctr">
+              <a:lnSpc>
+                <a:spcPct val="100000"/>
+              </a:lnSpc>
+            </a:pPr>
+            <a:r>
+              <a:rPr lang="da-DK" sz="850" b="1" kern="0" cap="all" spc="200" dirty="0" smtClean="0">
+                <a:solidFill>
+                  <a:schemeClr val="tx1">
+                    <a:lumMod val="50000"/>
+                    <a:lumOff val="50000"/>
+                  </a:schemeClr>
+                </a:solidFill>
+                <a:latin typeface="Arial"/>
+                <a:cs typeface="Arial"/>
+              </a:rPr>
+              <a:t>Department of computer science</a:t>
+            </a:r>
+            <a:endParaRPr sz="850" b="1" kern="0" cap="all" spc="200" dirty="0" smtClean="0">
+              <a:solidFill>
+                <a:schemeClr val="tx1">
+                  <a:lumMod val="50000"/>
+                  <a:lumOff val="50000"/>
+                </a:schemeClr>
+              </a:solidFill>
+              <a:latin typeface="Arial"/>
+              <a:cs typeface="Arial"/>
+            </a:endParaRPr>
+          </a:p>
+          <a:p>
+            <a:pPr marR="20320" algn="ctr">
+              <a:lnSpc>
+                <a:spcPct val="100000"/>
+              </a:lnSpc>
+              <a:spcBef>
+                <a:spcPts val="180"/>
+              </a:spcBef>
+            </a:pPr>
+            <a:r>
+              <a:rPr sz="850" kern="0" cap="all" spc="200" dirty="0" smtClean="0">
+                <a:solidFill>
+                  <a:schemeClr val="tx1">
+                    <a:lumMod val="50000"/>
+                    <a:lumOff val="50000"/>
+                  </a:schemeClr>
+                </a:solidFill>
+                <a:latin typeface="Arial"/>
+                <a:cs typeface="Arial"/>
+              </a:rPr>
+              <a:t>AALBORG</a:t>
+            </a:r>
+            <a:r>
+              <a:rPr lang="da-DK" sz="850" kern="0" cap="all" spc="200" dirty="0" smtClean="0">
+                <a:solidFill>
+                  <a:schemeClr val="tx1">
+                    <a:lumMod val="50000"/>
+                    <a:lumOff val="50000"/>
+                  </a:schemeClr>
+                </a:solidFill>
+                <a:latin typeface="Arial"/>
+                <a:cs typeface="Arial"/>
+              </a:rPr>
+              <a:t> UNIVERSITy</a:t>
+            </a:r>
+            <a:endParaRPr sz="850" kern="0" cap="all" spc="200" dirty="0">
+              <a:solidFill>
+                <a:schemeClr val="tx1">
+                  <a:lumMod val="50000"/>
+                  <a:lumOff val="50000"/>
+                </a:schemeClr>
+              </a:solidFill>
+              <a:latin typeface="Arial"/>
+              <a:cs typeface="Arial"/>
+            </a:endParaRPr>
+          </a:p>
+        </p:txBody>
+      </p:sp>
       <p:pic>
         <p:nvPicPr>
-          <p:cNvPr id="10" name="Billede 9"/>
+          <p:cNvPr id="11268" name="Picture 4" descr="C:\Users\jerian\Desktop\rendering.png"/>
           <p:cNvPicPr>
-            <a:picLocks noChangeAspect="1"/>
+            <a:picLocks noChangeAspect="1" noChangeArrowheads="1"/>
           </p:cNvPicPr>
           <p:nvPr/>
         </p:nvPicPr>
         <p:blipFill>
-          <a:blip r:embed="rId2" cstate="print">
-            <a:extLst>
-              <a:ext uri="{28A0092B-C50C-407E-A947-70E740481C1C}">
-                <a14:useLocalDpi xmlns:a14="http://schemas.microsoft.com/office/drawing/2010/main" xmlns="" val="0"/>
-              </a:ext>
-            </a:extLst>
-          </a:blip>
+          <a:blip r:embed="rId2" cstate="print"/>
+          <a:srcRect/>
           <a:stretch>
             <a:fillRect/>
           </a:stretch>
         </p:blipFill>
-        <p:spPr>
-          <a:xfrm>
-            <a:off x="3824699" y="5576322"/>
-            <a:ext cx="1543270" cy="1009770"/>
+        <p:spPr bwMode="auto">
+          <a:xfrm>
+            <a:off x="4572000" y="332656"/>
+            <a:ext cx="3672408" cy="5403769"/>
           </a:xfrm>
           <a:prstGeom prst="rect">
             <a:avLst/>
           </a:prstGeom>
+          <a:noFill/>
         </p:spPr>
       </p:pic>
-      <p:sp>
-        <p:nvSpPr>
-          <p:cNvPr id="4" name="Rektangel 3"/>
-          <p:cNvSpPr/>
+      <p:pic>
+        <p:nvPicPr>
+          <p:cNvPr id="11270" name="Picture 6" descr="C:\Users\jerian\Desktop\rendering.png"/>
+          <p:cNvPicPr>
+            <a:picLocks noChangeAspect="1" noChangeArrowheads="1"/>
+          </p:cNvPicPr>
           <p:nvPr/>
-        </p:nvSpPr>
-        <p:spPr>
-          <a:xfrm>
-            <a:off x="2286000" y="3516166"/>
-            <a:ext cx="4572000" cy="276999"/>
+        </p:nvPicPr>
+        <p:blipFill>
+          <a:blip r:embed="rId3" cstate="print"/>
+          <a:srcRect/>
+          <a:stretch>
+            <a:fillRect/>
+          </a:stretch>
+        </p:blipFill>
+        <p:spPr bwMode="auto">
+          <a:xfrm>
+            <a:off x="683568" y="2276873"/>
+            <a:ext cx="2888401" cy="3240360"/>
           </a:xfrm>
           <a:prstGeom prst="rect">
             <a:avLst/>
           </a:prstGeom>
-        </p:spPr>
-        <p:txBody>
-          <a:bodyPr>
-            <a:spAutoFit/>
+          <a:noFill/>
+        </p:spPr>
+      </p:pic>
+      <p:sp>
+        <p:nvSpPr>
+          <p:cNvPr id="3" name="object 3"/>
+          <p:cNvSpPr txBox="1"/>
+          <p:nvPr/>
+        </p:nvSpPr>
+        <p:spPr>
+          <a:xfrm>
+            <a:off x="626300" y="1155199"/>
+            <a:ext cx="5889916" cy="4074001"/>
+          </a:xfrm>
+          <a:prstGeom prst="rect">
+            <a:avLst/>
+          </a:prstGeom>
+        </p:spPr>
+        <p:txBody>
+          <a:bodyPr vert="horz" wrap="square" lIns="0" tIns="0" rIns="0" bIns="0" rtlCol="0">
+            <a:noAutofit/>
           </a:bodyPr>
           <a:lstStyle/>
           <a:p>
-            <a:pPr marR="28575" algn="ctr">
-              <a:lnSpc>
-                <a:spcPct val="100000"/>
-              </a:lnSpc>
-            </a:pPr>
-            <a:r>
-              <a:rPr lang="en-US" sz="1200" kern="0" cap="all" spc="200" dirty="0" smtClean="0">
-                <a:solidFill>
-                  <a:schemeClr val="tx2">
-                    <a:lumMod val="50000"/>
-                  </a:schemeClr>
-                </a:solidFill>
-                <a:latin typeface="Arial"/>
-                <a:cs typeface="Arial"/>
-              </a:rPr>
-              <a:t>Jacob </a:t>
-            </a:r>
-            <a:r>
-              <a:rPr lang="en-US" sz="1200" kern="0" cap="all" spc="200" dirty="0" err="1" smtClean="0">
-                <a:solidFill>
-                  <a:schemeClr val="tx2">
-                    <a:lumMod val="50000"/>
-                  </a:schemeClr>
-                </a:solidFill>
-                <a:latin typeface="Arial"/>
-                <a:cs typeface="Arial"/>
-              </a:rPr>
-              <a:t>Karstensen</a:t>
-            </a:r>
-            <a:r>
-              <a:rPr lang="en-US" sz="1200" kern="0" cap="all" spc="200" dirty="0" smtClean="0">
-                <a:solidFill>
-                  <a:schemeClr val="tx2">
-                    <a:lumMod val="50000"/>
-                  </a:schemeClr>
-                </a:solidFill>
-                <a:latin typeface="Arial"/>
-                <a:cs typeface="Arial"/>
-              </a:rPr>
-              <a:t> Wortmann</a:t>
-            </a:r>
-            <a:endParaRPr lang="en-US" sz="1200" kern="0" cap="all" spc="200" dirty="0">
-              <a:solidFill>
-                <a:schemeClr val="tx2">
-                  <a:lumMod val="50000"/>
+            <a:pPr marL="12700">
+              <a:lnSpc>
+                <a:spcPct val="100000"/>
+              </a:lnSpc>
+            </a:pPr>
+            <a:r>
+              <a:rPr lang="en-GB" b="1" spc="200" dirty="0" smtClean="0">
+                <a:solidFill>
+                  <a:schemeClr val="accent1">
+                    <a:lumMod val="75000"/>
+                  </a:schemeClr>
+                </a:solidFill>
+                <a:latin typeface="Arial"/>
+                <a:cs typeface="Arial"/>
+              </a:rPr>
+              <a:t>ANDROID OPENGL ES</a:t>
+            </a:r>
+          </a:p>
+          <a:p>
+            <a:pPr marL="12700">
+              <a:lnSpc>
+                <a:spcPct val="100000"/>
+              </a:lnSpc>
+            </a:pPr>
+            <a:r>
+              <a:rPr lang="en-GB" sz="1400" spc="200" dirty="0" err="1" smtClean="0">
+                <a:solidFill>
+                  <a:schemeClr val="accent1">
+                    <a:lumMod val="75000"/>
+                  </a:schemeClr>
+                </a:solidFill>
+                <a:latin typeface="Arial"/>
+                <a:cs typeface="Arial"/>
+              </a:rPr>
+              <a:t>android.opengl.GLSurfaceView</a:t>
+            </a:r>
+            <a:endParaRPr lang="en-GB" sz="1400" spc="200" dirty="0" smtClean="0">
+              <a:solidFill>
+                <a:schemeClr val="accent1">
+                  <a:lumMod val="75000"/>
+                </a:schemeClr>
+              </a:solidFill>
+              <a:latin typeface="Arial"/>
+              <a:cs typeface="Arial"/>
+            </a:endParaRPr>
+          </a:p>
+          <a:p>
+            <a:pPr marL="12700">
+              <a:lnSpc>
+                <a:spcPct val="100000"/>
+              </a:lnSpc>
+            </a:pPr>
+            <a:r>
+              <a:rPr lang="en-GB" sz="1400" spc="200" dirty="0" err="1" smtClean="0">
+                <a:solidFill>
+                  <a:schemeClr val="accent1">
+                    <a:lumMod val="75000"/>
+                  </a:schemeClr>
+                </a:solidFill>
+                <a:latin typeface="Arial"/>
+                <a:cs typeface="Arial"/>
+              </a:rPr>
+              <a:t>android.opengl.GLSurfaceView.Renderer</a:t>
+            </a:r>
+            <a:endParaRPr lang="en-GB" sz="1400" spc="200" dirty="0" smtClean="0">
+              <a:solidFill>
+                <a:schemeClr val="accent1">
+                  <a:lumMod val="75000"/>
+                </a:schemeClr>
+              </a:solidFill>
+              <a:latin typeface="Arial"/>
+              <a:cs typeface="Arial"/>
+            </a:endParaRPr>
+          </a:p>
+          <a:p>
+            <a:pPr marL="12700">
+              <a:lnSpc>
+                <a:spcPct val="100000"/>
+              </a:lnSpc>
+            </a:pPr>
+            <a:endParaRPr lang="en-GB" sz="1600" b="1" spc="200" dirty="0" smtClean="0">
+              <a:solidFill>
+                <a:schemeClr val="accent1">
+                  <a:lumMod val="75000"/>
+                </a:schemeClr>
+              </a:solidFill>
+              <a:latin typeface="Arial"/>
+              <a:cs typeface="Arial"/>
+            </a:endParaRPr>
+          </a:p>
+          <a:p>
+            <a:pPr marL="12700">
+              <a:lnSpc>
+                <a:spcPct val="100000"/>
+              </a:lnSpc>
+            </a:pPr>
+            <a:endParaRPr lang="en-GB" sz="1200" spc="200" dirty="0" smtClean="0">
+              <a:solidFill>
+                <a:schemeClr val="accent1">
+                  <a:lumMod val="75000"/>
+                </a:schemeClr>
+              </a:solidFill>
+              <a:latin typeface="Arial"/>
+              <a:cs typeface="Arial"/>
+            </a:endParaRPr>
+          </a:p>
+          <a:p>
+            <a:pPr marL="12700">
+              <a:lnSpc>
+                <a:spcPct val="100000"/>
+              </a:lnSpc>
+            </a:pPr>
+            <a:endParaRPr lang="en-GB" sz="1200" spc="200" dirty="0" smtClean="0">
+              <a:solidFill>
+                <a:schemeClr val="accent1">
+                  <a:lumMod val="75000"/>
                 </a:schemeClr>
               </a:solidFill>
               <a:latin typeface="Arial"/>
@@ -9520,7 +9721,7 @@
     </p:spTree>
     <p:extLst>
       <p:ext uri="{BB962C8B-B14F-4D97-AF65-F5344CB8AC3E}">
-        <p14:creationId xmlns:p14="http://schemas.microsoft.com/office/powerpoint/2010/main" xmlns="" val="3425622471"/>
+        <p14:creationId xmlns="" xmlns:p14="http://schemas.microsoft.com/office/powerpoint/2010/main" val="585023994"/>
       </p:ext>
     </p:extLst>
   </p:cSld>
@@ -9528,7 +9729,7 @@
     <a:masterClrMapping/>
   </p:clrMapOvr>
   <mc:AlternateContent xmlns:mc="http://schemas.openxmlformats.org/markup-compatibility/2006">
-    <mc:Choice xmlns:p14="http://schemas.microsoft.com/office/powerpoint/2010/main" xmlns="" Requires="p14">
+    <mc:Choice xmlns="" xmlns:p14="http://schemas.microsoft.com/office/powerpoint/2010/main" Requires="p14">
       <p:transition p14:dur="250">
         <p:fade/>
       </p:transition>
@@ -9569,13 +9770,17 @@
       <p:sp>
         <p:nvSpPr>
           <p:cNvPr id="2" name="object 2"/>
-          <p:cNvSpPr txBox="1"/>
-          <p:nvPr/>
+          <p:cNvSpPr txBox="1">
+            <a:spLocks noGrp="1"/>
+          </p:cNvSpPr>
+          <p:nvPr>
+            <p:ph type="title"/>
+          </p:nvPr>
         </p:nvSpPr>
         <p:spPr>
           <a:xfrm>
-            <a:off x="626300" y="562800"/>
-            <a:ext cx="6231700" cy="368935"/>
+            <a:off x="1827956" y="2420888"/>
+            <a:ext cx="5536756" cy="1023270"/>
           </a:xfrm>
           <a:prstGeom prst="rect">
             <a:avLst/>
@@ -9587,18 +9792,16 @@
           </a:bodyPr>
           <a:lstStyle/>
           <a:p>
-            <a:pPr marL="12700">
-              <a:lnSpc>
-                <a:spcPct val="100000"/>
+            <a:pPr marR="0" algn="ctr">
+              <a:lnSpc>
+                <a:spcPts val="3960"/>
               </a:lnSpc>
               <a:tabLst>
-                <a:tab pos="1641475" algn="l"/>
-                <a:tab pos="2152650" algn="l"/>
-                <a:tab pos="3412490" algn="l"/>
+                <a:tab pos="1676400" algn="l"/>
               </a:tabLst>
             </a:pPr>
             <a:r>
-              <a:rPr lang="en-GB" sz="2400" kern="0" cap="all" spc="200" dirty="0" smtClean="0">
+              <a:rPr lang="da-DK" sz="3600" b="1" dirty="0" smtClean="0">
                 <a:solidFill>
                   <a:schemeClr val="tx2">
                     <a:lumMod val="50000"/>
@@ -9607,9 +9810,9 @@
                 <a:latin typeface="Arial"/>
                 <a:cs typeface="Arial"/>
               </a:rPr>
-              <a:t>Drag and drop</a:t>
-            </a:r>
-            <a:endParaRPr sz="2400" kern="0" cap="all" spc="200" dirty="0">
+              <a:t>Game Implementation</a:t>
+            </a:r>
+            <a:endParaRPr sz="3600" b="1" dirty="0">
               <a:solidFill>
                 <a:schemeClr val="tx2">
                   <a:lumMod val="50000"/>
@@ -9621,345 +9824,114 @@
           </a:p>
         </p:txBody>
       </p:sp>
-      <p:sp>
-        <p:nvSpPr>
-          <p:cNvPr id="3" name="object 3"/>
-          <p:cNvSpPr txBox="1"/>
-          <p:nvPr/>
-        </p:nvSpPr>
-        <p:spPr>
-          <a:xfrm>
-            <a:off x="626300" y="1155199"/>
-            <a:ext cx="5283200" cy="4074001"/>
-          </a:xfrm>
-          <a:prstGeom prst="rect">
-            <a:avLst/>
-          </a:prstGeom>
-        </p:spPr>
-        <p:txBody>
-          <a:bodyPr vert="horz" wrap="square" lIns="0" tIns="0" rIns="0" bIns="0" rtlCol="0">
-            <a:noAutofit/>
-          </a:bodyPr>
-          <a:lstStyle/>
-          <a:p>
-            <a:pPr marL="12700">
-              <a:lnSpc>
-                <a:spcPct val="100000"/>
-              </a:lnSpc>
-            </a:pPr>
-            <a:r>
-              <a:rPr lang="en-GB" b="1" cap="all" spc="200" dirty="0" smtClean="0">
-                <a:solidFill>
-                  <a:schemeClr val="accent1">
-                    <a:lumMod val="75000"/>
-                  </a:schemeClr>
-                </a:solidFill>
-                <a:latin typeface="Arial"/>
-                <a:cs typeface="Arial"/>
-              </a:rPr>
-              <a:t>Touch listener</a:t>
-            </a:r>
-          </a:p>
-          <a:p>
-            <a:pPr marL="12700">
-              <a:lnSpc>
-                <a:spcPct val="100000"/>
-              </a:lnSpc>
-            </a:pPr>
-            <a:endParaRPr lang="en-GB" b="1" cap="all" spc="200" dirty="0" smtClean="0">
-              <a:solidFill>
-                <a:schemeClr val="accent1">
-                  <a:lumMod val="75000"/>
-                </a:schemeClr>
-              </a:solidFill>
-              <a:latin typeface="Arial"/>
-              <a:cs typeface="Arial"/>
-            </a:endParaRPr>
-          </a:p>
-          <a:p>
-            <a:pPr marL="12700">
-              <a:lnSpc>
-                <a:spcPct val="100000"/>
-              </a:lnSpc>
-            </a:pPr>
-            <a:r>
-              <a:rPr lang="en-GB" b="1" cap="all" spc="200" dirty="0" smtClean="0">
-                <a:solidFill>
-                  <a:schemeClr val="accent1">
-                    <a:lumMod val="75000"/>
-                  </a:schemeClr>
-                </a:solidFill>
-                <a:latin typeface="Arial"/>
-                <a:cs typeface="Arial"/>
-              </a:rPr>
-              <a:t>Drag listener</a:t>
-            </a:r>
-            <a:endParaRPr lang="da-DK" b="1" cap="all" spc="200" dirty="0" smtClean="0">
-              <a:solidFill>
-                <a:schemeClr val="accent1">
-                  <a:lumMod val="75000"/>
-                </a:schemeClr>
-              </a:solidFill>
-              <a:latin typeface="Arial"/>
-              <a:cs typeface="Arial"/>
-            </a:endParaRPr>
-          </a:p>
-        </p:txBody>
-      </p:sp>
-      <p:sp>
-        <p:nvSpPr>
-          <p:cNvPr id="8" name="object 4"/>
-          <p:cNvSpPr txBox="1">
-            <a:spLocks noGrp="1"/>
-          </p:cNvSpPr>
-          <p:nvPr>
-            <p:ph type="ftr" sz="quarter" idx="4294967295"/>
-          </p:nvPr>
-        </p:nvSpPr>
-        <p:spPr>
-          <a:xfrm>
-            <a:off x="2540146" y="5952019"/>
-            <a:ext cx="4343400" cy="143981"/>
-          </a:xfrm>
-          <a:prstGeom prst="rect">
-            <a:avLst/>
-          </a:prstGeom>
-        </p:spPr>
-        <p:txBody>
-          <a:bodyPr vert="horz" wrap="square" lIns="0" tIns="0" rIns="0" bIns="0" rtlCol="0">
-            <a:noAutofit/>
-          </a:bodyPr>
-          <a:lstStyle/>
-          <a:p>
-            <a:pPr marL="12700">
-              <a:lnSpc>
-                <a:spcPct val="100000"/>
-              </a:lnSpc>
-            </a:pPr>
-            <a:fld id="{9561DEC8-19EE-4A79-9D71-66FF6B3E3434}" type="slidenum">
-              <a:rPr lang="da-DK" sz="850" b="1" kern="0" cap="all" spc="200" smtClean="0">
-                <a:solidFill>
-                  <a:schemeClr val="tx1">
-                    <a:lumMod val="50000"/>
-                    <a:lumOff val="50000"/>
-                  </a:schemeClr>
-                </a:solidFill>
-                <a:latin typeface="Arial"/>
-                <a:cs typeface="Arial"/>
-              </a:rPr>
-              <a:pPr marL="12700">
-                <a:lnSpc>
-                  <a:spcPct val="100000"/>
-                </a:lnSpc>
-              </a:pPr>
-              <a:t>22</a:t>
-            </a:fld>
-            <a:r>
-              <a:rPr lang="da-DK" sz="850" b="1" kern="0" cap="all" spc="200" dirty="0" smtClean="0">
-                <a:solidFill>
-                  <a:schemeClr val="tx1">
-                    <a:lumMod val="50000"/>
-                    <a:lumOff val="50000"/>
-                  </a:schemeClr>
-                </a:solidFill>
-                <a:latin typeface="Arial"/>
-                <a:cs typeface="Arial"/>
-              </a:rPr>
-              <a:t> </a:t>
-            </a:r>
-            <a:r>
-              <a:rPr sz="850" b="1" kern="0" cap="all" spc="200" dirty="0" smtClean="0">
-                <a:solidFill>
-                  <a:schemeClr val="tx1">
-                    <a:lumMod val="50000"/>
-                    <a:lumOff val="50000"/>
-                  </a:schemeClr>
-                </a:solidFill>
-                <a:latin typeface="Arial"/>
-                <a:cs typeface="Arial"/>
-              </a:rPr>
-              <a:t>OF</a:t>
-            </a:r>
-            <a:r>
-              <a:rPr lang="da-DK" sz="850" b="1" kern="0" cap="all" spc="200" dirty="0" smtClean="0">
-                <a:solidFill>
-                  <a:schemeClr val="tx1">
-                    <a:lumMod val="50000"/>
-                    <a:lumOff val="50000"/>
-                  </a:schemeClr>
-                </a:solidFill>
-                <a:latin typeface="Arial"/>
-                <a:cs typeface="Arial"/>
-              </a:rPr>
-              <a:t> </a:t>
-            </a:r>
-            <a:r>
-              <a:rPr lang="da-DK" sz="850" b="1" kern="0" cap="all" spc="200" dirty="0">
-                <a:solidFill>
-                  <a:schemeClr val="tx1">
-                    <a:lumMod val="50000"/>
-                    <a:lumOff val="50000"/>
-                  </a:schemeClr>
-                </a:solidFill>
-                <a:latin typeface="Arial"/>
-                <a:cs typeface="Arial"/>
-              </a:rPr>
-              <a:t>24  | </a:t>
-            </a:r>
-            <a:r>
-              <a:rPr lang="da-DK" sz="850" b="1" kern="0" spc="200" dirty="0" smtClean="0">
-                <a:solidFill>
-                  <a:schemeClr val="tx1">
-                    <a:lumMod val="50000"/>
-                    <a:lumOff val="50000"/>
-                  </a:schemeClr>
-                </a:solidFill>
-                <a:latin typeface="Arial"/>
-                <a:cs typeface="Arial"/>
-              </a:rPr>
-              <a:t>26.06.2013</a:t>
-            </a:r>
-            <a:endParaRPr sz="850" kern="0" cap="all" spc="200" dirty="0">
-              <a:solidFill>
-                <a:schemeClr val="tx1">
-                  <a:lumMod val="50000"/>
-                  <a:lumOff val="50000"/>
-                </a:schemeClr>
-              </a:solidFill>
-              <a:latin typeface="Arial"/>
-              <a:cs typeface="Arial"/>
-            </a:endParaRPr>
-          </a:p>
-        </p:txBody>
-      </p:sp>
-      <p:sp>
-        <p:nvSpPr>
-          <p:cNvPr id="9" name="object 7"/>
-          <p:cNvSpPr txBox="1"/>
-          <p:nvPr/>
-        </p:nvSpPr>
-        <p:spPr>
-          <a:xfrm>
-            <a:off x="2743200" y="6137888"/>
-            <a:ext cx="3682706" cy="294005"/>
-          </a:xfrm>
-          <a:prstGeom prst="rect">
-            <a:avLst/>
-          </a:prstGeom>
-        </p:spPr>
-        <p:txBody>
-          <a:bodyPr vert="horz" wrap="square" lIns="0" tIns="0" rIns="0" bIns="0" rtlCol="0">
-            <a:noAutofit/>
-          </a:bodyPr>
-          <a:lstStyle/>
-          <a:p>
-            <a:pPr algn="ctr">
-              <a:lnSpc>
-                <a:spcPct val="100000"/>
-              </a:lnSpc>
-            </a:pPr>
-            <a:r>
-              <a:rPr lang="da-DK" sz="850" b="1" kern="0" cap="all" spc="200" dirty="0" smtClean="0">
-                <a:solidFill>
-                  <a:schemeClr val="tx1">
-                    <a:lumMod val="50000"/>
-                    <a:lumOff val="50000"/>
-                  </a:schemeClr>
-                </a:solidFill>
-                <a:latin typeface="Arial"/>
-                <a:cs typeface="Arial"/>
-              </a:rPr>
-              <a:t>Department of computer science</a:t>
-            </a:r>
-            <a:endParaRPr sz="850" b="1" kern="0" cap="all" spc="200" dirty="0" smtClean="0">
-              <a:solidFill>
-                <a:schemeClr val="tx1">
-                  <a:lumMod val="50000"/>
-                  <a:lumOff val="50000"/>
-                </a:schemeClr>
-              </a:solidFill>
-              <a:latin typeface="Arial"/>
-              <a:cs typeface="Arial"/>
-            </a:endParaRPr>
-          </a:p>
-          <a:p>
-            <a:pPr marR="20320" algn="ctr">
-              <a:lnSpc>
-                <a:spcPct val="100000"/>
-              </a:lnSpc>
-              <a:spcBef>
-                <a:spcPts val="180"/>
-              </a:spcBef>
-            </a:pPr>
-            <a:r>
-              <a:rPr sz="850" kern="0" cap="all" spc="200" dirty="0" smtClean="0">
-                <a:solidFill>
-                  <a:schemeClr val="tx1">
-                    <a:lumMod val="50000"/>
-                    <a:lumOff val="50000"/>
-                  </a:schemeClr>
-                </a:solidFill>
-                <a:latin typeface="Arial"/>
-                <a:cs typeface="Arial"/>
-              </a:rPr>
-              <a:t>AALBORG</a:t>
-            </a:r>
-            <a:r>
-              <a:rPr lang="da-DK" sz="850" kern="0" cap="all" spc="200" dirty="0" smtClean="0">
-                <a:solidFill>
-                  <a:schemeClr val="tx1">
-                    <a:lumMod val="50000"/>
-                    <a:lumOff val="50000"/>
-                  </a:schemeClr>
-                </a:solidFill>
-                <a:latin typeface="Arial"/>
-                <a:cs typeface="Arial"/>
-              </a:rPr>
-              <a:t> UNIVERSITy</a:t>
-            </a:r>
-            <a:endParaRPr sz="850" kern="0" cap="all" spc="200" dirty="0">
-              <a:solidFill>
-                <a:schemeClr val="tx1">
-                  <a:lumMod val="50000"/>
-                  <a:lumOff val="50000"/>
-                </a:schemeClr>
-              </a:solidFill>
-              <a:latin typeface="Arial"/>
-              <a:cs typeface="Arial"/>
-            </a:endParaRPr>
-          </a:p>
-        </p:txBody>
-      </p:sp>
       <p:pic>
         <p:nvPicPr>
-          <p:cNvPr id="2050" name="Picture 2" descr="C:\Local git workspace\sw606f13\report\img\layoutexample.png"/>
+          <p:cNvPr id="10" name="Billede 9"/>
           <p:cNvPicPr>
-            <a:picLocks noChangeAspect="1" noChangeArrowheads="1"/>
+            <a:picLocks noChangeAspect="1"/>
           </p:cNvPicPr>
           <p:nvPr/>
         </p:nvPicPr>
         <p:blipFill>
-          <a:blip r:embed="rId2" cstate="print"/>
-          <a:srcRect/>
+          <a:blip r:embed="rId2" cstate="print">
+            <a:extLst>
+              <a:ext uri="{28A0092B-C50C-407E-A947-70E740481C1C}">
+                <a14:useLocalDpi xmlns="" xmlns:a14="http://schemas.microsoft.com/office/drawing/2010/main" val="0"/>
+              </a:ext>
+            </a:extLst>
+          </a:blip>
           <a:stretch>
             <a:fillRect/>
           </a:stretch>
         </p:blipFill>
-        <p:spPr bwMode="auto">
-          <a:xfrm>
-            <a:off x="4788024" y="2552745"/>
-            <a:ext cx="4059188" cy="1641732"/>
+        <p:spPr>
+          <a:xfrm>
+            <a:off x="3824699" y="5576322"/>
+            <a:ext cx="1543270" cy="1009770"/>
           </a:xfrm>
           <a:prstGeom prst="rect">
             <a:avLst/>
           </a:prstGeom>
-          <a:noFill/>
         </p:spPr>
       </p:pic>
+      <p:sp>
+        <p:nvSpPr>
+          <p:cNvPr id="4" name="Rektangel 3"/>
+          <p:cNvSpPr/>
+          <p:nvPr/>
+        </p:nvSpPr>
+        <p:spPr>
+          <a:xfrm>
+            <a:off x="2286000" y="3516166"/>
+            <a:ext cx="4572000" cy="276999"/>
+          </a:xfrm>
+          <a:prstGeom prst="rect">
+            <a:avLst/>
+          </a:prstGeom>
+        </p:spPr>
+        <p:txBody>
+          <a:bodyPr>
+            <a:spAutoFit/>
+          </a:bodyPr>
+          <a:lstStyle/>
+          <a:p>
+            <a:pPr marR="28575" algn="ctr">
+              <a:lnSpc>
+                <a:spcPct val="100000"/>
+              </a:lnSpc>
+            </a:pPr>
+            <a:r>
+              <a:rPr lang="en-US" sz="1200" kern="0" cap="all" spc="200" dirty="0" smtClean="0">
+                <a:solidFill>
+                  <a:schemeClr val="tx2">
+                    <a:lumMod val="50000"/>
+                  </a:schemeClr>
+                </a:solidFill>
+                <a:latin typeface="Arial"/>
+                <a:cs typeface="Arial"/>
+              </a:rPr>
+              <a:t>Jacob </a:t>
+            </a:r>
+            <a:r>
+              <a:rPr lang="en-US" sz="1200" kern="0" cap="all" spc="200" dirty="0" err="1" smtClean="0">
+                <a:solidFill>
+                  <a:schemeClr val="tx2">
+                    <a:lumMod val="50000"/>
+                  </a:schemeClr>
+                </a:solidFill>
+                <a:latin typeface="Arial"/>
+                <a:cs typeface="Arial"/>
+              </a:rPr>
+              <a:t>Karstensen</a:t>
+            </a:r>
+            <a:r>
+              <a:rPr lang="en-US" sz="1200" kern="0" cap="all" spc="200" dirty="0" smtClean="0">
+                <a:solidFill>
+                  <a:schemeClr val="tx2">
+                    <a:lumMod val="50000"/>
+                  </a:schemeClr>
+                </a:solidFill>
+                <a:latin typeface="Arial"/>
+                <a:cs typeface="Arial"/>
+              </a:rPr>
+              <a:t> Wortmann</a:t>
+            </a:r>
+            <a:endParaRPr lang="en-US" sz="1200" kern="0" cap="all" spc="200" dirty="0">
+              <a:solidFill>
+                <a:schemeClr val="tx2">
+                  <a:lumMod val="50000"/>
+                </a:schemeClr>
+              </a:solidFill>
+              <a:latin typeface="Arial"/>
+              <a:cs typeface="Arial"/>
+            </a:endParaRPr>
+          </a:p>
+        </p:txBody>
+      </p:sp>
     </p:spTree>
     <p:extLst>
       <p:ext uri="{BB962C8B-B14F-4D97-AF65-F5344CB8AC3E}">
-        <p14:creationId xmlns:p14="http://schemas.microsoft.com/office/powerpoint/2010/main" xmlns="" val="585023994"/>
+        <p14:creationId xmlns="" xmlns:p14="http://schemas.microsoft.com/office/powerpoint/2010/main" val="3425622471"/>
       </p:ext>
     </p:extLst>
   </p:cSld>
@@ -9967,7 +9939,7 @@
     <a:masterClrMapping/>
   </p:clrMapOvr>
   <mc:AlternateContent xmlns:mc="http://schemas.openxmlformats.org/markup-compatibility/2006">
-    <mc:Choice xmlns:p14="http://schemas.microsoft.com/office/powerpoint/2010/main" xmlns="" Requires="p14">
+    <mc:Choice xmlns="" xmlns:p14="http://schemas.microsoft.com/office/powerpoint/2010/main" Requires="p14">
       <p:transition p14:dur="250">
         <p:fade/>
       </p:transition>
@@ -10046,7 +10018,7 @@
                 <a:latin typeface="Arial"/>
                 <a:cs typeface="Arial"/>
               </a:rPr>
-              <a:t>Drag events</a:t>
+              <a:t>Drag and drop</a:t>
             </a:r>
             <a:endParaRPr sz="2400" kern="0" cap="all" spc="200" dirty="0">
               <a:solidFill>
@@ -10096,7 +10068,7 @@
                 <a:latin typeface="Arial"/>
                 <a:cs typeface="Arial"/>
               </a:rPr>
-              <a:t>Events</a:t>
+              <a:t>Touch listener</a:t>
             </a:r>
           </a:p>
           <a:p>
@@ -10105,8 +10077,24 @@
                 <a:spcPct val="100000"/>
               </a:lnSpc>
             </a:pPr>
-            <a:r>
-              <a:rPr lang="en-GB" sz="1400" spc="200" dirty="0" smtClean="0">
+            <a:endParaRPr lang="en-GB" b="1" cap="all" spc="200" dirty="0" smtClean="0">
+              <a:solidFill>
+                <a:schemeClr val="accent1">
+                  <a:lumMod val="75000"/>
+                </a:schemeClr>
+              </a:solidFill>
+              <a:latin typeface="Arial"/>
+              <a:cs typeface="Arial"/>
+            </a:endParaRPr>
+          </a:p>
+          <a:p>
+            <a:pPr marL="12700">
+              <a:lnSpc>
+                <a:spcPct val="100000"/>
+              </a:lnSpc>
+            </a:pPr>
+            <a:r>
+              <a:rPr lang="en-GB" b="1" cap="all" spc="200" dirty="0" smtClean="0">
                 <a:solidFill>
                   <a:schemeClr val="accent1">
                     <a:lumMod val="75000"/>
@@ -10115,54 +10103,9 @@
                 <a:latin typeface="Arial"/>
                 <a:cs typeface="Arial"/>
               </a:rPr>
-              <a:t>ACTION_DRAG_START</a:t>
-            </a:r>
-          </a:p>
-          <a:p>
-            <a:pPr marL="12700">
-              <a:lnSpc>
-                <a:spcPct val="100000"/>
-              </a:lnSpc>
-            </a:pPr>
-            <a:r>
-              <a:rPr lang="en-GB" sz="1400" spc="200" dirty="0" smtClean="0">
-                <a:solidFill>
-                  <a:schemeClr val="accent1">
-                    <a:lumMod val="75000"/>
-                  </a:schemeClr>
-                </a:solidFill>
-                <a:latin typeface="Arial"/>
-                <a:cs typeface="Arial"/>
-              </a:rPr>
-              <a:t>ACTION_DROP</a:t>
-            </a:r>
-          </a:p>
-          <a:p>
-            <a:pPr marL="12700">
-              <a:lnSpc>
-                <a:spcPct val="100000"/>
-              </a:lnSpc>
-            </a:pPr>
-            <a:r>
-              <a:rPr lang="en-GB" sz="1400" spc="200" dirty="0" smtClean="0">
-                <a:solidFill>
-                  <a:schemeClr val="accent1">
-                    <a:lumMod val="75000"/>
-                  </a:schemeClr>
-                </a:solidFill>
-                <a:latin typeface="Arial"/>
-                <a:cs typeface="Arial"/>
-              </a:rPr>
-              <a:t>ACTION_DRAG_ENDED</a:t>
-            </a:r>
-          </a:p>
-          <a:p>
-            <a:pPr marL="12700">
-              <a:lnSpc>
-                <a:spcPct val="100000"/>
-              </a:lnSpc>
-            </a:pPr>
-            <a:endParaRPr lang="da-DK" sz="1200" spc="200" dirty="0" smtClean="0">
+              <a:t>Drag listener</a:t>
+            </a:r>
+            <a:endParaRPr lang="da-DK" b="1" cap="all" spc="200" dirty="0" smtClean="0">
               <a:solidFill>
                 <a:schemeClr val="accent1">
                   <a:lumMod val="75000"/>
@@ -10398,10 +10341,36 @@
           </a:p>
         </p:txBody>
       </p:sp>
+      <p:pic>
+        <p:nvPicPr>
+          <p:cNvPr id="2050" name="Picture 2" descr="C:\Local git workspace\sw606f13\report\img\layoutexample.png"/>
+          <p:cNvPicPr>
+            <a:picLocks noChangeAspect="1" noChangeArrowheads="1"/>
+          </p:cNvPicPr>
+          <p:nvPr/>
+        </p:nvPicPr>
+        <p:blipFill>
+          <a:blip r:embed="rId2" cstate="print"/>
+          <a:srcRect/>
+          <a:stretch>
+            <a:fillRect/>
+          </a:stretch>
+        </p:blipFill>
+        <p:spPr bwMode="auto">
+          <a:xfrm>
+            <a:off x="4788024" y="2552745"/>
+            <a:ext cx="4059188" cy="1641732"/>
+          </a:xfrm>
+          <a:prstGeom prst="rect">
+            <a:avLst/>
+          </a:prstGeom>
+          <a:noFill/>
+        </p:spPr>
+      </p:pic>
     </p:spTree>
     <p:extLst>
       <p:ext uri="{BB962C8B-B14F-4D97-AF65-F5344CB8AC3E}">
-        <p14:creationId xmlns:p14="http://schemas.microsoft.com/office/powerpoint/2010/main" xmlns="" val="585023994"/>
+        <p14:creationId xmlns="" xmlns:p14="http://schemas.microsoft.com/office/powerpoint/2010/main" val="585023994"/>
       </p:ext>
     </p:extLst>
   </p:cSld>
@@ -10409,7 +10378,7 @@
     <a:masterClrMapping/>
   </p:clrMapOvr>
   <mc:AlternateContent xmlns:mc="http://schemas.openxmlformats.org/markup-compatibility/2006">
-    <mc:Choice xmlns:p14="http://schemas.microsoft.com/office/powerpoint/2010/main" xmlns="" Requires="p14">
+    <mc:Choice xmlns="" xmlns:p14="http://schemas.microsoft.com/office/powerpoint/2010/main" Requires="p14">
       <p:transition p14:dur="250">
         <p:fade/>
       </p:transition>
@@ -10488,19 +10457,7 @@
                 <a:latin typeface="Arial"/>
                 <a:cs typeface="Arial"/>
               </a:rPr>
-              <a:t>Game </a:t>
-            </a:r>
-            <a:r>
-              <a:rPr lang="en-GB" sz="2400" kern="0" cap="all" spc="200" dirty="0" err="1" smtClean="0">
-                <a:solidFill>
-                  <a:schemeClr val="tx2">
-                    <a:lumMod val="50000"/>
-                  </a:schemeClr>
-                </a:solidFill>
-                <a:latin typeface="Arial"/>
-                <a:cs typeface="Arial"/>
-              </a:rPr>
-              <a:t>Drawables</a:t>
+              <a:t>Drag events</a:t>
             </a:r>
             <a:endParaRPr sz="2400" kern="0" cap="all" spc="200" dirty="0">
               <a:solidFill>
@@ -10550,7 +10507,7 @@
                 <a:latin typeface="Arial"/>
                 <a:cs typeface="Arial"/>
               </a:rPr>
-              <a:t>Trains and wagons</a:t>
+              <a:t>Events</a:t>
             </a:r>
           </a:p>
           <a:p>
@@ -10560,7 +10517,7 @@
               </a:lnSpc>
             </a:pPr>
             <a:r>
-              <a:rPr lang="en-GB" sz="1400" cap="all" spc="200" dirty="0" smtClean="0">
+              <a:rPr lang="en-GB" sz="1400" spc="200" dirty="0" smtClean="0">
                 <a:solidFill>
                   <a:schemeClr val="accent1">
                     <a:lumMod val="75000"/>
@@ -10569,7 +10526,7 @@
                 <a:latin typeface="Arial"/>
                 <a:cs typeface="Arial"/>
               </a:rPr>
-              <a:t>Wheels</a:t>
+              <a:t>ACTION_DRAG_START</a:t>
             </a:r>
           </a:p>
           <a:p>
@@ -10579,7 +10536,7 @@
               </a:lnSpc>
             </a:pPr>
             <a:r>
-              <a:rPr lang="en-GB" sz="1400" cap="all" spc="200" dirty="0" smtClean="0">
+              <a:rPr lang="en-GB" sz="1400" spc="200" dirty="0" smtClean="0">
                 <a:solidFill>
                   <a:schemeClr val="accent1">
                     <a:lumMod val="75000"/>
@@ -10588,7 +10545,7 @@
                 <a:latin typeface="Arial"/>
                 <a:cs typeface="Arial"/>
               </a:rPr>
-              <a:t>Train Smoke</a:t>
+              <a:t>ACTION_DROP</a:t>
             </a:r>
           </a:p>
           <a:p>
@@ -10597,7 +10554,26 @@
                 <a:spcPct val="100000"/>
               </a:lnSpc>
             </a:pPr>
-            <a:endParaRPr lang="en-GB" sz="1600" b="1" cap="all" spc="200" dirty="0" smtClean="0">
+            <a:r>
+              <a:rPr lang="en-GB" sz="1400" spc="200" dirty="0" smtClean="0">
+                <a:solidFill>
+                  <a:schemeClr val="accent1">
+                    <a:lumMod val="75000"/>
+                  </a:schemeClr>
+                </a:solidFill>
+                <a:latin typeface="Arial"/>
+                <a:cs typeface="Arial"/>
+              </a:rPr>
+              <a:t>ACTION_DRAG_ENDED</a:t>
+            </a:r>
+          </a:p>
+          <a:p>
+            <a:pPr marL="12700">
+              <a:lnSpc>
+                <a:spcPct val="100000"/>
+              </a:lnSpc>
+            </a:pPr>
+            <a:endParaRPr lang="da-DK" sz="1200" spc="200" dirty="0" smtClean="0">
               <a:solidFill>
                 <a:schemeClr val="accent1">
                   <a:lumMod val="75000"/>
@@ -10606,155 +10582,6 @@
               <a:latin typeface="Arial"/>
               <a:cs typeface="Arial"/>
             </a:endParaRPr>
-          </a:p>
-          <a:p>
-            <a:pPr marL="12700">
-              <a:lnSpc>
-                <a:spcPct val="100000"/>
-              </a:lnSpc>
-            </a:pPr>
-            <a:r>
-              <a:rPr lang="en-GB" b="1" cap="all" spc="200" dirty="0" smtClean="0">
-                <a:solidFill>
-                  <a:schemeClr val="accent1">
-                    <a:lumMod val="75000"/>
-                  </a:schemeClr>
-                </a:solidFill>
-                <a:latin typeface="Arial"/>
-                <a:cs typeface="Arial"/>
-              </a:rPr>
-              <a:t>Station</a:t>
-            </a:r>
-          </a:p>
-          <a:p>
-            <a:pPr marL="12700">
-              <a:lnSpc>
-                <a:spcPct val="100000"/>
-              </a:lnSpc>
-            </a:pPr>
-            <a:r>
-              <a:rPr lang="en-GB" sz="1400" cap="all" spc="200" dirty="0" smtClean="0">
-                <a:solidFill>
-                  <a:schemeClr val="accent1">
-                    <a:lumMod val="75000"/>
-                  </a:schemeClr>
-                </a:solidFill>
-                <a:latin typeface="Arial"/>
-                <a:cs typeface="Arial"/>
-              </a:rPr>
-              <a:t>Random sequence</a:t>
-            </a:r>
-          </a:p>
-          <a:p>
-            <a:pPr marL="12700">
-              <a:lnSpc>
-                <a:spcPct val="100000"/>
-              </a:lnSpc>
-            </a:pPr>
-            <a:endParaRPr lang="en-GB" sz="1600" b="1" cap="all" spc="200" dirty="0" smtClean="0">
-              <a:solidFill>
-                <a:schemeClr val="accent1">
-                  <a:lumMod val="75000"/>
-                </a:schemeClr>
-              </a:solidFill>
-              <a:latin typeface="Arial"/>
-              <a:cs typeface="Arial"/>
-            </a:endParaRPr>
-          </a:p>
-          <a:p>
-            <a:pPr marL="12700">
-              <a:lnSpc>
-                <a:spcPct val="100000"/>
-              </a:lnSpc>
-            </a:pPr>
-            <a:r>
-              <a:rPr lang="en-GB" b="1" cap="all" spc="200" dirty="0" smtClean="0">
-                <a:solidFill>
-                  <a:schemeClr val="accent1">
-                    <a:lumMod val="75000"/>
-                  </a:schemeClr>
-                </a:solidFill>
-                <a:latin typeface="Arial"/>
-                <a:cs typeface="Arial"/>
-              </a:rPr>
-              <a:t>Game Background</a:t>
-            </a:r>
-          </a:p>
-          <a:p>
-            <a:pPr marL="12700">
-              <a:lnSpc>
-                <a:spcPct val="100000"/>
-              </a:lnSpc>
-            </a:pPr>
-            <a:r>
-              <a:rPr lang="en-GB" sz="1400" cap="all" spc="200" dirty="0" smtClean="0">
-                <a:solidFill>
-                  <a:schemeClr val="accent1">
-                    <a:lumMod val="75000"/>
-                  </a:schemeClr>
-                </a:solidFill>
-                <a:latin typeface="Arial"/>
-                <a:cs typeface="Arial"/>
-              </a:rPr>
-              <a:t>Hills</a:t>
-            </a:r>
-          </a:p>
-          <a:p>
-            <a:pPr marL="12700">
-              <a:lnSpc>
-                <a:spcPct val="100000"/>
-              </a:lnSpc>
-            </a:pPr>
-            <a:r>
-              <a:rPr lang="en-GB" sz="1400" cap="all" spc="200" dirty="0" smtClean="0">
-                <a:solidFill>
-                  <a:schemeClr val="accent1">
-                    <a:lumMod val="75000"/>
-                  </a:schemeClr>
-                </a:solidFill>
-                <a:latin typeface="Arial"/>
-                <a:cs typeface="Arial"/>
-              </a:rPr>
-              <a:t>Trees</a:t>
-            </a:r>
-          </a:p>
-          <a:p>
-            <a:pPr marL="12700">
-              <a:lnSpc>
-                <a:spcPct val="100000"/>
-              </a:lnSpc>
-            </a:pPr>
-            <a:r>
-              <a:rPr lang="en-GB" sz="1400" cap="all" spc="200" dirty="0" smtClean="0">
-                <a:solidFill>
-                  <a:schemeClr val="accent1">
-                    <a:lumMod val="75000"/>
-                  </a:schemeClr>
-                </a:solidFill>
-                <a:latin typeface="Arial"/>
-                <a:cs typeface="Arial"/>
-              </a:rPr>
-              <a:t>Cows</a:t>
-            </a:r>
-          </a:p>
-          <a:p>
-            <a:pPr marL="12700">
-              <a:lnSpc>
-                <a:spcPct val="100000"/>
-              </a:lnSpc>
-            </a:pPr>
-            <a:r>
-              <a:rPr lang="en-GB" sz="1400" cap="all" spc="200" dirty="0" smtClean="0">
-                <a:solidFill>
-                  <a:schemeClr val="accent1">
-                    <a:lumMod val="75000"/>
-                  </a:schemeClr>
-                </a:solidFill>
-                <a:latin typeface="Arial"/>
-                <a:cs typeface="Arial"/>
-              </a:rPr>
-              <a:t>Clouds</a:t>
-            </a:r>
           </a:p>
         </p:txBody>
       </p:sp>
@@ -10985,7 +10812,7 @@
     </p:spTree>
     <p:extLst>
       <p:ext uri="{BB962C8B-B14F-4D97-AF65-F5344CB8AC3E}">
-        <p14:creationId xmlns:p14="http://schemas.microsoft.com/office/powerpoint/2010/main" xmlns="" val="585023994"/>
+        <p14:creationId xmlns="" xmlns:p14="http://schemas.microsoft.com/office/powerpoint/2010/main" val="585023994"/>
       </p:ext>
     </p:extLst>
   </p:cSld>
@@ -10993,7 +10820,7 @@
     <a:masterClrMapping/>
   </p:clrMapOvr>
   <mc:AlternateContent xmlns:mc="http://schemas.openxmlformats.org/markup-compatibility/2006">
-    <mc:Choice xmlns:p14="http://schemas.microsoft.com/office/powerpoint/2010/main" xmlns="" Requires="p14">
+    <mc:Choice xmlns="" xmlns:p14="http://schemas.microsoft.com/office/powerpoint/2010/main" Requires="p14">
       <p:transition p14:dur="250">
         <p:fade/>
       </p:transition>
@@ -11034,17 +10861,328 @@
       <p:sp>
         <p:nvSpPr>
           <p:cNvPr id="2" name="object 2"/>
+          <p:cNvSpPr txBox="1"/>
+          <p:nvPr/>
+        </p:nvSpPr>
+        <p:spPr>
+          <a:xfrm>
+            <a:off x="626300" y="562800"/>
+            <a:ext cx="6231700" cy="368935"/>
+          </a:xfrm>
+          <a:prstGeom prst="rect">
+            <a:avLst/>
+          </a:prstGeom>
+        </p:spPr>
+        <p:txBody>
+          <a:bodyPr vert="horz" wrap="square" lIns="0" tIns="0" rIns="0" bIns="0" rtlCol="0">
+            <a:noAutofit/>
+          </a:bodyPr>
+          <a:lstStyle/>
+          <a:p>
+            <a:pPr marL="12700">
+              <a:lnSpc>
+                <a:spcPct val="100000"/>
+              </a:lnSpc>
+              <a:tabLst>
+                <a:tab pos="1641475" algn="l"/>
+                <a:tab pos="2152650" algn="l"/>
+                <a:tab pos="3412490" algn="l"/>
+              </a:tabLst>
+            </a:pPr>
+            <a:r>
+              <a:rPr lang="en-GB" sz="2400" kern="0" cap="all" spc="200" dirty="0" smtClean="0">
+                <a:solidFill>
+                  <a:schemeClr val="tx2">
+                    <a:lumMod val="50000"/>
+                  </a:schemeClr>
+                </a:solidFill>
+                <a:latin typeface="Arial"/>
+                <a:cs typeface="Arial"/>
+              </a:rPr>
+              <a:t>Game </a:t>
+            </a:r>
+            <a:r>
+              <a:rPr lang="en-GB" sz="2400" kern="0" cap="all" spc="200" dirty="0" err="1" smtClean="0">
+                <a:solidFill>
+                  <a:schemeClr val="tx2">
+                    <a:lumMod val="50000"/>
+                  </a:schemeClr>
+                </a:solidFill>
+                <a:latin typeface="Arial"/>
+                <a:cs typeface="Arial"/>
+              </a:rPr>
+              <a:t>Drawables</a:t>
+            </a:r>
+            <a:endParaRPr sz="2400" kern="0" cap="all" spc="200" dirty="0">
+              <a:solidFill>
+                <a:schemeClr val="tx2">
+                  <a:lumMod val="50000"/>
+                </a:schemeClr>
+              </a:solidFill>
+              <a:latin typeface="Arial"/>
+              <a:cs typeface="Arial"/>
+            </a:endParaRPr>
+          </a:p>
+        </p:txBody>
+      </p:sp>
+      <p:sp>
+        <p:nvSpPr>
+          <p:cNvPr id="3" name="object 3"/>
+          <p:cNvSpPr txBox="1"/>
+          <p:nvPr/>
+        </p:nvSpPr>
+        <p:spPr>
+          <a:xfrm>
+            <a:off x="626300" y="1155199"/>
+            <a:ext cx="5283200" cy="4074001"/>
+          </a:xfrm>
+          <a:prstGeom prst="rect">
+            <a:avLst/>
+          </a:prstGeom>
+        </p:spPr>
+        <p:txBody>
+          <a:bodyPr vert="horz" wrap="square" lIns="0" tIns="0" rIns="0" bIns="0" rtlCol="0">
+            <a:noAutofit/>
+          </a:bodyPr>
+          <a:lstStyle/>
+          <a:p>
+            <a:pPr marL="12700">
+              <a:lnSpc>
+                <a:spcPct val="100000"/>
+              </a:lnSpc>
+            </a:pPr>
+            <a:r>
+              <a:rPr lang="en-GB" b="1" cap="all" spc="200" dirty="0" smtClean="0">
+                <a:solidFill>
+                  <a:schemeClr val="accent1">
+                    <a:lumMod val="75000"/>
+                  </a:schemeClr>
+                </a:solidFill>
+                <a:latin typeface="Arial"/>
+                <a:cs typeface="Arial"/>
+              </a:rPr>
+              <a:t>Trains and wagons</a:t>
+            </a:r>
+          </a:p>
+          <a:p>
+            <a:pPr marL="12700">
+              <a:lnSpc>
+                <a:spcPct val="100000"/>
+              </a:lnSpc>
+            </a:pPr>
+            <a:r>
+              <a:rPr lang="en-GB" sz="1400" cap="all" spc="200" dirty="0" smtClean="0">
+                <a:solidFill>
+                  <a:schemeClr val="accent1">
+                    <a:lumMod val="75000"/>
+                  </a:schemeClr>
+                </a:solidFill>
+                <a:latin typeface="Arial"/>
+                <a:cs typeface="Arial"/>
+              </a:rPr>
+              <a:t>Wheels</a:t>
+            </a:r>
+          </a:p>
+          <a:p>
+            <a:pPr marL="12700">
+              <a:lnSpc>
+                <a:spcPct val="100000"/>
+              </a:lnSpc>
+            </a:pPr>
+            <a:r>
+              <a:rPr lang="en-GB" sz="1400" cap="all" spc="200" dirty="0" smtClean="0">
+                <a:solidFill>
+                  <a:schemeClr val="accent1">
+                    <a:lumMod val="75000"/>
+                  </a:schemeClr>
+                </a:solidFill>
+                <a:latin typeface="Arial"/>
+                <a:cs typeface="Arial"/>
+              </a:rPr>
+              <a:t>Train Smoke</a:t>
+            </a:r>
+          </a:p>
+          <a:p>
+            <a:pPr marL="12700">
+              <a:lnSpc>
+                <a:spcPct val="100000"/>
+              </a:lnSpc>
+            </a:pPr>
+            <a:endParaRPr lang="en-GB" sz="1600" b="1" cap="all" spc="200" dirty="0" smtClean="0">
+              <a:solidFill>
+                <a:schemeClr val="accent1">
+                  <a:lumMod val="75000"/>
+                </a:schemeClr>
+              </a:solidFill>
+              <a:latin typeface="Arial"/>
+              <a:cs typeface="Arial"/>
+            </a:endParaRPr>
+          </a:p>
+          <a:p>
+            <a:pPr marL="12700">
+              <a:lnSpc>
+                <a:spcPct val="100000"/>
+              </a:lnSpc>
+            </a:pPr>
+            <a:r>
+              <a:rPr lang="en-GB" b="1" cap="all" spc="200" dirty="0" smtClean="0">
+                <a:solidFill>
+                  <a:schemeClr val="accent1">
+                    <a:lumMod val="75000"/>
+                  </a:schemeClr>
+                </a:solidFill>
+                <a:latin typeface="Arial"/>
+                <a:cs typeface="Arial"/>
+              </a:rPr>
+              <a:t>Station</a:t>
+            </a:r>
+          </a:p>
+          <a:p>
+            <a:pPr marL="12700">
+              <a:lnSpc>
+                <a:spcPct val="100000"/>
+              </a:lnSpc>
+            </a:pPr>
+            <a:r>
+              <a:rPr lang="en-GB" sz="1400" cap="all" spc="200" dirty="0" smtClean="0">
+                <a:solidFill>
+                  <a:schemeClr val="accent1">
+                    <a:lumMod val="75000"/>
+                  </a:schemeClr>
+                </a:solidFill>
+                <a:latin typeface="Arial"/>
+                <a:cs typeface="Arial"/>
+              </a:rPr>
+              <a:t>Random sequence</a:t>
+            </a:r>
+          </a:p>
+          <a:p>
+            <a:pPr marL="12700">
+              <a:lnSpc>
+                <a:spcPct val="100000"/>
+              </a:lnSpc>
+            </a:pPr>
+            <a:endParaRPr lang="en-GB" sz="1600" b="1" cap="all" spc="200" dirty="0" smtClean="0">
+              <a:solidFill>
+                <a:schemeClr val="accent1">
+                  <a:lumMod val="75000"/>
+                </a:schemeClr>
+              </a:solidFill>
+              <a:latin typeface="Arial"/>
+              <a:cs typeface="Arial"/>
+            </a:endParaRPr>
+          </a:p>
+          <a:p>
+            <a:pPr marL="12700">
+              <a:lnSpc>
+                <a:spcPct val="100000"/>
+              </a:lnSpc>
+            </a:pPr>
+            <a:r>
+              <a:rPr lang="en-GB" b="1" cap="all" spc="200" dirty="0" smtClean="0">
+                <a:solidFill>
+                  <a:schemeClr val="accent1">
+                    <a:lumMod val="75000"/>
+                  </a:schemeClr>
+                </a:solidFill>
+                <a:latin typeface="Arial"/>
+                <a:cs typeface="Arial"/>
+              </a:rPr>
+              <a:t>Game Background</a:t>
+            </a:r>
+          </a:p>
+          <a:p>
+            <a:pPr marL="12700">
+              <a:lnSpc>
+                <a:spcPct val="100000"/>
+              </a:lnSpc>
+            </a:pPr>
+            <a:r>
+              <a:rPr lang="en-GB" sz="1400" cap="all" spc="200" dirty="0" smtClean="0">
+                <a:solidFill>
+                  <a:schemeClr val="accent1">
+                    <a:lumMod val="75000"/>
+                  </a:schemeClr>
+                </a:solidFill>
+                <a:latin typeface="Arial"/>
+                <a:cs typeface="Arial"/>
+              </a:rPr>
+              <a:t>Hills</a:t>
+            </a:r>
+          </a:p>
+          <a:p>
+            <a:pPr marL="12700">
+              <a:lnSpc>
+                <a:spcPct val="100000"/>
+              </a:lnSpc>
+            </a:pPr>
+            <a:r>
+              <a:rPr lang="en-GB" sz="1400" cap="all" spc="200" dirty="0" smtClean="0">
+                <a:solidFill>
+                  <a:schemeClr val="accent1">
+                    <a:lumMod val="75000"/>
+                  </a:schemeClr>
+                </a:solidFill>
+                <a:latin typeface="Arial"/>
+                <a:cs typeface="Arial"/>
+              </a:rPr>
+              <a:t>Trees</a:t>
+            </a:r>
+          </a:p>
+          <a:p>
+            <a:pPr marL="12700">
+              <a:lnSpc>
+                <a:spcPct val="100000"/>
+              </a:lnSpc>
+            </a:pPr>
+            <a:r>
+              <a:rPr lang="en-GB" sz="1400" cap="all" spc="200" dirty="0" smtClean="0">
+                <a:solidFill>
+                  <a:schemeClr val="accent1">
+                    <a:lumMod val="75000"/>
+                  </a:schemeClr>
+                </a:solidFill>
+                <a:latin typeface="Arial"/>
+                <a:cs typeface="Arial"/>
+              </a:rPr>
+              <a:t>Cows</a:t>
+            </a:r>
+          </a:p>
+          <a:p>
+            <a:pPr marL="12700">
+              <a:lnSpc>
+                <a:spcPct val="100000"/>
+              </a:lnSpc>
+            </a:pPr>
+            <a:r>
+              <a:rPr lang="en-GB" sz="1400" cap="all" spc="200" dirty="0" smtClean="0">
+                <a:solidFill>
+                  <a:schemeClr val="accent1">
+                    <a:lumMod val="75000"/>
+                  </a:schemeClr>
+                </a:solidFill>
+                <a:latin typeface="Arial"/>
+                <a:cs typeface="Arial"/>
+              </a:rPr>
+              <a:t>Clouds</a:t>
+            </a:r>
+          </a:p>
+        </p:txBody>
+      </p:sp>
+      <p:sp>
+        <p:nvSpPr>
+          <p:cNvPr id="8" name="object 4"/>
           <p:cNvSpPr txBox="1">
             <a:spLocks noGrp="1"/>
           </p:cNvSpPr>
           <p:nvPr>
-            <p:ph type="title"/>
+            <p:ph type="ftr" sz="quarter" idx="4294967295"/>
           </p:nvPr>
         </p:nvSpPr>
         <p:spPr>
           <a:xfrm>
-            <a:off x="1827956" y="2420888"/>
-            <a:ext cx="5536756" cy="1023270"/>
+            <a:off x="2540146" y="5952019"/>
+            <a:ext cx="4343400" cy="143981"/>
           </a:xfrm>
           <a:prstGeom prst="rect">
             <a:avLst/>
@@ -11056,30 +11194,99 @@
           </a:bodyPr>
           <a:lstStyle/>
           <a:p>
-            <a:pPr marR="0" algn="ctr">
-              <a:lnSpc>
-                <a:spcPts val="3960"/>
-              </a:lnSpc>
-              <a:tabLst>
-                <a:tab pos="1676400" algn="l"/>
-              </a:tabLst>
-            </a:pPr>
-            <a:r>
-              <a:rPr lang="da-DK" sz="3600" b="1" dirty="0" smtClean="0">
-                <a:solidFill>
-                  <a:schemeClr val="tx2">
-                    <a:lumMod val="50000"/>
-                  </a:schemeClr>
-                </a:solidFill>
-                <a:latin typeface="Arial"/>
-                <a:cs typeface="Arial"/>
-              </a:rPr>
-              <a:t>Conclusion</a:t>
-            </a:r>
-            <a:endParaRPr sz="3600" b="1" dirty="0">
-              <a:solidFill>
-                <a:schemeClr val="tx2">
+            <a:pPr marL="12700">
+              <a:lnSpc>
+                <a:spcPct val="100000"/>
+              </a:lnSpc>
+            </a:pPr>
+            <a:fld id="{9561DEC8-19EE-4A79-9D71-66FF6B3E3434}" type="slidenum">
+              <a:rPr lang="da-DK" sz="850" b="1" kern="0" cap="all" spc="200" smtClean="0">
+                <a:solidFill>
+                  <a:schemeClr val="tx1">
+                    <a:lumMod val="50000"/>
+                    <a:lumOff val="50000"/>
+                  </a:schemeClr>
+                </a:solidFill>
+                <a:latin typeface="Arial"/>
+                <a:cs typeface="Arial"/>
+              </a:rPr>
+              <a:pPr marL="12700">
+                <a:lnSpc>
+                  <a:spcPct val="100000"/>
+                </a:lnSpc>
+              </a:pPr>
+              <a:t>25</a:t>
+            </a:fld>
+            <a:r>
+              <a:rPr lang="da-DK" sz="850" b="1" kern="0" cap="all" spc="200" dirty="0" smtClean="0">
+                <a:solidFill>
+                  <a:schemeClr val="tx1">
+                    <a:lumMod val="50000"/>
+                    <a:lumOff val="50000"/>
+                  </a:schemeClr>
+                </a:solidFill>
+                <a:latin typeface="Arial"/>
+                <a:cs typeface="Arial"/>
+              </a:rPr>
+              <a:t> </a:t>
+            </a:r>
+            <a:r>
+              <a:rPr sz="850" b="1" kern="0" cap="all" spc="200" dirty="0" smtClean="0">
+                <a:solidFill>
+                  <a:schemeClr val="tx1">
+                    <a:lumMod val="50000"/>
+                    <a:lumOff val="50000"/>
+                  </a:schemeClr>
+                </a:solidFill>
+                <a:latin typeface="Arial"/>
+                <a:cs typeface="Arial"/>
+              </a:rPr>
+              <a:t>OF</a:t>
+            </a:r>
+            <a:r>
+              <a:rPr lang="da-DK" sz="850" b="1" kern="0" cap="all" spc="200" dirty="0" smtClean="0">
+                <a:solidFill>
+                  <a:schemeClr val="tx1">
+                    <a:lumMod val="50000"/>
+                    <a:lumOff val="50000"/>
+                  </a:schemeClr>
+                </a:solidFill>
+                <a:latin typeface="Arial"/>
+                <a:cs typeface="Arial"/>
+              </a:rPr>
+              <a:t> </a:t>
+            </a:r>
+            <a:r>
+              <a:rPr lang="da-DK" sz="850" b="1" kern="0" cap="all" spc="200" dirty="0">
+                <a:solidFill>
+                  <a:schemeClr val="tx1">
+                    <a:lumMod val="50000"/>
+                    <a:lumOff val="50000"/>
+                  </a:schemeClr>
+                </a:solidFill>
+                <a:latin typeface="Arial"/>
+                <a:cs typeface="Arial"/>
+              </a:rPr>
+              <a:t>24  | </a:t>
+            </a:r>
+            <a:r>
+              <a:rPr lang="da-DK" sz="850" b="1" kern="0" spc="200" dirty="0" smtClean="0">
+                <a:solidFill>
+                  <a:schemeClr val="tx1">
+                    <a:lumMod val="50000"/>
+                    <a:lumOff val="50000"/>
+                  </a:schemeClr>
+                </a:solidFill>
+                <a:latin typeface="Arial"/>
+                <a:cs typeface="Arial"/>
+              </a:rPr>
+              <a:t>26.06.2013</a:t>
+            </a:r>
+            <a:endParaRPr sz="850" kern="0" cap="all" spc="200" dirty="0">
+              <a:solidFill>
+                <a:schemeClr val="tx1">
                   <a:lumMod val="50000"/>
+                  <a:lumOff val="50000"/>
                 </a:schemeClr>
               </a:solidFill>
               <a:latin typeface="Arial"/>
@@ -11088,102 +11295,96 @@
           </a:p>
         </p:txBody>
       </p:sp>
-      <p:pic>
-        <p:nvPicPr>
-          <p:cNvPr id="10" name="Billede 9"/>
-          <p:cNvPicPr>
-            <a:picLocks noChangeAspect="1"/>
-          </p:cNvPicPr>
+      <p:sp>
+        <p:nvSpPr>
+          <p:cNvPr id="9" name="object 7"/>
+          <p:cNvSpPr txBox="1"/>
           <p:nvPr/>
-        </p:nvPicPr>
-        <p:blipFill>
-          <a:blip r:embed="rId2" cstate="print">
-            <a:extLst>
-              <a:ext uri="{28A0092B-C50C-407E-A947-70E740481C1C}">
-                <a14:useLocalDpi xmlns:a14="http://schemas.microsoft.com/office/drawing/2010/main" xmlns="" val="0"/>
-              </a:ext>
-            </a:extLst>
-          </a:blip>
-          <a:stretch>
-            <a:fillRect/>
-          </a:stretch>
-        </p:blipFill>
+        </p:nvSpPr>
         <p:spPr>
           <a:xfrm>
-            <a:off x="3824699" y="5576322"/>
-            <a:ext cx="1543270" cy="1009770"/>
+            <a:off x="2743200" y="6137888"/>
+            <a:ext cx="3682706" cy="294005"/>
           </a:xfrm>
           <a:prstGeom prst="rect">
             <a:avLst/>
           </a:prstGeom>
         </p:spPr>
-      </p:pic>
-      <p:sp>
-        <p:nvSpPr>
-          <p:cNvPr id="4" name="Rektangel 3"/>
-          <p:cNvSpPr/>
-          <p:nvPr/>
-        </p:nvSpPr>
-        <p:spPr>
-          <a:xfrm>
-            <a:off x="2286000" y="3516166"/>
-            <a:ext cx="4572000" cy="276999"/>
-          </a:xfrm>
-          <a:prstGeom prst="rect">
-            <a:avLst/>
-          </a:prstGeom>
-        </p:spPr>
-        <p:txBody>
-          <a:bodyPr>
-            <a:spAutoFit/>
+        <p:txBody>
+          <a:bodyPr vert="horz" wrap="square" lIns="0" tIns="0" rIns="0" bIns="0" rtlCol="0">
+            <a:noAutofit/>
           </a:bodyPr>
           <a:lstStyle/>
           <a:p>
-            <a:pPr marR="28575" algn="ctr">
-              <a:lnSpc>
-                <a:spcPct val="100000"/>
-              </a:lnSpc>
-            </a:pPr>
-            <a:r>
-              <a:rPr lang="en-US" sz="1200" kern="0" cap="all" spc="200" dirty="0" smtClean="0">
-                <a:solidFill>
-                  <a:schemeClr val="tx2">
-                    <a:lumMod val="50000"/>
-                  </a:schemeClr>
-                </a:solidFill>
-                <a:latin typeface="Arial"/>
-                <a:cs typeface="Arial"/>
-              </a:rPr>
-              <a:t>Jacob </a:t>
-            </a:r>
-            <a:r>
-              <a:rPr lang="en-US" sz="1200" kern="0" cap="all" spc="200" dirty="0" err="1" smtClean="0">
-                <a:solidFill>
-                  <a:schemeClr val="tx2">
-                    <a:lumMod val="50000"/>
-                  </a:schemeClr>
-                </a:solidFill>
-                <a:latin typeface="Arial"/>
-                <a:cs typeface="Arial"/>
-              </a:rPr>
-              <a:t>Karstensen</a:t>
-            </a:r>
-            <a:r>
-              <a:rPr lang="en-US" sz="1200" kern="0" cap="all" spc="200" dirty="0" smtClean="0">
-                <a:solidFill>
-                  <a:schemeClr val="tx2">
-                    <a:lumMod val="50000"/>
-                  </a:schemeClr>
-                </a:solidFill>
-                <a:latin typeface="Arial"/>
-                <a:cs typeface="Arial"/>
-              </a:rPr>
-              <a:t> Wortmann</a:t>
-            </a:r>
-            <a:endParaRPr lang="en-US" sz="1200" kern="0" cap="all" spc="200" dirty="0">
-              <a:solidFill>
-                <a:schemeClr val="tx2">
+            <a:pPr algn="ctr">
+              <a:lnSpc>
+                <a:spcPct val="100000"/>
+              </a:lnSpc>
+            </a:pPr>
+            <a:r>
+              <a:rPr lang="da-DK" sz="850" b="1" kern="0" cap="all" spc="200" dirty="0" smtClean="0">
+                <a:solidFill>
+                  <a:schemeClr val="tx1">
+                    <a:lumMod val="50000"/>
+                    <a:lumOff val="50000"/>
+                  </a:schemeClr>
+                </a:solidFill>
+                <a:latin typeface="Arial"/>
+                <a:cs typeface="Arial"/>
+              </a:rPr>
+              <a:t>Department of computer science</a:t>
+            </a:r>
+            <a:endParaRPr sz="850" b="1" kern="0" cap="all" spc="200" dirty="0" smtClean="0">
+              <a:solidFill>
+                <a:schemeClr val="tx1">
                   <a:lumMod val="50000"/>
+                  <a:lumOff val="50000"/>
+                </a:schemeClr>
+              </a:solidFill>
+              <a:latin typeface="Arial"/>
+              <a:cs typeface="Arial"/>
+            </a:endParaRPr>
+          </a:p>
+          <a:p>
+            <a:pPr marR="20320" algn="ctr">
+              <a:lnSpc>
+                <a:spcPct val="100000"/>
+              </a:lnSpc>
+              <a:spcBef>
+                <a:spcPts val="180"/>
+              </a:spcBef>
+            </a:pPr>
+            <a:r>
+              <a:rPr sz="850" kern="0" cap="all" spc="200" dirty="0" smtClean="0">
+                <a:solidFill>
+                  <a:schemeClr val="tx1">
+                    <a:lumMod val="50000"/>
+                    <a:lumOff val="50000"/>
+                  </a:schemeClr>
+                </a:solidFill>
+                <a:latin typeface="Arial"/>
+                <a:cs typeface="Arial"/>
+              </a:rPr>
+              <a:t>AALBORG</a:t>
+            </a:r>
+            <a:r>
+              <a:rPr lang="da-DK" sz="850" kern="0" cap="all" spc="200" dirty="0" smtClean="0">
+                <a:solidFill>
+                  <a:schemeClr val="tx1">
+                    <a:lumMod val="50000"/>
+                    <a:lumOff val="50000"/>
+                  </a:schemeClr>
+                </a:solidFill>
+                <a:latin typeface="Arial"/>
+                <a:cs typeface="Arial"/>
+              </a:rPr>
+              <a:t> UNIVERSITy</a:t>
+            </a:r>
+            <a:endParaRPr sz="850" kern="0" cap="all" spc="200" dirty="0">
+              <a:solidFill>
+                <a:schemeClr val="tx1">
+                  <a:lumMod val="50000"/>
+                  <a:lumOff val="50000"/>
                 </a:schemeClr>
               </a:solidFill>
               <a:latin typeface="Arial"/>
@@ -11195,7 +11396,7 @@
     </p:spTree>
     <p:extLst>
       <p:ext uri="{BB962C8B-B14F-4D97-AF65-F5344CB8AC3E}">
-        <p14:creationId xmlns:p14="http://schemas.microsoft.com/office/powerpoint/2010/main" xmlns="" val="3425622471"/>
+        <p14:creationId xmlns="" xmlns:p14="http://schemas.microsoft.com/office/powerpoint/2010/main" val="585023994"/>
       </p:ext>
     </p:extLst>
   </p:cSld>
@@ -11203,7 +11404,7 @@
     <a:masterClrMapping/>
   </p:clrMapOvr>
   <mc:AlternateContent xmlns:mc="http://schemas.openxmlformats.org/markup-compatibility/2006">
-    <mc:Choice xmlns:p14="http://schemas.microsoft.com/office/powerpoint/2010/main" xmlns="" Requires="p14">
+    <mc:Choice xmlns="" xmlns:p14="http://schemas.microsoft.com/office/powerpoint/2010/main" Requires="p14">
       <p:transition p14:dur="250">
         <p:fade/>
       </p:transition>
@@ -11244,13 +11445,17 @@
       <p:sp>
         <p:nvSpPr>
           <p:cNvPr id="2" name="object 2"/>
-          <p:cNvSpPr txBox="1"/>
-          <p:nvPr/>
+          <p:cNvSpPr txBox="1">
+            <a:spLocks noGrp="1"/>
+          </p:cNvSpPr>
+          <p:nvPr>
+            <p:ph type="title"/>
+          </p:nvPr>
         </p:nvSpPr>
         <p:spPr>
           <a:xfrm>
-            <a:off x="626300" y="562800"/>
-            <a:ext cx="6231700" cy="368935"/>
+            <a:off x="1827956" y="2420888"/>
+            <a:ext cx="5536756" cy="1023270"/>
           </a:xfrm>
           <a:prstGeom prst="rect">
             <a:avLst/>
@@ -11262,18 +11467,16 @@
           </a:bodyPr>
           <a:lstStyle/>
           <a:p>
-            <a:pPr marL="12700">
-              <a:lnSpc>
-                <a:spcPct val="100000"/>
+            <a:pPr marR="0" algn="ctr">
+              <a:lnSpc>
+                <a:spcPts val="3960"/>
               </a:lnSpc>
               <a:tabLst>
-                <a:tab pos="1641475" algn="l"/>
-                <a:tab pos="2152650" algn="l"/>
-                <a:tab pos="3412490" algn="l"/>
+                <a:tab pos="1676400" algn="l"/>
               </a:tabLst>
             </a:pPr>
             <a:r>
-              <a:rPr lang="da-DK" sz="2400" b="1" kern="0" cap="all" spc="200" dirty="0" smtClean="0">
+              <a:rPr lang="da-DK" sz="3600" b="1" dirty="0" smtClean="0">
                 <a:solidFill>
                   <a:schemeClr val="tx2">
                     <a:lumMod val="50000"/>
@@ -11284,7 +11487,7 @@
               </a:rPr>
               <a:t>Conclusion</a:t>
             </a:r>
-            <a:endParaRPr sz="2400" kern="0" cap="all" spc="200" dirty="0">
+            <a:endParaRPr sz="3600" b="1" dirty="0">
               <a:solidFill>
                 <a:schemeClr val="tx2">
                   <a:lumMod val="50000"/>
@@ -11296,479 +11499,106 @@
           </a:p>
         </p:txBody>
       </p:sp>
-      <p:sp>
-        <p:nvSpPr>
-          <p:cNvPr id="3" name="object 3"/>
-          <p:cNvSpPr txBox="1"/>
+      <p:pic>
+        <p:nvPicPr>
+          <p:cNvPr id="10" name="Billede 9"/>
+          <p:cNvPicPr>
+            <a:picLocks noChangeAspect="1"/>
+          </p:cNvPicPr>
           <p:nvPr/>
-        </p:nvSpPr>
+        </p:nvPicPr>
+        <p:blipFill>
+          <a:blip r:embed="rId2" cstate="print">
+            <a:extLst>
+              <a:ext uri="{28A0092B-C50C-407E-A947-70E740481C1C}">
+                <a14:useLocalDpi xmlns="" xmlns:a14="http://schemas.microsoft.com/office/drawing/2010/main" val="0"/>
+              </a:ext>
+            </a:extLst>
+          </a:blip>
+          <a:stretch>
+            <a:fillRect/>
+          </a:stretch>
+        </p:blipFill>
         <p:spPr>
           <a:xfrm>
-            <a:off x="626300" y="1155199"/>
-            <a:ext cx="5283200" cy="4074001"/>
+            <a:off x="3824699" y="5576322"/>
+            <a:ext cx="1543270" cy="1009770"/>
           </a:xfrm>
           <a:prstGeom prst="rect">
             <a:avLst/>
           </a:prstGeom>
         </p:spPr>
-        <p:txBody>
-          <a:bodyPr vert="horz" wrap="square" lIns="0" tIns="0" rIns="0" bIns="0" rtlCol="0">
-            <a:noAutofit/>
-          </a:bodyPr>
-          <a:lstStyle/>
-          <a:p>
-            <a:pPr marL="12700">
-              <a:lnSpc>
-                <a:spcPct val="100000"/>
-              </a:lnSpc>
-            </a:pPr>
-            <a:r>
-              <a:rPr lang="en-GB" b="1" cap="all" spc="200" dirty="0" smtClean="0">
-                <a:solidFill>
-                  <a:schemeClr val="accent1">
-                    <a:lumMod val="75000"/>
-                  </a:schemeClr>
-                </a:solidFill>
-                <a:latin typeface="Arial"/>
-                <a:cs typeface="Arial"/>
-              </a:rPr>
-              <a:t>Problem statement</a:t>
-            </a:r>
-          </a:p>
-          <a:p>
-            <a:pPr marL="12700">
-              <a:lnSpc>
-                <a:spcPct val="100000"/>
-              </a:lnSpc>
-            </a:pPr>
-            <a:endParaRPr lang="en-GB" b="1" cap="all" spc="200" dirty="0" smtClean="0">
-              <a:solidFill>
-                <a:schemeClr val="accent1">
-                  <a:lumMod val="75000"/>
-                </a:schemeClr>
-              </a:solidFill>
-              <a:latin typeface="Arial"/>
-              <a:cs typeface="Arial"/>
-            </a:endParaRPr>
-          </a:p>
-          <a:p>
-            <a:pPr marL="12700">
-              <a:lnSpc>
-                <a:spcPct val="100000"/>
-              </a:lnSpc>
-            </a:pPr>
-            <a:endParaRPr lang="en-GB" b="1" cap="all" spc="200" dirty="0" smtClean="0">
-              <a:solidFill>
-                <a:schemeClr val="accent1">
-                  <a:lumMod val="75000"/>
-                </a:schemeClr>
-              </a:solidFill>
-              <a:latin typeface="Arial"/>
-              <a:cs typeface="Arial"/>
-            </a:endParaRPr>
-          </a:p>
-          <a:p>
-            <a:pPr marL="12700">
-              <a:lnSpc>
-                <a:spcPct val="100000"/>
-              </a:lnSpc>
-            </a:pPr>
-            <a:endParaRPr lang="en-GB" b="1" cap="all" spc="200" dirty="0" smtClean="0">
-              <a:solidFill>
-                <a:schemeClr val="accent1">
-                  <a:lumMod val="75000"/>
-                </a:schemeClr>
-              </a:solidFill>
-              <a:latin typeface="Arial"/>
-              <a:cs typeface="Arial"/>
-            </a:endParaRPr>
-          </a:p>
-          <a:p>
-            <a:pPr marL="12700">
-              <a:lnSpc>
-                <a:spcPct val="100000"/>
-              </a:lnSpc>
-            </a:pPr>
-            <a:endParaRPr lang="en-GB" b="1" cap="all" spc="200" dirty="0" smtClean="0">
-              <a:solidFill>
-                <a:schemeClr val="accent1">
-                  <a:lumMod val="75000"/>
-                </a:schemeClr>
-              </a:solidFill>
-              <a:latin typeface="Arial"/>
-              <a:cs typeface="Arial"/>
-            </a:endParaRPr>
-          </a:p>
-          <a:p>
-            <a:pPr marL="12700">
-              <a:lnSpc>
-                <a:spcPct val="100000"/>
-              </a:lnSpc>
-            </a:pPr>
-            <a:r>
-              <a:rPr lang="en-GB" b="1" cap="all" spc="200" dirty="0" smtClean="0">
-                <a:solidFill>
-                  <a:schemeClr val="accent1">
-                    <a:lumMod val="75000"/>
-                  </a:schemeClr>
-                </a:solidFill>
-                <a:latin typeface="Arial"/>
-                <a:cs typeface="Arial"/>
-              </a:rPr>
-              <a:t>Customization</a:t>
-            </a:r>
-          </a:p>
-          <a:p>
-            <a:pPr marL="12700">
-              <a:lnSpc>
-                <a:spcPct val="100000"/>
-              </a:lnSpc>
-            </a:pPr>
-            <a:endParaRPr lang="en-GB" b="1" cap="all" spc="200" dirty="0" smtClean="0">
-              <a:solidFill>
-                <a:schemeClr val="accent1">
-                  <a:lumMod val="75000"/>
-                </a:schemeClr>
-              </a:solidFill>
-              <a:latin typeface="Arial"/>
-              <a:cs typeface="Arial"/>
-            </a:endParaRPr>
-          </a:p>
-          <a:p>
-            <a:pPr marL="12700">
-              <a:lnSpc>
-                <a:spcPct val="100000"/>
-              </a:lnSpc>
-            </a:pPr>
-            <a:r>
-              <a:rPr lang="en-GB" b="1" cap="all" spc="200" dirty="0" smtClean="0">
-                <a:solidFill>
-                  <a:schemeClr val="accent1">
-                    <a:lumMod val="75000"/>
-                  </a:schemeClr>
-                </a:solidFill>
-                <a:latin typeface="Arial"/>
-                <a:cs typeface="Arial"/>
-              </a:rPr>
-              <a:t>Managing games</a:t>
-            </a:r>
-          </a:p>
-          <a:p>
-            <a:pPr marL="12700">
-              <a:lnSpc>
-                <a:spcPct val="100000"/>
-              </a:lnSpc>
-            </a:pPr>
-            <a:endParaRPr lang="en-GB" b="1" cap="all" spc="200" dirty="0" smtClean="0">
-              <a:solidFill>
-                <a:schemeClr val="accent1">
-                  <a:lumMod val="75000"/>
-                </a:schemeClr>
-              </a:solidFill>
-              <a:latin typeface="Arial"/>
-              <a:cs typeface="Arial"/>
-            </a:endParaRPr>
-          </a:p>
-          <a:p>
-            <a:pPr marL="12700">
-              <a:lnSpc>
-                <a:spcPct val="100000"/>
-              </a:lnSpc>
-            </a:pPr>
-            <a:r>
-              <a:rPr lang="en-GB" b="1" cap="all" spc="200" dirty="0" smtClean="0">
-                <a:solidFill>
-                  <a:schemeClr val="accent1">
-                    <a:lumMod val="75000"/>
-                  </a:schemeClr>
-                </a:solidFill>
-                <a:latin typeface="Arial"/>
-                <a:cs typeface="Arial"/>
-              </a:rPr>
-              <a:t>Easy to start</a:t>
-            </a:r>
-          </a:p>
-        </p:txBody>
-      </p:sp>
-      <p:sp>
-        <p:nvSpPr>
-          <p:cNvPr id="8" name="object 4"/>
-          <p:cNvSpPr txBox="1">
-            <a:spLocks noGrp="1"/>
-          </p:cNvSpPr>
-          <p:nvPr>
-            <p:ph type="ftr" sz="quarter" idx="4294967295"/>
-          </p:nvPr>
+      </p:pic>
+      <p:sp>
+        <p:nvSpPr>
+          <p:cNvPr id="4" name="Rektangel 3"/>
+          <p:cNvSpPr/>
+          <p:nvPr/>
         </p:nvSpPr>
         <p:spPr>
           <a:xfrm>
-            <a:off x="2540146" y="5952019"/>
-            <a:ext cx="4343400" cy="143981"/>
+            <a:off x="2286000" y="3516166"/>
+            <a:ext cx="4572000" cy="276999"/>
           </a:xfrm>
           <a:prstGeom prst="rect">
             <a:avLst/>
           </a:prstGeom>
         </p:spPr>
         <p:txBody>
-          <a:bodyPr vert="horz" wrap="square" lIns="0" tIns="0" rIns="0" bIns="0" rtlCol="0">
-            <a:noAutofit/>
-          </a:bodyPr>
-          <a:lstStyle/>
-          <a:p>
-            <a:pPr marL="12700">
-              <a:lnSpc>
-                <a:spcPct val="100000"/>
-              </a:lnSpc>
-            </a:pPr>
-            <a:fld id="{9561DEC8-19EE-4A79-9D71-66FF6B3E3434}" type="slidenum">
-              <a:rPr lang="da-DK" sz="850" b="1" kern="0" cap="all" spc="200" smtClean="0">
-                <a:solidFill>
-                  <a:schemeClr val="tx1">
-                    <a:lumMod val="50000"/>
-                    <a:lumOff val="50000"/>
-                  </a:schemeClr>
-                </a:solidFill>
-                <a:latin typeface="Arial"/>
-                <a:cs typeface="Arial"/>
-              </a:rPr>
-              <a:pPr marL="12700">
-                <a:lnSpc>
-                  <a:spcPct val="100000"/>
-                </a:lnSpc>
-              </a:pPr>
-              <a:t>26</a:t>
-            </a:fld>
-            <a:r>
-              <a:rPr lang="da-DK" sz="850" b="1" kern="0" cap="all" spc="200" dirty="0" smtClean="0">
-                <a:solidFill>
-                  <a:schemeClr val="tx1">
-                    <a:lumMod val="50000"/>
-                    <a:lumOff val="50000"/>
-                  </a:schemeClr>
-                </a:solidFill>
-                <a:latin typeface="Arial"/>
-                <a:cs typeface="Arial"/>
-              </a:rPr>
-              <a:t> </a:t>
-            </a:r>
-            <a:r>
-              <a:rPr sz="850" b="1" kern="0" cap="all" spc="200" dirty="0" smtClean="0">
-                <a:solidFill>
-                  <a:schemeClr val="tx1">
-                    <a:lumMod val="50000"/>
-                    <a:lumOff val="50000"/>
-                  </a:schemeClr>
-                </a:solidFill>
-                <a:latin typeface="Arial"/>
-                <a:cs typeface="Arial"/>
-              </a:rPr>
-              <a:t>OF</a:t>
-            </a:r>
-            <a:r>
-              <a:rPr lang="da-DK" sz="850" b="1" kern="0" cap="all" spc="200" dirty="0" smtClean="0">
-                <a:solidFill>
-                  <a:schemeClr val="tx1">
-                    <a:lumMod val="50000"/>
-                    <a:lumOff val="50000"/>
-                  </a:schemeClr>
-                </a:solidFill>
-                <a:latin typeface="Arial"/>
-                <a:cs typeface="Arial"/>
-              </a:rPr>
-              <a:t> 24</a:t>
-            </a:r>
-            <a:r>
-              <a:rPr sz="850" b="1" kern="0" cap="all" spc="200" dirty="0" smtClean="0">
-                <a:solidFill>
-                  <a:schemeClr val="tx1">
-                    <a:lumMod val="50000"/>
-                    <a:lumOff val="50000"/>
-                  </a:schemeClr>
-                </a:solidFill>
-                <a:latin typeface="Arial"/>
-                <a:cs typeface="Arial"/>
-              </a:rPr>
-              <a:t> </a:t>
-            </a:r>
-            <a:r>
-              <a:rPr lang="da-DK" sz="850" b="1" kern="0" cap="all" spc="200" dirty="0" smtClean="0">
-                <a:solidFill>
-                  <a:schemeClr val="tx1">
-                    <a:lumMod val="50000"/>
-                    <a:lumOff val="50000"/>
-                  </a:schemeClr>
-                </a:solidFill>
-                <a:latin typeface="Arial"/>
-                <a:cs typeface="Arial"/>
-              </a:rPr>
-              <a:t> | </a:t>
-            </a:r>
-            <a:r>
-              <a:rPr lang="da-DK" sz="850" b="1" kern="0" spc="200" dirty="0" smtClean="0">
-                <a:solidFill>
-                  <a:schemeClr val="tx1">
-                    <a:lumMod val="50000"/>
-                    <a:lumOff val="50000"/>
-                  </a:schemeClr>
-                </a:solidFill>
-                <a:latin typeface="Arial"/>
-                <a:cs typeface="Arial"/>
-              </a:rPr>
-              <a:t>26.06.2013</a:t>
-            </a:r>
-            <a:endParaRPr sz="850" kern="0" cap="all" spc="200" dirty="0">
-              <a:solidFill>
-                <a:schemeClr val="tx1">
-                  <a:lumMod val="50000"/>
-                  <a:lumOff val="50000"/>
-                </a:schemeClr>
-              </a:solidFill>
-              <a:latin typeface="Arial"/>
-              <a:cs typeface="Arial"/>
-            </a:endParaRPr>
-          </a:p>
-        </p:txBody>
-      </p:sp>
-      <p:sp>
-        <p:nvSpPr>
-          <p:cNvPr id="9" name="object 7"/>
-          <p:cNvSpPr txBox="1"/>
-          <p:nvPr/>
-        </p:nvSpPr>
-        <p:spPr>
-          <a:xfrm>
-            <a:off x="2743200" y="6137888"/>
-            <a:ext cx="3682706" cy="294005"/>
-          </a:xfrm>
-          <a:prstGeom prst="rect">
-            <a:avLst/>
-          </a:prstGeom>
-        </p:spPr>
-        <p:txBody>
-          <a:bodyPr vert="horz" wrap="square" lIns="0" tIns="0" rIns="0" bIns="0" rtlCol="0">
-            <a:noAutofit/>
-          </a:bodyPr>
-          <a:lstStyle/>
-          <a:p>
-            <a:pPr algn="ctr">
-              <a:lnSpc>
-                <a:spcPct val="100000"/>
-              </a:lnSpc>
-            </a:pPr>
-            <a:r>
-              <a:rPr lang="da-DK" sz="850" b="1" kern="0" cap="all" spc="200" dirty="0" smtClean="0">
-                <a:solidFill>
-                  <a:schemeClr val="tx1">
-                    <a:lumMod val="50000"/>
-                    <a:lumOff val="50000"/>
-                  </a:schemeClr>
-                </a:solidFill>
-                <a:latin typeface="Arial"/>
-                <a:cs typeface="Arial"/>
-              </a:rPr>
-              <a:t>Department of computer science</a:t>
-            </a:r>
-            <a:endParaRPr sz="850" b="1" kern="0" cap="all" spc="200" dirty="0" smtClean="0">
-              <a:solidFill>
-                <a:schemeClr val="tx1">
-                  <a:lumMod val="50000"/>
-                  <a:lumOff val="50000"/>
-                </a:schemeClr>
-              </a:solidFill>
-              <a:latin typeface="Arial"/>
-              <a:cs typeface="Arial"/>
-            </a:endParaRPr>
-          </a:p>
-          <a:p>
-            <a:pPr marR="20320" algn="ctr">
-              <a:lnSpc>
-                <a:spcPct val="100000"/>
-              </a:lnSpc>
-              <a:spcBef>
-                <a:spcPts val="180"/>
-              </a:spcBef>
-            </a:pPr>
-            <a:r>
-              <a:rPr sz="850" kern="0" cap="all" spc="200" dirty="0" smtClean="0">
-                <a:solidFill>
-                  <a:schemeClr val="tx1">
-                    <a:lumMod val="50000"/>
-                    <a:lumOff val="50000"/>
-                  </a:schemeClr>
-                </a:solidFill>
-                <a:latin typeface="Arial"/>
-                <a:cs typeface="Arial"/>
-              </a:rPr>
-              <a:t>AALBORG</a:t>
-            </a:r>
-            <a:r>
-              <a:rPr lang="da-DK" sz="850" kern="0" cap="all" spc="200" dirty="0" smtClean="0">
-                <a:solidFill>
-                  <a:schemeClr val="tx1">
-                    <a:lumMod val="50000"/>
-                    <a:lumOff val="50000"/>
-                  </a:schemeClr>
-                </a:solidFill>
-                <a:latin typeface="Arial"/>
-                <a:cs typeface="Arial"/>
-              </a:rPr>
-              <a:t> UNIVERSITy</a:t>
-            </a:r>
-            <a:endParaRPr sz="850" kern="0" cap="all" spc="200" dirty="0">
-              <a:solidFill>
-                <a:schemeClr val="tx1">
-                  <a:lumMod val="50000"/>
-                  <a:lumOff val="50000"/>
-                </a:schemeClr>
-              </a:solidFill>
-              <a:latin typeface="Arial"/>
-              <a:cs typeface="Arial"/>
-            </a:endParaRPr>
-          </a:p>
-        </p:txBody>
-      </p:sp>
-      <p:sp>
-        <p:nvSpPr>
-          <p:cNvPr id="6" name="TextBox 5"/>
-          <p:cNvSpPr txBox="1"/>
-          <p:nvPr/>
-        </p:nvSpPr>
-        <p:spPr>
-          <a:xfrm>
-            <a:off x="1403648" y="1700808"/>
-            <a:ext cx="6048672" cy="523220"/>
-          </a:xfrm>
-          <a:prstGeom prst="rect">
-            <a:avLst/>
-          </a:prstGeom>
-          <a:noFill/>
-        </p:spPr>
-        <p:txBody>
-          <a:bodyPr wrap="square" rtlCol="0">
+          <a:bodyPr>
             <a:spAutoFit/>
           </a:bodyPr>
           <a:lstStyle/>
           <a:p>
-            <a:r>
-              <a:rPr lang="en-US" sz="1400" dirty="0" smtClean="0">
-                <a:solidFill>
-                  <a:schemeClr val="accent1">
-                    <a:lumMod val="75000"/>
-                  </a:schemeClr>
-                </a:solidFill>
-                <a:latin typeface="Arial" pitchFamily="34" charset="0"/>
-                <a:cs typeface="Arial" pitchFamily="34" charset="0"/>
-              </a:rPr>
-              <a:t>“In what ways can we aid the pedagogues in their work with children with autism, by digitalizing a physical exercise onto an android tablet?”</a:t>
-            </a:r>
-            <a:endParaRPr lang="da-DK" sz="1400" dirty="0">
-              <a:solidFill>
-                <a:schemeClr val="accent1">
-                  <a:lumMod val="75000"/>
+            <a:pPr marR="28575" algn="ctr">
+              <a:lnSpc>
+                <a:spcPct val="100000"/>
+              </a:lnSpc>
+            </a:pPr>
+            <a:r>
+              <a:rPr lang="en-US" sz="1200" kern="0" cap="all" spc="200" dirty="0" smtClean="0">
+                <a:solidFill>
+                  <a:schemeClr val="tx2">
+                    <a:lumMod val="50000"/>
+                  </a:schemeClr>
+                </a:solidFill>
+                <a:latin typeface="Arial"/>
+                <a:cs typeface="Arial"/>
+              </a:rPr>
+              <a:t>Jacob </a:t>
+            </a:r>
+            <a:r>
+              <a:rPr lang="en-US" sz="1200" kern="0" cap="all" spc="200" dirty="0" err="1" smtClean="0">
+                <a:solidFill>
+                  <a:schemeClr val="tx2">
+                    <a:lumMod val="50000"/>
+                  </a:schemeClr>
+                </a:solidFill>
+                <a:latin typeface="Arial"/>
+                <a:cs typeface="Arial"/>
+              </a:rPr>
+              <a:t>Karstensen</a:t>
+            </a:r>
+            <a:r>
+              <a:rPr lang="en-US" sz="1200" kern="0" cap="all" spc="200" dirty="0" smtClean="0">
+                <a:solidFill>
+                  <a:schemeClr val="tx2">
+                    <a:lumMod val="50000"/>
+                  </a:schemeClr>
+                </a:solidFill>
+                <a:latin typeface="Arial"/>
+                <a:cs typeface="Arial"/>
+              </a:rPr>
+              <a:t> Wortmann</a:t>
+            </a:r>
+            <a:endParaRPr lang="en-US" sz="1200" kern="0" cap="all" spc="200" dirty="0">
+              <a:solidFill>
+                <a:schemeClr val="tx2">
+                  <a:lumMod val="50000"/>
                 </a:schemeClr>
               </a:solidFill>
-              <a:latin typeface="Arial" pitchFamily="34" charset="0"/>
-              <a:cs typeface="Arial" pitchFamily="34" charset="0"/>
+              <a:latin typeface="Arial"/>
+              <a:cs typeface="Arial"/>
             </a:endParaRPr>
           </a:p>
         </p:txBody>
@@ -11776,7 +11606,7 @@
     </p:spTree>
     <p:extLst>
       <p:ext uri="{BB962C8B-B14F-4D97-AF65-F5344CB8AC3E}">
-        <p14:creationId xmlns:p14="http://schemas.microsoft.com/office/powerpoint/2010/main" xmlns="" val="772562590"/>
+        <p14:creationId xmlns="" xmlns:p14="http://schemas.microsoft.com/office/powerpoint/2010/main" val="3425622471"/>
       </p:ext>
     </p:extLst>
   </p:cSld>
@@ -11784,7 +11614,7 @@
     <a:masterClrMapping/>
   </p:clrMapOvr>
   <mc:AlternateContent xmlns:mc="http://schemas.openxmlformats.org/markup-compatibility/2006">
-    <mc:Choice xmlns:p14="http://schemas.microsoft.com/office/powerpoint/2010/main" xmlns="" Requires="p14">
+    <mc:Choice xmlns="" xmlns:p14="http://schemas.microsoft.com/office/powerpoint/2010/main" Requires="p14">
       <p:transition p14:dur="250">
         <p:fade/>
       </p:transition>
@@ -11825,6 +11655,587 @@
       <p:sp>
         <p:nvSpPr>
           <p:cNvPr id="2" name="object 2"/>
+          <p:cNvSpPr txBox="1"/>
+          <p:nvPr/>
+        </p:nvSpPr>
+        <p:spPr>
+          <a:xfrm>
+            <a:off x="626300" y="562800"/>
+            <a:ext cx="6231700" cy="368935"/>
+          </a:xfrm>
+          <a:prstGeom prst="rect">
+            <a:avLst/>
+          </a:prstGeom>
+        </p:spPr>
+        <p:txBody>
+          <a:bodyPr vert="horz" wrap="square" lIns="0" tIns="0" rIns="0" bIns="0" rtlCol="0">
+            <a:noAutofit/>
+          </a:bodyPr>
+          <a:lstStyle/>
+          <a:p>
+            <a:pPr marL="12700">
+              <a:lnSpc>
+                <a:spcPct val="100000"/>
+              </a:lnSpc>
+              <a:tabLst>
+                <a:tab pos="1641475" algn="l"/>
+                <a:tab pos="2152650" algn="l"/>
+                <a:tab pos="3412490" algn="l"/>
+              </a:tabLst>
+            </a:pPr>
+            <a:r>
+              <a:rPr lang="da-DK" sz="2400" b="1" kern="0" cap="all" spc="200" dirty="0" smtClean="0">
+                <a:solidFill>
+                  <a:schemeClr val="tx2">
+                    <a:lumMod val="50000"/>
+                  </a:schemeClr>
+                </a:solidFill>
+                <a:latin typeface="Arial"/>
+                <a:cs typeface="Arial"/>
+              </a:rPr>
+              <a:t>Conclusion</a:t>
+            </a:r>
+            <a:endParaRPr sz="2400" kern="0" cap="all" spc="200" dirty="0">
+              <a:solidFill>
+                <a:schemeClr val="tx2">
+                  <a:lumMod val="50000"/>
+                </a:schemeClr>
+              </a:solidFill>
+              <a:latin typeface="Arial"/>
+              <a:cs typeface="Arial"/>
+            </a:endParaRPr>
+          </a:p>
+        </p:txBody>
+      </p:sp>
+      <p:sp>
+        <p:nvSpPr>
+          <p:cNvPr id="3" name="object 3"/>
+          <p:cNvSpPr txBox="1"/>
+          <p:nvPr/>
+        </p:nvSpPr>
+        <p:spPr>
+          <a:xfrm>
+            <a:off x="626300" y="1155199"/>
+            <a:ext cx="5283200" cy="4074001"/>
+          </a:xfrm>
+          <a:prstGeom prst="rect">
+            <a:avLst/>
+          </a:prstGeom>
+        </p:spPr>
+        <p:txBody>
+          <a:bodyPr vert="horz" wrap="square" lIns="0" tIns="0" rIns="0" bIns="0" rtlCol="0">
+            <a:noAutofit/>
+          </a:bodyPr>
+          <a:lstStyle/>
+          <a:p>
+            <a:pPr marL="12700">
+              <a:lnSpc>
+                <a:spcPct val="100000"/>
+              </a:lnSpc>
+            </a:pPr>
+            <a:r>
+              <a:rPr lang="en-GB" b="1" cap="all" spc="200" dirty="0" smtClean="0">
+                <a:solidFill>
+                  <a:schemeClr val="accent1">
+                    <a:lumMod val="75000"/>
+                  </a:schemeClr>
+                </a:solidFill>
+                <a:latin typeface="Arial"/>
+                <a:cs typeface="Arial"/>
+              </a:rPr>
+              <a:t>Problem statement</a:t>
+            </a:r>
+          </a:p>
+          <a:p>
+            <a:pPr marL="12700">
+              <a:lnSpc>
+                <a:spcPct val="100000"/>
+              </a:lnSpc>
+            </a:pPr>
+            <a:endParaRPr lang="en-GB" b="1" cap="all" spc="200" dirty="0" smtClean="0">
+              <a:solidFill>
+                <a:schemeClr val="accent1">
+                  <a:lumMod val="75000"/>
+                </a:schemeClr>
+              </a:solidFill>
+              <a:latin typeface="Arial"/>
+              <a:cs typeface="Arial"/>
+            </a:endParaRPr>
+          </a:p>
+          <a:p>
+            <a:pPr marL="12700">
+              <a:lnSpc>
+                <a:spcPct val="100000"/>
+              </a:lnSpc>
+            </a:pPr>
+            <a:endParaRPr lang="en-GB" b="1" cap="all" spc="200" dirty="0" smtClean="0">
+              <a:solidFill>
+                <a:schemeClr val="accent1">
+                  <a:lumMod val="75000"/>
+                </a:schemeClr>
+              </a:solidFill>
+              <a:latin typeface="Arial"/>
+              <a:cs typeface="Arial"/>
+            </a:endParaRPr>
+          </a:p>
+          <a:p>
+            <a:pPr marL="12700">
+              <a:lnSpc>
+                <a:spcPct val="100000"/>
+              </a:lnSpc>
+            </a:pPr>
+            <a:endParaRPr lang="en-GB" b="1" cap="all" spc="200" dirty="0" smtClean="0">
+              <a:solidFill>
+                <a:schemeClr val="accent1">
+                  <a:lumMod val="75000"/>
+                </a:schemeClr>
+              </a:solidFill>
+              <a:latin typeface="Arial"/>
+              <a:cs typeface="Arial"/>
+            </a:endParaRPr>
+          </a:p>
+          <a:p>
+            <a:pPr marL="12700">
+              <a:lnSpc>
+                <a:spcPct val="100000"/>
+              </a:lnSpc>
+            </a:pPr>
+            <a:endParaRPr lang="en-GB" b="1" cap="all" spc="200" dirty="0" smtClean="0">
+              <a:solidFill>
+                <a:schemeClr val="accent1">
+                  <a:lumMod val="75000"/>
+                </a:schemeClr>
+              </a:solidFill>
+              <a:latin typeface="Arial"/>
+              <a:cs typeface="Arial"/>
+            </a:endParaRPr>
+          </a:p>
+          <a:p>
+            <a:pPr marL="12700">
+              <a:lnSpc>
+                <a:spcPct val="100000"/>
+              </a:lnSpc>
+            </a:pPr>
+            <a:r>
+              <a:rPr lang="en-GB" b="1" cap="all" spc="200" dirty="0" smtClean="0">
+                <a:solidFill>
+                  <a:schemeClr val="accent1">
+                    <a:lumMod val="75000"/>
+                  </a:schemeClr>
+                </a:solidFill>
+                <a:latin typeface="Arial"/>
+                <a:cs typeface="Arial"/>
+              </a:rPr>
+              <a:t>Customization</a:t>
+            </a:r>
+          </a:p>
+          <a:p>
+            <a:pPr marL="12700">
+              <a:lnSpc>
+                <a:spcPct val="100000"/>
+              </a:lnSpc>
+            </a:pPr>
+            <a:endParaRPr lang="en-GB" b="1" cap="all" spc="200" dirty="0" smtClean="0">
+              <a:solidFill>
+                <a:schemeClr val="accent1">
+                  <a:lumMod val="75000"/>
+                </a:schemeClr>
+              </a:solidFill>
+              <a:latin typeface="Arial"/>
+              <a:cs typeface="Arial"/>
+            </a:endParaRPr>
+          </a:p>
+          <a:p>
+            <a:pPr marL="12700">
+              <a:lnSpc>
+                <a:spcPct val="100000"/>
+              </a:lnSpc>
+            </a:pPr>
+            <a:r>
+              <a:rPr lang="en-GB" b="1" cap="all" spc="200" dirty="0" smtClean="0">
+                <a:solidFill>
+                  <a:schemeClr val="accent1">
+                    <a:lumMod val="75000"/>
+                  </a:schemeClr>
+                </a:solidFill>
+                <a:latin typeface="Arial"/>
+                <a:cs typeface="Arial"/>
+              </a:rPr>
+              <a:t>Managing games</a:t>
+            </a:r>
+          </a:p>
+          <a:p>
+            <a:pPr marL="12700">
+              <a:lnSpc>
+                <a:spcPct val="100000"/>
+              </a:lnSpc>
+            </a:pPr>
+            <a:endParaRPr lang="en-GB" b="1" cap="all" spc="200" dirty="0" smtClean="0">
+              <a:solidFill>
+                <a:schemeClr val="accent1">
+                  <a:lumMod val="75000"/>
+                </a:schemeClr>
+              </a:solidFill>
+              <a:latin typeface="Arial"/>
+              <a:cs typeface="Arial"/>
+            </a:endParaRPr>
+          </a:p>
+          <a:p>
+            <a:pPr marL="12700">
+              <a:lnSpc>
+                <a:spcPct val="100000"/>
+              </a:lnSpc>
+            </a:pPr>
+            <a:r>
+              <a:rPr lang="en-GB" b="1" cap="all" spc="200" dirty="0" smtClean="0">
+                <a:solidFill>
+                  <a:schemeClr val="accent1">
+                    <a:lumMod val="75000"/>
+                  </a:schemeClr>
+                </a:solidFill>
+                <a:latin typeface="Arial"/>
+                <a:cs typeface="Arial"/>
+              </a:rPr>
+              <a:t>Easy to start</a:t>
+            </a:r>
+          </a:p>
+        </p:txBody>
+      </p:sp>
+      <p:sp>
+        <p:nvSpPr>
+          <p:cNvPr id="8" name="object 4"/>
+          <p:cNvSpPr txBox="1">
+            <a:spLocks noGrp="1"/>
+          </p:cNvSpPr>
+          <p:nvPr>
+            <p:ph type="ftr" sz="quarter" idx="4294967295"/>
+          </p:nvPr>
+        </p:nvSpPr>
+        <p:spPr>
+          <a:xfrm>
+            <a:off x="2540146" y="5952019"/>
+            <a:ext cx="4343400" cy="143981"/>
+          </a:xfrm>
+          <a:prstGeom prst="rect">
+            <a:avLst/>
+          </a:prstGeom>
+        </p:spPr>
+        <p:txBody>
+          <a:bodyPr vert="horz" wrap="square" lIns="0" tIns="0" rIns="0" bIns="0" rtlCol="0">
+            <a:noAutofit/>
+          </a:bodyPr>
+          <a:lstStyle/>
+          <a:p>
+            <a:pPr marL="12700">
+              <a:lnSpc>
+                <a:spcPct val="100000"/>
+              </a:lnSpc>
+            </a:pPr>
+            <a:fld id="{9561DEC8-19EE-4A79-9D71-66FF6B3E3434}" type="slidenum">
+              <a:rPr lang="da-DK" sz="850" b="1" kern="0" cap="all" spc="200" smtClean="0">
+                <a:solidFill>
+                  <a:schemeClr val="tx1">
+                    <a:lumMod val="50000"/>
+                    <a:lumOff val="50000"/>
+                  </a:schemeClr>
+                </a:solidFill>
+                <a:latin typeface="Arial"/>
+                <a:cs typeface="Arial"/>
+              </a:rPr>
+              <a:pPr marL="12700">
+                <a:lnSpc>
+                  <a:spcPct val="100000"/>
+                </a:lnSpc>
+              </a:pPr>
+              <a:t>27</a:t>
+            </a:fld>
+            <a:r>
+              <a:rPr lang="da-DK" sz="850" b="1" kern="0" cap="all" spc="200" dirty="0" smtClean="0">
+                <a:solidFill>
+                  <a:schemeClr val="tx1">
+                    <a:lumMod val="50000"/>
+                    <a:lumOff val="50000"/>
+                  </a:schemeClr>
+                </a:solidFill>
+                <a:latin typeface="Arial"/>
+                <a:cs typeface="Arial"/>
+              </a:rPr>
+              <a:t> </a:t>
+            </a:r>
+            <a:r>
+              <a:rPr sz="850" b="1" kern="0" cap="all" spc="200" dirty="0" smtClean="0">
+                <a:solidFill>
+                  <a:schemeClr val="tx1">
+                    <a:lumMod val="50000"/>
+                    <a:lumOff val="50000"/>
+                  </a:schemeClr>
+                </a:solidFill>
+                <a:latin typeface="Arial"/>
+                <a:cs typeface="Arial"/>
+              </a:rPr>
+              <a:t>OF</a:t>
+            </a:r>
+            <a:r>
+              <a:rPr lang="da-DK" sz="850" b="1" kern="0" cap="all" spc="200" dirty="0" smtClean="0">
+                <a:solidFill>
+                  <a:schemeClr val="tx1">
+                    <a:lumMod val="50000"/>
+                    <a:lumOff val="50000"/>
+                  </a:schemeClr>
+                </a:solidFill>
+                <a:latin typeface="Arial"/>
+                <a:cs typeface="Arial"/>
+              </a:rPr>
+              <a:t> 24</a:t>
+            </a:r>
+            <a:r>
+              <a:rPr sz="850" b="1" kern="0" cap="all" spc="200" dirty="0" smtClean="0">
+                <a:solidFill>
+                  <a:schemeClr val="tx1">
+                    <a:lumMod val="50000"/>
+                    <a:lumOff val="50000"/>
+                  </a:schemeClr>
+                </a:solidFill>
+                <a:latin typeface="Arial"/>
+                <a:cs typeface="Arial"/>
+              </a:rPr>
+              <a:t> </a:t>
+            </a:r>
+            <a:r>
+              <a:rPr lang="da-DK" sz="850" b="1" kern="0" cap="all" spc="200" dirty="0" smtClean="0">
+                <a:solidFill>
+                  <a:schemeClr val="tx1">
+                    <a:lumMod val="50000"/>
+                    <a:lumOff val="50000"/>
+                  </a:schemeClr>
+                </a:solidFill>
+                <a:latin typeface="Arial"/>
+                <a:cs typeface="Arial"/>
+              </a:rPr>
+              <a:t> | </a:t>
+            </a:r>
+            <a:r>
+              <a:rPr lang="da-DK" sz="850" b="1" kern="0" spc="200" dirty="0" smtClean="0">
+                <a:solidFill>
+                  <a:schemeClr val="tx1">
+                    <a:lumMod val="50000"/>
+                    <a:lumOff val="50000"/>
+                  </a:schemeClr>
+                </a:solidFill>
+                <a:latin typeface="Arial"/>
+                <a:cs typeface="Arial"/>
+              </a:rPr>
+              <a:t>26.06.2013</a:t>
+            </a:r>
+            <a:endParaRPr sz="850" kern="0" cap="all" spc="200" dirty="0">
+              <a:solidFill>
+                <a:schemeClr val="tx1">
+                  <a:lumMod val="50000"/>
+                  <a:lumOff val="50000"/>
+                </a:schemeClr>
+              </a:solidFill>
+              <a:latin typeface="Arial"/>
+              <a:cs typeface="Arial"/>
+            </a:endParaRPr>
+          </a:p>
+        </p:txBody>
+      </p:sp>
+      <p:sp>
+        <p:nvSpPr>
+          <p:cNvPr id="9" name="object 7"/>
+          <p:cNvSpPr txBox="1"/>
+          <p:nvPr/>
+        </p:nvSpPr>
+        <p:spPr>
+          <a:xfrm>
+            <a:off x="2743200" y="6137888"/>
+            <a:ext cx="3682706" cy="294005"/>
+          </a:xfrm>
+          <a:prstGeom prst="rect">
+            <a:avLst/>
+          </a:prstGeom>
+        </p:spPr>
+        <p:txBody>
+          <a:bodyPr vert="horz" wrap="square" lIns="0" tIns="0" rIns="0" bIns="0" rtlCol="0">
+            <a:noAutofit/>
+          </a:bodyPr>
+          <a:lstStyle/>
+          <a:p>
+            <a:pPr algn="ctr">
+              <a:lnSpc>
+                <a:spcPct val="100000"/>
+              </a:lnSpc>
+            </a:pPr>
+            <a:r>
+              <a:rPr lang="da-DK" sz="850" b="1" kern="0" cap="all" spc="200" dirty="0" smtClean="0">
+                <a:solidFill>
+                  <a:schemeClr val="tx1">
+                    <a:lumMod val="50000"/>
+                    <a:lumOff val="50000"/>
+                  </a:schemeClr>
+                </a:solidFill>
+                <a:latin typeface="Arial"/>
+                <a:cs typeface="Arial"/>
+              </a:rPr>
+              <a:t>Department of computer science</a:t>
+            </a:r>
+            <a:endParaRPr sz="850" b="1" kern="0" cap="all" spc="200" dirty="0" smtClean="0">
+              <a:solidFill>
+                <a:schemeClr val="tx1">
+                  <a:lumMod val="50000"/>
+                  <a:lumOff val="50000"/>
+                </a:schemeClr>
+              </a:solidFill>
+              <a:latin typeface="Arial"/>
+              <a:cs typeface="Arial"/>
+            </a:endParaRPr>
+          </a:p>
+          <a:p>
+            <a:pPr marR="20320" algn="ctr">
+              <a:lnSpc>
+                <a:spcPct val="100000"/>
+              </a:lnSpc>
+              <a:spcBef>
+                <a:spcPts val="180"/>
+              </a:spcBef>
+            </a:pPr>
+            <a:r>
+              <a:rPr sz="850" kern="0" cap="all" spc="200" dirty="0" smtClean="0">
+                <a:solidFill>
+                  <a:schemeClr val="tx1">
+                    <a:lumMod val="50000"/>
+                    <a:lumOff val="50000"/>
+                  </a:schemeClr>
+                </a:solidFill>
+                <a:latin typeface="Arial"/>
+                <a:cs typeface="Arial"/>
+              </a:rPr>
+              <a:t>AALBORG</a:t>
+            </a:r>
+            <a:r>
+              <a:rPr lang="da-DK" sz="850" kern="0" cap="all" spc="200" dirty="0" smtClean="0">
+                <a:solidFill>
+                  <a:schemeClr val="tx1">
+                    <a:lumMod val="50000"/>
+                    <a:lumOff val="50000"/>
+                  </a:schemeClr>
+                </a:solidFill>
+                <a:latin typeface="Arial"/>
+                <a:cs typeface="Arial"/>
+              </a:rPr>
+              <a:t> UNIVERSITy</a:t>
+            </a:r>
+            <a:endParaRPr sz="850" kern="0" cap="all" spc="200" dirty="0">
+              <a:solidFill>
+                <a:schemeClr val="tx1">
+                  <a:lumMod val="50000"/>
+                  <a:lumOff val="50000"/>
+                </a:schemeClr>
+              </a:solidFill>
+              <a:latin typeface="Arial"/>
+              <a:cs typeface="Arial"/>
+            </a:endParaRPr>
+          </a:p>
+        </p:txBody>
+      </p:sp>
+      <p:sp>
+        <p:nvSpPr>
+          <p:cNvPr id="6" name="TextBox 5"/>
+          <p:cNvSpPr txBox="1"/>
+          <p:nvPr/>
+        </p:nvSpPr>
+        <p:spPr>
+          <a:xfrm>
+            <a:off x="1403648" y="1700808"/>
+            <a:ext cx="6048672" cy="523220"/>
+          </a:xfrm>
+          <a:prstGeom prst="rect">
+            <a:avLst/>
+          </a:prstGeom>
+          <a:noFill/>
+        </p:spPr>
+        <p:txBody>
+          <a:bodyPr wrap="square" rtlCol="0">
+            <a:spAutoFit/>
+          </a:bodyPr>
+          <a:lstStyle/>
+          <a:p>
+            <a:r>
+              <a:rPr lang="en-US" sz="1400" dirty="0" smtClean="0">
+                <a:solidFill>
+                  <a:schemeClr val="accent1">
+                    <a:lumMod val="75000"/>
+                  </a:schemeClr>
+                </a:solidFill>
+                <a:latin typeface="Arial" pitchFamily="34" charset="0"/>
+                <a:cs typeface="Arial" pitchFamily="34" charset="0"/>
+              </a:rPr>
+              <a:t>“In what ways can we aid the pedagogues in their work with children with autism, by digitalizing a physical exercise onto an android tablet?”</a:t>
+            </a:r>
+            <a:endParaRPr lang="da-DK" sz="1400" dirty="0">
+              <a:solidFill>
+                <a:schemeClr val="accent1">
+                  <a:lumMod val="75000"/>
+                </a:schemeClr>
+              </a:solidFill>
+              <a:latin typeface="Arial" pitchFamily="34" charset="0"/>
+              <a:cs typeface="Arial" pitchFamily="34" charset="0"/>
+            </a:endParaRPr>
+          </a:p>
+        </p:txBody>
+      </p:sp>
+    </p:spTree>
+    <p:extLst>
+      <p:ext uri="{BB962C8B-B14F-4D97-AF65-F5344CB8AC3E}">
+        <p14:creationId xmlns="" xmlns:p14="http://schemas.microsoft.com/office/powerpoint/2010/main" val="772562590"/>
+      </p:ext>
+    </p:extLst>
+  </p:cSld>
+  <p:clrMapOvr>
+    <a:masterClrMapping/>
+  </p:clrMapOvr>
+  <mc:AlternateContent xmlns:mc="http://schemas.openxmlformats.org/markup-compatibility/2006">
+    <mc:Choice xmlns="" xmlns:p14="http://schemas.microsoft.com/office/powerpoint/2010/main" Requires="p14">
+      <p:transition p14:dur="250">
+        <p:fade/>
+      </p:transition>
+    </mc:Choice>
+    <mc:Fallback>
+      <p:transition>
+        <p:fade/>
+      </p:transition>
+    </mc:Fallback>
+  </mc:AlternateContent>
+  <p:timing>
+    <p:tnLst>
+      <p:par>
+        <p:cTn id="1" dur="indefinite" restart="never" nodeType="tmRoot"/>
+      </p:par>
+    </p:tnLst>
+  </p:timing>
+</p:sld>
+</file>
+
+<file path=ppt/slides/slide28.xml><?xml version="1.0" encoding="utf-8"?>
+<p:sld xmlns:a="http://schemas.openxmlformats.org/drawingml/2006/main" xmlns:r="http://schemas.openxmlformats.org/officeDocument/2006/relationships" xmlns:p="http://schemas.openxmlformats.org/presentationml/2006/main">
+  <p:cSld>
+    <p:spTree>
+      <p:nvGrpSpPr>
+        <p:cNvPr id="1" name=""/>
+        <p:cNvGrpSpPr/>
+        <p:nvPr/>
+      </p:nvGrpSpPr>
+      <p:grpSpPr>
+        <a:xfrm>
+          <a:off x="0" y="0"/>
+          <a:ext cx="0" cy="0"/>
+          <a:chOff x="0" y="0"/>
+          <a:chExt cx="0" cy="0"/>
+        </a:xfrm>
+      </p:grpSpPr>
+      <p:sp>
+        <p:nvSpPr>
+          <p:cNvPr id="2" name="object 2"/>
           <p:cNvSpPr txBox="1">
             <a:spLocks noGrp="1"/>
           </p:cNvSpPr>
@@ -11891,7 +12302,7 @@
           <a:blip r:embed="rId2" cstate="print">
             <a:extLst>
               <a:ext uri="{28A0092B-C50C-407E-A947-70E740481C1C}">
-                <a14:useLocalDpi xmlns:a14="http://schemas.microsoft.com/office/drawing/2010/main" xmlns="" val="0"/>
+                <a14:useLocalDpi xmlns="" xmlns:a14="http://schemas.microsoft.com/office/drawing/2010/main" val="0"/>
               </a:ext>
             </a:extLst>
           </a:blip>
@@ -11986,7 +12397,7 @@
     </p:spTree>
     <p:extLst>
       <p:ext uri="{BB962C8B-B14F-4D97-AF65-F5344CB8AC3E}">
-        <p14:creationId xmlns:p14="http://schemas.microsoft.com/office/powerpoint/2010/main" xmlns="" val="3425622471"/>
+        <p14:creationId xmlns="" xmlns:p14="http://schemas.microsoft.com/office/powerpoint/2010/main" val="3425622471"/>
       </p:ext>
     </p:extLst>
   </p:cSld>
@@ -11994,7 +12405,7 @@
     <a:masterClrMapping/>
   </p:clrMapOvr>
   <mc:AlternateContent xmlns:mc="http://schemas.openxmlformats.org/markup-compatibility/2006">
-    <mc:Choice xmlns:p14="http://schemas.microsoft.com/office/powerpoint/2010/main" xmlns="" Requires="p14">
+    <mc:Choice xmlns="" xmlns:p14="http://schemas.microsoft.com/office/powerpoint/2010/main" Requires="p14">
       <p:transition p14:dur="250">
         <p:fade/>
       </p:transition>
@@ -12101,7 +12512,7 @@
           <a:blip r:embed="rId2" cstate="print">
             <a:extLst>
               <a:ext uri="{28A0092B-C50C-407E-A947-70E740481C1C}">
-                <a14:useLocalDpi xmlns:a14="http://schemas.microsoft.com/office/drawing/2010/main" xmlns="" val="0"/>
+                <a14:useLocalDpi xmlns="" xmlns:a14="http://schemas.microsoft.com/office/drawing/2010/main" val="0"/>
               </a:ext>
             </a:extLst>
           </a:blip>
@@ -12196,7 +12607,7 @@
     </p:spTree>
     <p:extLst>
       <p:ext uri="{BB962C8B-B14F-4D97-AF65-F5344CB8AC3E}">
-        <p14:creationId xmlns:p14="http://schemas.microsoft.com/office/powerpoint/2010/main" xmlns="" val="3425622471"/>
+        <p14:creationId xmlns="" xmlns:p14="http://schemas.microsoft.com/office/powerpoint/2010/main" val="3425622471"/>
       </p:ext>
     </p:extLst>
   </p:cSld>
@@ -12204,7 +12615,7 @@
     <a:masterClrMapping/>
   </p:clrMapOvr>
   <mc:AlternateContent xmlns:mc="http://schemas.openxmlformats.org/markup-compatibility/2006">
-    <mc:Choice xmlns:p14="http://schemas.microsoft.com/office/powerpoint/2010/main" xmlns="" Requires="p14">
+    <mc:Choice xmlns="" xmlns:p14="http://schemas.microsoft.com/office/powerpoint/2010/main" Requires="p14">
       <p:transition p14:dur="250">
         <p:fade/>
       </p:transition>
@@ -12406,8 +12817,15 @@
                 <a:latin typeface="Arial"/>
                 <a:cs typeface="Arial"/>
               </a:rPr>
-              <a:t>Weekly </a:t>
-            </a:r>
+              <a:t>Weekly meetings</a:t>
+            </a:r>
+          </a:p>
+          <a:p>
+            <a:pPr marL="12700">
+              <a:lnSpc>
+                <a:spcPct val="100000"/>
+              </a:lnSpc>
+            </a:pPr>
             <a:r>
               <a:rPr lang="en-GB" sz="1400" cap="all" spc="200" dirty="0" smtClean="0">
                 <a:solidFill>
@@ -12418,7 +12836,7 @@
                 <a:latin typeface="Arial"/>
                 <a:cs typeface="Arial"/>
               </a:rPr>
-              <a:t>meetings</a:t>
+              <a:t>Committees</a:t>
             </a:r>
           </a:p>
           <a:p>
@@ -12428,7 +12846,7 @@
               </a:lnSpc>
             </a:pPr>
             <a:r>
-              <a:rPr lang="en-GB" sz="1400" cap="all" spc="200" dirty="0" smtClean="0">
+              <a:rPr lang="en-GB" sz="1400" cap="all" spc="200" dirty="0" err="1" smtClean="0">
                 <a:solidFill>
                   <a:schemeClr val="accent1">
                     <a:lumMod val="75000"/>
@@ -12437,7 +12855,7 @@
                 <a:latin typeface="Arial"/>
                 <a:cs typeface="Arial"/>
               </a:rPr>
-              <a:t>Committees</a:t>
+              <a:t>Redmine</a:t>
             </a:r>
             <a:endParaRPr lang="en-GB" sz="1400" cap="all" spc="200" dirty="0" smtClean="0">
               <a:solidFill>
@@ -12456,7 +12874,7 @@
               </a:lnSpc>
             </a:pPr>
             <a:r>
-              <a:rPr lang="en-GB" sz="1400" cap="all" spc="200" dirty="0" err="1" smtClean="0">
+              <a:rPr lang="en-GB" sz="1400" cap="all" spc="200" dirty="0" smtClean="0">
                 <a:solidFill>
                   <a:schemeClr val="accent1">
                     <a:lumMod val="75000"/>
@@ -12465,17 +12883,8 @@
                 <a:latin typeface="Arial"/>
                 <a:cs typeface="Arial"/>
               </a:rPr>
-              <a:t>Redmine</a:t>
-            </a:r>
-            <a:endParaRPr lang="en-GB" sz="1400" cap="all" spc="200" dirty="0" smtClean="0">
-              <a:solidFill>
-                <a:schemeClr val="accent1">
-                  <a:lumMod val="75000"/>
-                </a:schemeClr>
-              </a:solidFill>
-              <a:latin typeface="Arial"/>
-              <a:cs typeface="Arial"/>
-            </a:endParaRPr>
+              <a:t>GIT</a:t>
+            </a:r>
           </a:p>
           <a:p>
             <a:pPr marL="12700">
@@ -12493,38 +12902,7 @@
                 <a:latin typeface="Arial"/>
                 <a:cs typeface="Arial"/>
               </a:rPr>
-              <a:t>GIT</a:t>
-            </a:r>
-          </a:p>
-          <a:p>
-            <a:pPr marL="12700">
-              <a:lnSpc>
-                <a:spcPct val="100000"/>
-              </a:lnSpc>
-            </a:pPr>
-            <a:r>
-              <a:rPr lang="en-GB" sz="1400" cap="all" spc="200" dirty="0" smtClean="0">
-                <a:solidFill>
-                  <a:schemeClr val="accent1">
-                    <a:lumMod val="75000"/>
-                  </a:schemeClr>
-                </a:solidFill>
-                <a:latin typeface="Arial"/>
-                <a:cs typeface="Arial"/>
-              </a:rPr>
-              <a:t>continuous </a:t>
-            </a:r>
-            <a:r>
-              <a:rPr lang="en-GB" sz="1400" cap="all" spc="200" dirty="0" smtClean="0">
-                <a:solidFill>
-                  <a:schemeClr val="accent1">
-                    <a:lumMod val="75000"/>
-                  </a:schemeClr>
-                </a:solidFill>
-                <a:latin typeface="Arial"/>
-                <a:cs typeface="Arial"/>
-              </a:rPr>
-              <a:t>integration</a:t>
+              <a:t>continuous integration</a:t>
             </a:r>
             <a:endParaRPr lang="da-DK" sz="1600" cap="all" spc="200" dirty="0" smtClean="0">
               <a:solidFill>
@@ -12760,7 +13138,7 @@
     </p:spTree>
     <p:extLst>
       <p:ext uri="{BB962C8B-B14F-4D97-AF65-F5344CB8AC3E}">
-        <p14:creationId xmlns:p14="http://schemas.microsoft.com/office/powerpoint/2010/main" xmlns="" val="585023994"/>
+        <p14:creationId xmlns="" xmlns:p14="http://schemas.microsoft.com/office/powerpoint/2010/main" val="585023994"/>
       </p:ext>
     </p:extLst>
   </p:cSld>
@@ -12768,7 +13146,7 @@
     <a:masterClrMapping/>
   </p:clrMapOvr>
   <mc:AlternateContent xmlns:mc="http://schemas.openxmlformats.org/markup-compatibility/2006">
-    <mc:Choice xmlns:p14="http://schemas.microsoft.com/office/powerpoint/2010/main" xmlns="" Requires="p14">
+    <mc:Choice xmlns="" xmlns:p14="http://schemas.microsoft.com/office/powerpoint/2010/main" Requires="p14">
       <p:transition p14:dur="250">
         <p:fade/>
       </p:transition>
@@ -13316,7 +13694,7 @@
     </p:spTree>
     <p:extLst>
       <p:ext uri="{BB962C8B-B14F-4D97-AF65-F5344CB8AC3E}">
-        <p14:creationId xmlns:p14="http://schemas.microsoft.com/office/powerpoint/2010/main" xmlns="" val="585023994"/>
+        <p14:creationId xmlns="" xmlns:p14="http://schemas.microsoft.com/office/powerpoint/2010/main" val="585023994"/>
       </p:ext>
     </p:extLst>
   </p:cSld>
@@ -13324,7 +13702,7 @@
     <a:masterClrMapping/>
   </p:clrMapOvr>
   <mc:AlternateContent xmlns:mc="http://schemas.openxmlformats.org/markup-compatibility/2006">
-    <mc:Choice xmlns:p14="http://schemas.microsoft.com/office/powerpoint/2010/main" xmlns="" Requires="p14">
+    <mc:Choice xmlns="" xmlns:p14="http://schemas.microsoft.com/office/powerpoint/2010/main" Requires="p14">
       <p:transition p14:dur="250">
         <p:fade/>
       </p:transition>
@@ -13795,7 +14173,7 @@
     </p:spTree>
     <p:extLst>
       <p:ext uri="{BB962C8B-B14F-4D97-AF65-F5344CB8AC3E}">
-        <p14:creationId xmlns:p14="http://schemas.microsoft.com/office/powerpoint/2010/main" xmlns="" val="585023994"/>
+        <p14:creationId xmlns="" xmlns:p14="http://schemas.microsoft.com/office/powerpoint/2010/main" val="585023994"/>
       </p:ext>
     </p:extLst>
   </p:cSld>
@@ -13803,7 +14181,7 @@
     <a:masterClrMapping/>
   </p:clrMapOvr>
   <mc:AlternateContent xmlns:mc="http://schemas.openxmlformats.org/markup-compatibility/2006">
-    <mc:Choice xmlns:p14="http://schemas.microsoft.com/office/powerpoint/2010/main" xmlns="" Requires="p14">
+    <mc:Choice xmlns="" xmlns:p14="http://schemas.microsoft.com/office/powerpoint/2010/main" Requires="p14">
       <p:transition p14:dur="250">
         <p:fade/>
       </p:transition>
@@ -13910,7 +14288,7 @@
           <a:blip r:embed="rId2" cstate="print">
             <a:extLst>
               <a:ext uri="{28A0092B-C50C-407E-A947-70E740481C1C}">
-                <a14:useLocalDpi xmlns:a14="http://schemas.microsoft.com/office/drawing/2010/main" xmlns="" val="0"/>
+                <a14:useLocalDpi xmlns="" xmlns:a14="http://schemas.microsoft.com/office/drawing/2010/main" val="0"/>
               </a:ext>
             </a:extLst>
           </a:blip>
@@ -13993,7 +14371,7 @@
     </p:spTree>
     <p:extLst>
       <p:ext uri="{BB962C8B-B14F-4D97-AF65-F5344CB8AC3E}">
-        <p14:creationId xmlns:p14="http://schemas.microsoft.com/office/powerpoint/2010/main" xmlns="" val="3425622471"/>
+        <p14:creationId xmlns="" xmlns:p14="http://schemas.microsoft.com/office/powerpoint/2010/main" val="3425622471"/>
       </p:ext>
     </p:extLst>
   </p:cSld>
@@ -14001,7 +14379,7 @@
     <a:masterClrMapping/>
   </p:clrMapOvr>
   <mc:AlternateContent xmlns:mc="http://schemas.openxmlformats.org/markup-compatibility/2006">
-    <mc:Choice xmlns:p14="http://schemas.microsoft.com/office/powerpoint/2010/main" xmlns="" Requires="p14">
+    <mc:Choice xmlns="" xmlns:p14="http://schemas.microsoft.com/office/powerpoint/2010/main" Requires="p14">
       <p:transition p14:dur="250">
         <p:fade/>
       </p:transition>
@@ -14500,7 +14878,7 @@
     </p:spTree>
     <p:extLst>
       <p:ext uri="{BB962C8B-B14F-4D97-AF65-F5344CB8AC3E}">
-        <p14:creationId xmlns:p14="http://schemas.microsoft.com/office/powerpoint/2010/main" xmlns="" val="585023994"/>
+        <p14:creationId xmlns="" xmlns:p14="http://schemas.microsoft.com/office/powerpoint/2010/main" val="585023994"/>
       </p:ext>
     </p:extLst>
   </p:cSld>
@@ -14508,7 +14886,7 @@
     <a:masterClrMapping/>
   </p:clrMapOvr>
   <mc:AlternateContent xmlns:mc="http://schemas.openxmlformats.org/markup-compatibility/2006">
-    <mc:Choice xmlns:p14="http://schemas.microsoft.com/office/powerpoint/2010/main" xmlns="" Requires="p14">
+    <mc:Choice xmlns="" xmlns:p14="http://schemas.microsoft.com/office/powerpoint/2010/main" Requires="p14">
       <p:transition p14:dur="250">
         <p:fade/>
       </p:transition>
@@ -14958,7 +15336,7 @@
     </p:spTree>
     <p:extLst>
       <p:ext uri="{BB962C8B-B14F-4D97-AF65-F5344CB8AC3E}">
-        <p14:creationId xmlns:p14="http://schemas.microsoft.com/office/powerpoint/2010/main" xmlns="" val="585023994"/>
+        <p14:creationId xmlns="" xmlns:p14="http://schemas.microsoft.com/office/powerpoint/2010/main" val="585023994"/>
       </p:ext>
     </p:extLst>
   </p:cSld>
@@ -14966,7 +15344,7 @@
     <a:masterClrMapping/>
   </p:clrMapOvr>
   <mc:AlternateContent xmlns:mc="http://schemas.openxmlformats.org/markup-compatibility/2006">
-    <mc:Choice xmlns:p14="http://schemas.microsoft.com/office/powerpoint/2010/main" xmlns="" Requires="p14">
+    <mc:Choice xmlns="" xmlns:p14="http://schemas.microsoft.com/office/powerpoint/2010/main" Requires="p14">
       <p:transition p14:dur="250">
         <p:fade/>
       </p:transition>

</xml_diff>